<commit_message>
diapo complété, reste conclusion
</commit_message>
<xml_diff>
--- a/diapo_oral.pptx
+++ b/diapo_oral.pptx
@@ -125,7 +125,7 @@
   </p:defaultTextStyle>
   <p:extLst>
     <p:ext uri="{EFAFB233-063F-42B5-8137-9DF3F51BA10A}">
-      <p15:sldGuideLst xmlns:p15="http://schemas.microsoft.com/office/powerpoint/2012/main">
+      <p15:sldGuideLst xmlns:p15="http://schemas.microsoft.com/office/powerpoint/2012/main" xmlns="">
         <p15:guide id="1" orient="horz" pos="2160">
           <p15:clr>
             <a:srgbClr val="A4A3A4"/>
@@ -139,7 +139,7 @@
       </p15:sldGuideLst>
     </p:ext>
     <p:ext uri="{2D200454-40CA-4A62-9FC3-DE9A4176ACB9}">
-      <p15:notesGuideLst xmlns:p15="http://schemas.microsoft.com/office/powerpoint/2012/main">
+      <p15:notesGuideLst xmlns:p15="http://schemas.microsoft.com/office/powerpoint/2012/main" xmlns="">
         <p15:guide id="1" orient="horz" pos="2880">
           <p15:clr>
             <a:srgbClr val="A4A3A4"/>
@@ -238,7 +238,7 @@
           <a:p>
             <a:fld id="{5602FAFC-9F3A-4FF4-9042-28401B9632E5}" type="datetimeFigureOut">
               <a:rPr lang="fr-FR" smtClean="0"/>
-              <a:t>28/05/2018</a:t>
+              <a:t>29/05/2018</a:t>
             </a:fld>
             <a:endParaRPr lang="fr-FR" dirty="0"/>
           </a:p>
@@ -403,7 +403,7 @@
           <a:p>
             <a:fld id="{8DBFFD09-ADFA-4BFB-9516-97A7741C8DC4}" type="datetimeFigureOut">
               <a:rPr lang="en-US" smtClean="0"/>
-              <a:t>5/28/2018</a:t>
+              <a:t>5/29/2018</a:t>
             </a:fld>
             <a:endParaRPr lang="en-US" dirty="0"/>
           </a:p>
@@ -1951,7 +1951,7 @@
           <a:p>
             <a:fld id="{8E2462E9-0122-47B4-B28B-B4DFBD73ADE4}" type="datetime1">
               <a:rPr lang="en-US" smtClean="0"/>
-              <a:t>5/28/2018</a:t>
+              <a:t>5/29/2018</a:t>
             </a:fld>
             <a:endParaRPr lang="en-US" dirty="0"/>
           </a:p>
@@ -2169,7 +2169,7 @@
           <a:p>
             <a:fld id="{34BD5DF6-CD7D-4AC6-80D5-2CC765BEA9B5}" type="datetime1">
               <a:rPr lang="en-US" smtClean="0"/>
-              <a:t>5/28/2018</a:t>
+              <a:t>5/29/2018</a:t>
             </a:fld>
             <a:endParaRPr lang="en-US" dirty="0"/>
           </a:p>
@@ -2345,7 +2345,7 @@
           <a:p>
             <a:fld id="{34BD5DF6-CD7D-4AC6-80D5-2CC765BEA9B5}" type="datetime1">
               <a:rPr lang="en-US" smtClean="0"/>
-              <a:t>5/28/2018</a:t>
+              <a:t>5/29/2018</a:t>
             </a:fld>
             <a:endParaRPr lang="en-US" dirty="0"/>
           </a:p>
@@ -2520,7 +2520,7 @@
           <a:p>
             <a:fld id="{9E397A7D-C0B5-4946-AC08-72BC3415D831}" type="datetime1">
               <a:rPr lang="en-US" smtClean="0"/>
-              <a:t>5/28/2018</a:t>
+              <a:t>5/29/2018</a:t>
             </a:fld>
             <a:endParaRPr lang="en-US" dirty="0"/>
           </a:p>
@@ -2870,7 +2870,7 @@
           <a:p>
             <a:fld id="{9F66C054-5C9B-4002-AC9F-7C83A48A938F}" type="datetime1">
               <a:rPr lang="en-US" smtClean="0"/>
-              <a:t>5/28/2018</a:t>
+              <a:t>5/29/2018</a:t>
             </a:fld>
             <a:endParaRPr lang="en-US" dirty="0"/>
           </a:p>
@@ -3309,7 +3309,7 @@
           <a:p>
             <a:fld id="{34BD5DF6-CD7D-4AC6-80D5-2CC765BEA9B5}" type="datetime1">
               <a:rPr lang="en-US" smtClean="0"/>
-              <a:t>5/28/2018</a:t>
+              <a:t>5/29/2018</a:t>
             </a:fld>
             <a:endParaRPr lang="en-US" dirty="0"/>
           </a:p>
@@ -3628,7 +3628,7 @@
           <a:p>
             <a:fld id="{34BD5DF6-CD7D-4AC6-80D5-2CC765BEA9B5}" type="datetime1">
               <a:rPr lang="en-US" smtClean="0"/>
-              <a:t>5/28/2018</a:t>
+              <a:t>5/29/2018</a:t>
             </a:fld>
             <a:endParaRPr lang="en-US" dirty="0"/>
           </a:p>
@@ -4095,7 +4095,7 @@
           <a:p>
             <a:fld id="{34BD5DF6-CD7D-4AC6-80D5-2CC765BEA9B5}" type="datetime1">
               <a:rPr lang="en-US" smtClean="0"/>
-              <a:t>5/28/2018</a:t>
+              <a:t>5/29/2018</a:t>
             </a:fld>
             <a:endParaRPr lang="en-US" dirty="0"/>
           </a:p>
@@ -4244,7 +4244,7 @@
           <a:p>
             <a:fld id="{90D46A46-E375-4D49-A0D5-FD2FADDDBD23}" type="datetime1">
               <a:rPr lang="en-US" smtClean="0"/>
-              <a:t>5/28/2018</a:t>
+              <a:t>5/29/2018</a:t>
             </a:fld>
             <a:endParaRPr lang="en-US" dirty="0"/>
           </a:p>
@@ -4513,7 +4513,7 @@
           <a:p>
             <a:fld id="{56D373BA-5A67-41E9-974C-204D784B1580}" type="datetime1">
               <a:rPr lang="en-US" smtClean="0"/>
-              <a:t>5/28/2018</a:t>
+              <a:t>5/29/2018</a:t>
             </a:fld>
             <a:endParaRPr lang="en-US" dirty="0"/>
           </a:p>
@@ -4978,7 +4978,7 @@
           <a:p>
             <a:fld id="{34BD5DF6-CD7D-4AC6-80D5-2CC765BEA9B5}" type="datetime1">
               <a:rPr lang="en-US" smtClean="0"/>
-              <a:t>5/28/2018</a:t>
+              <a:t>5/29/2018</a:t>
             </a:fld>
             <a:endParaRPr lang="en-US" dirty="0"/>
           </a:p>
@@ -5284,7 +5284,7 @@
           <a:p>
             <a:fld id="{34BD5DF6-CD7D-4AC6-80D5-2CC765BEA9B5}" type="datetime1">
               <a:rPr lang="en-US" smtClean="0"/>
-              <a:t>5/28/2018</a:t>
+              <a:t>5/29/2018</a:t>
             </a:fld>
             <a:endParaRPr lang="en-US" dirty="0"/>
           </a:p>
@@ -5583,7 +5583,7 @@
           <a:p>
             <a:fld id="{34BD5DF6-CD7D-4AC6-80D5-2CC765BEA9B5}" type="datetime1">
               <a:rPr lang="en-US" smtClean="0"/>
-              <a:t>5/28/2018</a:t>
+              <a:t>5/29/2018</a:t>
             </a:fld>
             <a:endParaRPr lang="en-US" dirty="0"/>
           </a:p>
@@ -6036,7 +6036,7 @@
           <a:lstStyle/>
           <a:p>
             <a:pPr algn="ctr"/>
-            <a:endParaRPr lang="fr-FR"/>
+            <a:endParaRPr lang="fr-FR" dirty="0"/>
           </a:p>
         </p:txBody>
       </p:sp>
@@ -6260,8 +6260,8 @@
         </p:nvSpPr>
         <p:spPr>
           <a:xfrm>
-            <a:off x="107504" y="908720"/>
-            <a:ext cx="8853533" cy="5040560"/>
+            <a:off x="107504" y="908719"/>
+            <a:ext cx="8853533" cy="5566543"/>
           </a:xfrm>
           <a:prstGeom prst="rect">
             <a:avLst/>
@@ -6348,15 +6348,90 @@
             </a:r>
           </a:p>
           <a:p>
-            <a:pPr marL="0" indent="0">
+            <a:pPr marL="457200" lvl="1" indent="0">
               <a:spcAft>
                 <a:spcPts val="1000"/>
               </a:spcAft>
               <a:buNone/>
             </a:pPr>
-            <a:endParaRPr lang="fr-FR" sz="2400" b="1" kern="0" dirty="0">
+            <a:endParaRPr lang="fr-FR" b="1" kern="0" dirty="0">
               <a:solidFill>
                 <a:srgbClr val="002060"/>
+              </a:solidFill>
+              <a:latin typeface="Calibri" panose="020F0502020204030204" pitchFamily="34" charset="0"/>
+              <a:cs typeface="Calibri" panose="020F0502020204030204" pitchFamily="34" charset="0"/>
+            </a:endParaRPr>
+          </a:p>
+          <a:p>
+            <a:pPr marL="457200" lvl="1" indent="0">
+              <a:spcAft>
+                <a:spcPts val="1000"/>
+              </a:spcAft>
+              <a:buNone/>
+            </a:pPr>
+            <a:endParaRPr lang="fr-FR" sz="2000" b="1" kern="0" dirty="0">
+              <a:solidFill>
+                <a:srgbClr val="002060"/>
+              </a:solidFill>
+              <a:latin typeface="Calibri" panose="020F0502020204030204" pitchFamily="34" charset="0"/>
+              <a:cs typeface="Calibri" panose="020F0502020204030204" pitchFamily="34" charset="0"/>
+            </a:endParaRPr>
+          </a:p>
+          <a:p>
+            <a:pPr marL="457200" lvl="1" indent="0">
+              <a:spcAft>
+                <a:spcPts val="1000"/>
+              </a:spcAft>
+              <a:buNone/>
+            </a:pPr>
+            <a:endParaRPr lang="fr-FR" sz="2000" b="1" kern="0" dirty="0">
+              <a:solidFill>
+                <a:srgbClr val="002060"/>
+              </a:solidFill>
+              <a:latin typeface="Calibri" panose="020F0502020204030204" pitchFamily="34" charset="0"/>
+              <a:cs typeface="Calibri" panose="020F0502020204030204" pitchFamily="34" charset="0"/>
+            </a:endParaRPr>
+          </a:p>
+          <a:p>
+            <a:pPr marL="457200" lvl="1" indent="0">
+              <a:spcAft>
+                <a:spcPts val="1000"/>
+              </a:spcAft>
+              <a:buNone/>
+            </a:pPr>
+            <a:endParaRPr lang="fr-FR" sz="2000" b="1" kern="0" dirty="0">
+              <a:solidFill>
+                <a:srgbClr val="002060"/>
+              </a:solidFill>
+              <a:latin typeface="Calibri" panose="020F0502020204030204" pitchFamily="34" charset="0"/>
+              <a:cs typeface="Calibri" panose="020F0502020204030204" pitchFamily="34" charset="0"/>
+            </a:endParaRPr>
+          </a:p>
+          <a:p>
+            <a:pPr marL="457200" lvl="1" indent="0">
+              <a:spcAft>
+                <a:spcPts val="1000"/>
+              </a:spcAft>
+              <a:buNone/>
+            </a:pPr>
+            <a:endParaRPr lang="fr-FR" sz="2000" b="1" kern="0" dirty="0">
+              <a:solidFill>
+                <a:srgbClr val="002060"/>
+              </a:solidFill>
+              <a:latin typeface="Calibri" panose="020F0502020204030204" pitchFamily="34" charset="0"/>
+              <a:cs typeface="Calibri" panose="020F0502020204030204" pitchFamily="34" charset="0"/>
+            </a:endParaRPr>
+          </a:p>
+          <a:p>
+            <a:pPr marL="457200" lvl="1" indent="0">
+              <a:spcAft>
+                <a:spcPts val="1000"/>
+              </a:spcAft>
+              <a:buNone/>
+            </a:pPr>
+            <a:endParaRPr lang="fr-FR" sz="2000" kern="0" dirty="0">
+              <a:solidFill>
+                <a:sysClr val="windowText" lastClr="000000"/>
               </a:solidFill>
               <a:latin typeface="Calibri" panose="020F0502020204030204" pitchFamily="34" charset="0"/>
               <a:cs typeface="Calibri" panose="020F0502020204030204" pitchFamily="34" charset="0"/>
@@ -6370,129 +6445,30 @@
               <a:buFont typeface="Wingdings" panose="05000000000000000000" pitchFamily="2" charset="2"/>
               <a:buChar char="§"/>
             </a:pPr>
-            <a:r>
-              <a:rPr lang="fr-FR" sz="2000" kern="0" dirty="0">
-                <a:solidFill>
-                  <a:sysClr val="windowText" lastClr="000000"/>
-                </a:solidFill>
-                <a:latin typeface="Calibri" panose="020F0502020204030204" pitchFamily="34" charset="0"/>
-                <a:cs typeface="Calibri" panose="020F0502020204030204" pitchFamily="34" charset="0"/>
-              </a:rPr>
-              <a:t>Intégrer correctement l’environnement du jeu (plateau, pions, joueurs…)</a:t>
-            </a:r>
+            <a:endParaRPr lang="fr-FR" sz="2000" kern="0" dirty="0" smtClean="0">
+              <a:solidFill>
+                <a:sysClr val="windowText" lastClr="000000"/>
+              </a:solidFill>
+              <a:latin typeface="Calibri" panose="020F0502020204030204" pitchFamily="34" charset="0"/>
+              <a:cs typeface="Calibri" panose="020F0502020204030204" pitchFamily="34" charset="0"/>
+            </a:endParaRPr>
           </a:p>
           <a:p>
             <a:pPr lvl="1">
-              <a:spcAft>
-                <a:spcPts val="1000"/>
-              </a:spcAft>
               <a:buFont typeface="Wingdings" panose="05000000000000000000" pitchFamily="2" charset="2"/>
               <a:buChar char="§"/>
             </a:pPr>
-            <a:endParaRPr lang="fr-FR" sz="2000" kern="0" dirty="0">
-              <a:solidFill>
-                <a:sysClr val="windowText" lastClr="000000"/>
-              </a:solidFill>
-              <a:latin typeface="Calibri" panose="020F0502020204030204" pitchFamily="34" charset="0"/>
-              <a:cs typeface="Calibri" panose="020F0502020204030204" pitchFamily="34" charset="0"/>
-            </a:endParaRPr>
-          </a:p>
-          <a:p>
-            <a:pPr lvl="1">
-              <a:spcAft>
-                <a:spcPts val="1000"/>
-              </a:spcAft>
-              <a:buFont typeface="Wingdings" panose="05000000000000000000" pitchFamily="2" charset="2"/>
-              <a:buChar char="§"/>
-            </a:pPr>
-            <a:r>
-              <a:rPr lang="fr-FR" sz="2000" kern="0" dirty="0">
-                <a:solidFill>
-                  <a:sysClr val="windowText" lastClr="000000"/>
-                </a:solidFill>
-                <a:latin typeface="Calibri" panose="020F0502020204030204" pitchFamily="34" charset="0"/>
-                <a:cs typeface="Calibri" panose="020F0502020204030204" pitchFamily="34" charset="0"/>
-              </a:rPr>
-              <a:t>Créer un jeu qui respecte les règles énoncées.</a:t>
-            </a:r>
-          </a:p>
-          <a:p>
-            <a:pPr lvl="1">
-              <a:spcAft>
-                <a:spcPts val="1000"/>
-              </a:spcAft>
-              <a:buFont typeface="Wingdings" panose="05000000000000000000" pitchFamily="2" charset="2"/>
-              <a:buChar char="§"/>
-            </a:pPr>
-            <a:endParaRPr lang="fr-FR" sz="2000" kern="0" dirty="0">
-              <a:solidFill>
-                <a:sysClr val="windowText" lastClr="000000"/>
-              </a:solidFill>
-              <a:latin typeface="Calibri" panose="020F0502020204030204" pitchFamily="34" charset="0"/>
-              <a:cs typeface="Calibri" panose="020F0502020204030204" pitchFamily="34" charset="0"/>
-            </a:endParaRPr>
-          </a:p>
-          <a:p>
-            <a:pPr lvl="1">
-              <a:spcAft>
-                <a:spcPts val="1000"/>
-              </a:spcAft>
-              <a:buFont typeface="Wingdings" panose="05000000000000000000" pitchFamily="2" charset="2"/>
-              <a:buChar char="§"/>
-            </a:pPr>
-            <a:r>
-              <a:rPr lang="fr-FR" sz="2000" kern="0" dirty="0">
-                <a:solidFill>
-                  <a:sysClr val="windowText" lastClr="000000"/>
-                </a:solidFill>
-                <a:latin typeface="Calibri" panose="020F0502020204030204" pitchFamily="34" charset="0"/>
-                <a:cs typeface="Calibri" panose="020F0502020204030204" pitchFamily="34" charset="0"/>
-              </a:rPr>
-              <a:t>Tester notre code.</a:t>
-            </a:r>
-          </a:p>
-          <a:p>
-            <a:pPr lvl="1">
-              <a:spcAft>
-                <a:spcPts val="1000"/>
-              </a:spcAft>
-              <a:buFont typeface="Wingdings" panose="05000000000000000000" pitchFamily="2" charset="2"/>
-              <a:buChar char="§"/>
-            </a:pPr>
-            <a:endParaRPr lang="fr-FR" sz="2000" kern="0" dirty="0">
-              <a:solidFill>
-                <a:sysClr val="windowText" lastClr="000000"/>
-              </a:solidFill>
-              <a:latin typeface="Calibri" panose="020F0502020204030204" pitchFamily="34" charset="0"/>
-              <a:cs typeface="Calibri" panose="020F0502020204030204" pitchFamily="34" charset="0"/>
-            </a:endParaRPr>
-          </a:p>
-          <a:p>
-            <a:pPr lvl="1">
-              <a:spcAft>
-                <a:spcPts val="1000"/>
-              </a:spcAft>
-              <a:buFont typeface="Wingdings" panose="05000000000000000000" pitchFamily="2" charset="2"/>
-              <a:buChar char="§"/>
-            </a:pPr>
-            <a:r>
-              <a:rPr lang="fr-FR" sz="2000" kern="0" dirty="0">
-                <a:solidFill>
-                  <a:sysClr val="windowText" lastClr="000000"/>
-                </a:solidFill>
-                <a:latin typeface="Calibri" panose="020F0502020204030204" pitchFamily="34" charset="0"/>
-                <a:cs typeface="Calibri" panose="020F0502020204030204" pitchFamily="34" charset="0"/>
-              </a:rPr>
-              <a:t>Créer des intelligences artificielles.</a:t>
-            </a:r>
-          </a:p>
-          <a:p>
-            <a:pPr lvl="1">
-              <a:spcAft>
-                <a:spcPts val="1000"/>
-              </a:spcAft>
-              <a:buFont typeface="Wingdings" panose="05000000000000000000" pitchFamily="2" charset="2"/>
-              <a:buChar char="§"/>
+            <a:endParaRPr lang="fr-FR" sz="2000" kern="0" dirty="0" smtClean="0">
+              <a:solidFill>
+                <a:sysClr val="windowText" lastClr="000000"/>
+              </a:solidFill>
+              <a:latin typeface="Calibri" panose="020F0502020204030204" pitchFamily="34" charset="0"/>
+              <a:cs typeface="Calibri" panose="020F0502020204030204" pitchFamily="34" charset="0"/>
+            </a:endParaRPr>
+          </a:p>
+          <a:p>
+            <a:pPr marL="457200" lvl="1" indent="0">
+              <a:buNone/>
             </a:pPr>
             <a:endParaRPr lang="fr-FR" sz="2000" kern="0" dirty="0">
               <a:solidFill>
@@ -6511,24 +6487,91 @@
               <a:buChar char="§"/>
             </a:pPr>
             <a:r>
-              <a:rPr lang="fr-FR" sz="2000" kern="0" dirty="0">
+              <a:rPr lang="fr-FR" sz="2000" i="1" kern="0" dirty="0" smtClean="0">
                 <a:solidFill>
                   <a:sysClr val="windowText" lastClr="000000"/>
                 </a:solidFill>
                 <a:latin typeface="Calibri" panose="020F0502020204030204" pitchFamily="34" charset="0"/>
                 <a:cs typeface="Calibri" panose="020F0502020204030204" pitchFamily="34" charset="0"/>
               </a:rPr>
-              <a:t>Mettre en place une interface homme-machine (IHM) ergonomique.</a:t>
+              <a:t>IAmax </a:t>
+            </a:r>
+            <a:r>
+              <a:rPr lang="fr-FR" sz="2000" kern="0" dirty="0" smtClean="0">
+                <a:solidFill>
+                  <a:sysClr val="windowText" lastClr="000000"/>
+                </a:solidFill>
+                <a:latin typeface="Calibri" panose="020F0502020204030204" pitchFamily="34" charset="0"/>
+                <a:cs typeface="Calibri" panose="020F0502020204030204" pitchFamily="34" charset="0"/>
+              </a:rPr>
+              <a:t>et </a:t>
+            </a:r>
+            <a:r>
+              <a:rPr lang="fr-FR" sz="2000" i="1" kern="0" dirty="0" smtClean="0">
+                <a:solidFill>
+                  <a:sysClr val="windowText" lastClr="000000"/>
+                </a:solidFill>
+                <a:latin typeface="Calibri" panose="020F0502020204030204" pitchFamily="34" charset="0"/>
+                <a:cs typeface="Calibri" panose="020F0502020204030204" pitchFamily="34" charset="0"/>
+              </a:rPr>
+              <a:t>IAalea</a:t>
+            </a:r>
+            <a:r>
+              <a:rPr lang="fr-FR" sz="2000" kern="0" dirty="0" smtClean="0">
+                <a:solidFill>
+                  <a:sysClr val="windowText" lastClr="000000"/>
+                </a:solidFill>
+                <a:latin typeface="Calibri" panose="020F0502020204030204" pitchFamily="34" charset="0"/>
+                <a:cs typeface="Calibri" panose="020F0502020204030204" pitchFamily="34" charset="0"/>
+              </a:rPr>
+              <a:t> : des IA cobayes, simples à programmer et utiles pour mener des tests</a:t>
+            </a:r>
+            <a:r>
+              <a:rPr lang="fr-FR" sz="2000" kern="0" dirty="0" smtClean="0">
+                <a:solidFill>
+                  <a:sysClr val="windowText" lastClr="000000"/>
+                </a:solidFill>
+                <a:latin typeface="Calibri" panose="020F0502020204030204" pitchFamily="34" charset="0"/>
+                <a:cs typeface="Calibri" panose="020F0502020204030204" pitchFamily="34" charset="0"/>
+              </a:rPr>
+              <a:t>.</a:t>
             </a:r>
           </a:p>
           <a:p>
             <a:pPr lvl="1">
-              <a:spcAft>
-                <a:spcPts val="1000"/>
-              </a:spcAft>
               <a:buFont typeface="Wingdings" panose="05000000000000000000" pitchFamily="2" charset="2"/>
               <a:buChar char="§"/>
             </a:pPr>
+            <a:r>
+              <a:rPr lang="fr-FR" sz="2000" kern="0" dirty="0" smtClean="0">
+                <a:solidFill>
+                  <a:sysClr val="windowText" lastClr="000000"/>
+                </a:solidFill>
+                <a:latin typeface="Calibri" panose="020F0502020204030204" pitchFamily="34" charset="0"/>
+                <a:cs typeface="Calibri" panose="020F0502020204030204" pitchFamily="34" charset="0"/>
+              </a:rPr>
+              <a:t>Les </a:t>
+            </a:r>
+            <a:r>
+              <a:rPr lang="fr-FR" sz="2000" i="1" kern="0" dirty="0" smtClean="0">
+                <a:solidFill>
+                  <a:sysClr val="windowText" lastClr="000000"/>
+                </a:solidFill>
+                <a:latin typeface="Calibri" panose="020F0502020204030204" pitchFamily="34" charset="0"/>
+                <a:cs typeface="Calibri" panose="020F0502020204030204" pitchFamily="34" charset="0"/>
+              </a:rPr>
+              <a:t>IAminmax</a:t>
+            </a:r>
+            <a:r>
+              <a:rPr lang="fr-FR" sz="2000" kern="0" dirty="0" smtClean="0">
+                <a:solidFill>
+                  <a:sysClr val="windowText" lastClr="000000"/>
+                </a:solidFill>
+                <a:latin typeface="Calibri" panose="020F0502020204030204" pitchFamily="34" charset="0"/>
+                <a:cs typeface="Calibri" panose="020F0502020204030204" pitchFamily="34" charset="0"/>
+              </a:rPr>
+              <a:t> : des IA performantes qui analysent les jeu en profondeur.</a:t>
+            </a:r>
             <a:endParaRPr lang="fr-FR" sz="2000" kern="0" dirty="0">
               <a:solidFill>
                 <a:sysClr val="windowText" lastClr="000000"/>
@@ -6539,9 +6582,19 @@
           </a:p>
           <a:p>
             <a:pPr lvl="1">
-              <a:spcAft>
-                <a:spcPts val="1000"/>
-              </a:spcAft>
+              <a:buFont typeface="Wingdings" panose="05000000000000000000" pitchFamily="2" charset="2"/>
+              <a:buChar char="§"/>
+            </a:pPr>
+            <a:endParaRPr lang="fr-FR" sz="2000" kern="0" dirty="0">
+              <a:solidFill>
+                <a:sysClr val="windowText" lastClr="000000"/>
+              </a:solidFill>
+              <a:latin typeface="Calibri" panose="020F0502020204030204" pitchFamily="34" charset="0"/>
+              <a:cs typeface="Calibri" panose="020F0502020204030204" pitchFamily="34" charset="0"/>
+            </a:endParaRPr>
+          </a:p>
+          <a:p>
+            <a:pPr lvl="1">
               <a:buFont typeface="Wingdings" panose="05000000000000000000" pitchFamily="2" charset="2"/>
               <a:buChar char="§"/>
             </a:pPr>
@@ -6690,6 +6743,275 @@
               <a:latin typeface="Calibri" panose="020F0502020204030204" pitchFamily="34" charset="0"/>
               <a:cs typeface="Calibri" panose="020F0502020204030204" pitchFamily="34" charset="0"/>
             </a:endParaRPr>
+          </a:p>
+        </p:txBody>
+      </p:sp>
+      <p:pic>
+        <p:nvPicPr>
+          <p:cNvPr id="2050" name="Picture 2"/>
+          <p:cNvPicPr>
+            <a:picLocks noChangeAspect="1" noChangeArrowheads="1"/>
+          </p:cNvPicPr>
+          <p:nvPr/>
+        </p:nvPicPr>
+        <p:blipFill>
+          <a:blip r:embed="rId3">
+            <a:extLst>
+              <a:ext uri="{28A0092B-C50C-407E-A947-70E740481C1C}">
+                <a14:useLocalDpi xmlns:a14="http://schemas.microsoft.com/office/drawing/2010/main" val="0"/>
+              </a:ext>
+            </a:extLst>
+          </a:blip>
+          <a:srcRect/>
+          <a:stretch>
+            <a:fillRect/>
+          </a:stretch>
+        </p:blipFill>
+        <p:spPr bwMode="auto">
+          <a:xfrm>
+            <a:off x="2162104" y="1700808"/>
+            <a:ext cx="4743450" cy="2835275"/>
+          </a:xfrm>
+          <a:prstGeom prst="rect">
+            <a:avLst/>
+          </a:prstGeom>
+          <a:noFill/>
+          <a:ln>
+            <a:noFill/>
+          </a:ln>
+          <a:effectLst/>
+          <a:extLst>
+            <a:ext uri="{909E8E84-426E-40DD-AFC4-6F175D3DCCD1}">
+              <a14:hiddenFill xmlns:a14="http://schemas.microsoft.com/office/drawing/2010/main">
+                <a:solidFill>
+                  <a:schemeClr val="accent1"/>
+                </a:solidFill>
+              </a14:hiddenFill>
+            </a:ext>
+            <a:ext uri="{91240B29-F687-4F45-9708-019B960494DF}">
+              <a14:hiddenLine xmlns:a14="http://schemas.microsoft.com/office/drawing/2010/main" w="9525">
+                <a:solidFill>
+                  <a:schemeClr val="tx1"/>
+                </a:solidFill>
+                <a:miter lim="800000"/>
+                <a:headEnd/>
+                <a:tailEnd/>
+              </a14:hiddenLine>
+            </a:ext>
+            <a:ext uri="{AF507438-7753-43E0-B8FC-AC1667EBCBE1}">
+              <a14:hiddenEffects xmlns:a14="http://schemas.microsoft.com/office/drawing/2010/main">
+                <a:effectLst>
+                  <a:outerShdw dist="35921" dir="2700000" algn="ctr" rotWithShape="0">
+                    <a:schemeClr val="bg2"/>
+                  </a:outerShdw>
+                </a:effectLst>
+              </a14:hiddenEffects>
+            </a:ext>
+          </a:extLst>
+        </p:spPr>
+      </p:pic>
+      <p:sp>
+        <p:nvSpPr>
+          <p:cNvPr id="6" name="Forme libre 5"/>
+          <p:cNvSpPr/>
+          <p:nvPr/>
+        </p:nvSpPr>
+        <p:spPr>
+          <a:xfrm>
+            <a:off x="2162104" y="2529200"/>
+            <a:ext cx="2876122" cy="2147193"/>
+          </a:xfrm>
+          <a:custGeom>
+            <a:avLst/>
+            <a:gdLst>
+              <a:gd name="connsiteX0" fmla="*/ 267829 w 2876122"/>
+              <a:gd name="connsiteY0" fmla="*/ 2333 h 2147193"/>
+              <a:gd name="connsiteX1" fmla="*/ 623429 w 2876122"/>
+              <a:gd name="connsiteY1" fmla="*/ 120867 h 2147193"/>
+              <a:gd name="connsiteX2" fmla="*/ 995963 w 2876122"/>
+              <a:gd name="connsiteY2" fmla="*/ 865933 h 2147193"/>
+              <a:gd name="connsiteX3" fmla="*/ 1351563 w 2876122"/>
+              <a:gd name="connsiteY3" fmla="*/ 1170733 h 2147193"/>
+              <a:gd name="connsiteX4" fmla="*/ 2028896 w 2876122"/>
+              <a:gd name="connsiteY4" fmla="*/ 1348533 h 2147193"/>
+              <a:gd name="connsiteX5" fmla="*/ 2697763 w 2876122"/>
+              <a:gd name="connsiteY5" fmla="*/ 1407800 h 2147193"/>
+              <a:gd name="connsiteX6" fmla="*/ 2858629 w 2876122"/>
+              <a:gd name="connsiteY6" fmla="*/ 1678733 h 2147193"/>
+              <a:gd name="connsiteX7" fmla="*/ 2807829 w 2876122"/>
+              <a:gd name="connsiteY7" fmla="*/ 2025867 h 2147193"/>
+              <a:gd name="connsiteX8" fmla="*/ 2291363 w 2876122"/>
+              <a:gd name="connsiteY8" fmla="*/ 2144400 h 2147193"/>
+              <a:gd name="connsiteX9" fmla="*/ 784296 w 2876122"/>
+              <a:gd name="connsiteY9" fmla="*/ 2085133 h 2147193"/>
+              <a:gd name="connsiteX10" fmla="*/ 217029 w 2876122"/>
+              <a:gd name="connsiteY10" fmla="*/ 1822667 h 2147193"/>
+              <a:gd name="connsiteX11" fmla="*/ 30763 w 2876122"/>
+              <a:gd name="connsiteY11" fmla="*/ 1424733 h 2147193"/>
+              <a:gd name="connsiteX12" fmla="*/ 13829 w 2876122"/>
+              <a:gd name="connsiteY12" fmla="*/ 459533 h 2147193"/>
+              <a:gd name="connsiteX13" fmla="*/ 22296 w 2876122"/>
+              <a:gd name="connsiteY13" fmla="*/ 129333 h 2147193"/>
+              <a:gd name="connsiteX14" fmla="*/ 267829 w 2876122"/>
+              <a:gd name="connsiteY14" fmla="*/ 2333 h 2147193"/>
+            </a:gdLst>
+            <a:ahLst/>
+            <a:cxnLst>
+              <a:cxn ang="0">
+                <a:pos x="connsiteX0" y="connsiteY0"/>
+              </a:cxn>
+              <a:cxn ang="0">
+                <a:pos x="connsiteX1" y="connsiteY1"/>
+              </a:cxn>
+              <a:cxn ang="0">
+                <a:pos x="connsiteX2" y="connsiteY2"/>
+              </a:cxn>
+              <a:cxn ang="0">
+                <a:pos x="connsiteX3" y="connsiteY3"/>
+              </a:cxn>
+              <a:cxn ang="0">
+                <a:pos x="connsiteX4" y="connsiteY4"/>
+              </a:cxn>
+              <a:cxn ang="0">
+                <a:pos x="connsiteX5" y="connsiteY5"/>
+              </a:cxn>
+              <a:cxn ang="0">
+                <a:pos x="connsiteX6" y="connsiteY6"/>
+              </a:cxn>
+              <a:cxn ang="0">
+                <a:pos x="connsiteX7" y="connsiteY7"/>
+              </a:cxn>
+              <a:cxn ang="0">
+                <a:pos x="connsiteX8" y="connsiteY8"/>
+              </a:cxn>
+              <a:cxn ang="0">
+                <a:pos x="connsiteX9" y="connsiteY9"/>
+              </a:cxn>
+              <a:cxn ang="0">
+                <a:pos x="connsiteX10" y="connsiteY10"/>
+              </a:cxn>
+              <a:cxn ang="0">
+                <a:pos x="connsiteX11" y="connsiteY11"/>
+              </a:cxn>
+              <a:cxn ang="0">
+                <a:pos x="connsiteX12" y="connsiteY12"/>
+              </a:cxn>
+              <a:cxn ang="0">
+                <a:pos x="connsiteX13" y="connsiteY13"/>
+              </a:cxn>
+              <a:cxn ang="0">
+                <a:pos x="connsiteX14" y="connsiteY14"/>
+              </a:cxn>
+            </a:cxnLst>
+            <a:rect l="l" t="t" r="r" b="b"/>
+            <a:pathLst>
+              <a:path w="2876122" h="2147193">
+                <a:moveTo>
+                  <a:pt x="267829" y="2333"/>
+                </a:moveTo>
+                <a:cubicBezTo>
+                  <a:pt x="368018" y="922"/>
+                  <a:pt x="502073" y="-23066"/>
+                  <a:pt x="623429" y="120867"/>
+                </a:cubicBezTo>
+                <a:cubicBezTo>
+                  <a:pt x="744785" y="264800"/>
+                  <a:pt x="874607" y="690955"/>
+                  <a:pt x="995963" y="865933"/>
+                </a:cubicBezTo>
+                <a:cubicBezTo>
+                  <a:pt x="1117319" y="1040911"/>
+                  <a:pt x="1179407" y="1090300"/>
+                  <a:pt x="1351563" y="1170733"/>
+                </a:cubicBezTo>
+                <a:cubicBezTo>
+                  <a:pt x="1523719" y="1251166"/>
+                  <a:pt x="1804529" y="1309022"/>
+                  <a:pt x="2028896" y="1348533"/>
+                </a:cubicBezTo>
+                <a:cubicBezTo>
+                  <a:pt x="2253263" y="1388044"/>
+                  <a:pt x="2559474" y="1352767"/>
+                  <a:pt x="2697763" y="1407800"/>
+                </a:cubicBezTo>
+                <a:cubicBezTo>
+                  <a:pt x="2836052" y="1462833"/>
+                  <a:pt x="2840285" y="1575722"/>
+                  <a:pt x="2858629" y="1678733"/>
+                </a:cubicBezTo>
+                <a:cubicBezTo>
+                  <a:pt x="2876973" y="1781744"/>
+                  <a:pt x="2902373" y="1948256"/>
+                  <a:pt x="2807829" y="2025867"/>
+                </a:cubicBezTo>
+                <a:cubicBezTo>
+                  <a:pt x="2713285" y="2103478"/>
+                  <a:pt x="2628618" y="2134522"/>
+                  <a:pt x="2291363" y="2144400"/>
+                </a:cubicBezTo>
+                <a:cubicBezTo>
+                  <a:pt x="1954108" y="2154278"/>
+                  <a:pt x="1130018" y="2138755"/>
+                  <a:pt x="784296" y="2085133"/>
+                </a:cubicBezTo>
+                <a:cubicBezTo>
+                  <a:pt x="438574" y="2031511"/>
+                  <a:pt x="342618" y="1932734"/>
+                  <a:pt x="217029" y="1822667"/>
+                </a:cubicBezTo>
+                <a:cubicBezTo>
+                  <a:pt x="91440" y="1712600"/>
+                  <a:pt x="64630" y="1651922"/>
+                  <a:pt x="30763" y="1424733"/>
+                </a:cubicBezTo>
+                <a:cubicBezTo>
+                  <a:pt x="-3104" y="1197544"/>
+                  <a:pt x="15240" y="675433"/>
+                  <a:pt x="13829" y="459533"/>
+                </a:cubicBezTo>
+                <a:cubicBezTo>
+                  <a:pt x="12418" y="243633"/>
+                  <a:pt x="-21448" y="204122"/>
+                  <a:pt x="22296" y="129333"/>
+                </a:cubicBezTo>
+                <a:cubicBezTo>
+                  <a:pt x="66040" y="54544"/>
+                  <a:pt x="167640" y="3744"/>
+                  <a:pt x="267829" y="2333"/>
+                </a:cubicBezTo>
+                <a:close/>
+              </a:path>
+            </a:pathLst>
+          </a:custGeom>
+          <a:noFill/>
+          <a:ln>
+            <a:solidFill>
+              <a:srgbClr val="0070C0"/>
+            </a:solidFill>
+          </a:ln>
+        </p:spPr>
+        <p:style>
+          <a:lnRef idx="2">
+            <a:schemeClr val="accent1">
+              <a:shade val="50000"/>
+            </a:schemeClr>
+          </a:lnRef>
+          <a:fillRef idx="1">
+            <a:schemeClr val="accent1"/>
+          </a:fillRef>
+          <a:effectRef idx="0">
+            <a:schemeClr val="accent1"/>
+          </a:effectRef>
+          <a:fontRef idx="minor">
+            <a:schemeClr val="lt1"/>
+          </a:fontRef>
+        </p:style>
+        <p:txBody>
+          <a:bodyPr rtlCol="0" anchor="ctr"/>
+          <a:lstStyle/>
+          <a:p>
+            <a:pPr algn="ctr"/>
+            <a:endParaRPr lang="fr-FR"/>
           </a:p>
         </p:txBody>
       </p:sp>
@@ -6715,6 +7037,13 @@
       </p:transition>
     </mc:Fallback>
   </mc:AlternateContent>
+  <p:timing>
+    <p:tnLst>
+      <p:par>
+        <p:cTn id="1" dur="indefinite" restart="never" nodeType="tmRoot"/>
+      </p:par>
+    </p:tnLst>
+  </p:timing>
 </p:sld>
 </file>
 
@@ -6737,38 +7066,6 @@
       </p:grpSpPr>
       <p:sp>
         <p:nvSpPr>
-          <p:cNvPr id="5" name="ZoneTexte 4"/>
-          <p:cNvSpPr txBox="1"/>
-          <p:nvPr/>
-        </p:nvSpPr>
-        <p:spPr>
-          <a:xfrm>
-            <a:off x="6981805" y="6495297"/>
-            <a:ext cx="2162195" cy="338554"/>
-          </a:xfrm>
-          <a:prstGeom prst="rect">
-            <a:avLst/>
-          </a:prstGeom>
-          <a:noFill/>
-        </p:spPr>
-        <p:txBody>
-          <a:bodyPr wrap="none" rtlCol="0">
-            <a:spAutoFit/>
-          </a:bodyPr>
-          <a:lstStyle/>
-          <a:p>
-            <a:r>
-              <a:rPr lang="fr-FR" sz="1600" dirty="0">
-                <a:latin typeface="Calibri Light" panose="020F0302020204030204" pitchFamily="34" charset="0"/>
-                <a:cs typeface="Calibri Light" panose="020F0302020204030204" pitchFamily="34" charset="0"/>
-              </a:rPr>
-              <a:t>4. Précisions techniques</a:t>
-            </a:r>
-          </a:p>
-        </p:txBody>
-      </p:sp>
-      <p:sp>
-        <p:nvSpPr>
           <p:cNvPr id="282" name="Sous-titre 2"/>
           <p:cNvSpPr txBox="1">
             <a:spLocks/>
@@ -6777,8 +7074,8 @@
         </p:nvSpPr>
         <p:spPr>
           <a:xfrm>
-            <a:off x="107504" y="908720"/>
-            <a:ext cx="8853533" cy="5040560"/>
+            <a:off x="107504" y="908719"/>
+            <a:ext cx="8853533" cy="5566543"/>
           </a:xfrm>
           <a:prstGeom prst="rect">
             <a:avLst/>
@@ -6887,6 +7184,242 @@
             </a:endParaRPr>
           </a:p>
           <a:p>
+            <a:pPr marL="457200" lvl="1" indent="0">
+              <a:spcAft>
+                <a:spcPts val="1000"/>
+              </a:spcAft>
+              <a:buNone/>
+            </a:pPr>
+            <a:endParaRPr lang="fr-FR" sz="2000" kern="0" dirty="0" smtClean="0">
+              <a:solidFill>
+                <a:sysClr val="windowText" lastClr="000000"/>
+              </a:solidFill>
+              <a:latin typeface="Calibri" panose="020F0502020204030204" pitchFamily="34" charset="0"/>
+              <a:cs typeface="Calibri" panose="020F0502020204030204" pitchFamily="34" charset="0"/>
+            </a:endParaRPr>
+          </a:p>
+          <a:p>
+            <a:pPr marL="457200" lvl="1" indent="0">
+              <a:spcAft>
+                <a:spcPts val="1000"/>
+              </a:spcAft>
+              <a:buNone/>
+            </a:pPr>
+            <a:endParaRPr lang="fr-FR" sz="2000" kern="0" dirty="0">
+              <a:solidFill>
+                <a:sysClr val="windowText" lastClr="000000"/>
+              </a:solidFill>
+              <a:latin typeface="Calibri" panose="020F0502020204030204" pitchFamily="34" charset="0"/>
+              <a:cs typeface="Calibri" panose="020F0502020204030204" pitchFamily="34" charset="0"/>
+            </a:endParaRPr>
+          </a:p>
+          <a:p>
+            <a:pPr marL="457200" lvl="1" indent="0">
+              <a:spcAft>
+                <a:spcPts val="1000"/>
+              </a:spcAft>
+              <a:buNone/>
+            </a:pPr>
+            <a:endParaRPr lang="fr-FR" sz="2000" kern="0" dirty="0" smtClean="0">
+              <a:solidFill>
+                <a:sysClr val="windowText" lastClr="000000"/>
+              </a:solidFill>
+              <a:latin typeface="Calibri" panose="020F0502020204030204" pitchFamily="34" charset="0"/>
+              <a:cs typeface="Calibri" panose="020F0502020204030204" pitchFamily="34" charset="0"/>
+            </a:endParaRPr>
+          </a:p>
+          <a:p>
+            <a:pPr marL="457200" lvl="1" indent="0">
+              <a:spcAft>
+                <a:spcPts val="1000"/>
+              </a:spcAft>
+              <a:buNone/>
+            </a:pPr>
+            <a:endParaRPr lang="fr-FR" sz="2000" kern="0" dirty="0">
+              <a:solidFill>
+                <a:sysClr val="windowText" lastClr="000000"/>
+              </a:solidFill>
+              <a:latin typeface="Calibri" panose="020F0502020204030204" pitchFamily="34" charset="0"/>
+              <a:cs typeface="Calibri" panose="020F0502020204030204" pitchFamily="34" charset="0"/>
+            </a:endParaRPr>
+          </a:p>
+          <a:p>
+            <a:pPr marL="457200" lvl="1" indent="0">
+              <a:spcAft>
+                <a:spcPts val="1000"/>
+              </a:spcAft>
+              <a:buNone/>
+            </a:pPr>
+            <a:endParaRPr lang="fr-FR" sz="2000" kern="0" dirty="0" smtClean="0">
+              <a:solidFill>
+                <a:sysClr val="windowText" lastClr="000000"/>
+              </a:solidFill>
+              <a:latin typeface="Calibri" panose="020F0502020204030204" pitchFamily="34" charset="0"/>
+              <a:cs typeface="Calibri" panose="020F0502020204030204" pitchFamily="34" charset="0"/>
+            </a:endParaRPr>
+          </a:p>
+          <a:p>
+            <a:pPr marL="457200" lvl="1" indent="0">
+              <a:spcAft>
+                <a:spcPts val="1000"/>
+              </a:spcAft>
+              <a:buNone/>
+            </a:pPr>
+            <a:endParaRPr lang="fr-FR" sz="2000" kern="0" dirty="0">
+              <a:solidFill>
+                <a:sysClr val="windowText" lastClr="000000"/>
+              </a:solidFill>
+              <a:latin typeface="Calibri" panose="020F0502020204030204" pitchFamily="34" charset="0"/>
+              <a:cs typeface="Calibri" panose="020F0502020204030204" pitchFamily="34" charset="0"/>
+            </a:endParaRPr>
+          </a:p>
+          <a:p>
+            <a:pPr marL="457200" lvl="1" indent="0">
+              <a:buNone/>
+            </a:pPr>
+            <a:endParaRPr lang="fr-FR" sz="2000" kern="0" dirty="0" smtClean="0">
+              <a:solidFill>
+                <a:sysClr val="windowText" lastClr="000000"/>
+              </a:solidFill>
+              <a:latin typeface="Calibri" panose="020F0502020204030204" pitchFamily="34" charset="0"/>
+              <a:cs typeface="Calibri" panose="020F0502020204030204" pitchFamily="34" charset="0"/>
+            </a:endParaRPr>
+          </a:p>
+          <a:p>
+            <a:pPr marL="457200" lvl="1" indent="0">
+              <a:buNone/>
+            </a:pPr>
+            <a:endParaRPr lang="fr-FR" sz="2000" kern="0" dirty="0">
+              <a:solidFill>
+                <a:sysClr val="windowText" lastClr="000000"/>
+              </a:solidFill>
+              <a:latin typeface="Calibri" panose="020F0502020204030204" pitchFamily="34" charset="0"/>
+              <a:cs typeface="Calibri" panose="020F0502020204030204" pitchFamily="34" charset="0"/>
+            </a:endParaRPr>
+          </a:p>
+          <a:p>
+            <a:pPr lvl="1">
+              <a:spcAft>
+                <a:spcPts val="600"/>
+              </a:spcAft>
+              <a:buFont typeface="Wingdings" panose="05000000000000000000" pitchFamily="2" charset="2"/>
+              <a:buChar char="§"/>
+            </a:pPr>
+            <a:r>
+              <a:rPr lang="fr-FR" sz="2000" i="1" kern="0" dirty="0" smtClean="0">
+                <a:solidFill>
+                  <a:sysClr val="windowText" lastClr="000000"/>
+                </a:solidFill>
+                <a:latin typeface="Calibri" panose="020F0502020204030204" pitchFamily="34" charset="0"/>
+                <a:cs typeface="Calibri" panose="020F0502020204030204" pitchFamily="34" charset="0"/>
+              </a:rPr>
+              <a:t>IAminmax </a:t>
+            </a:r>
+            <a:r>
+              <a:rPr lang="fr-FR" sz="2000" kern="0" dirty="0" smtClean="0">
+                <a:solidFill>
+                  <a:sysClr val="windowText" lastClr="000000"/>
+                </a:solidFill>
+                <a:latin typeface="Calibri" panose="020F0502020204030204" pitchFamily="34" charset="0"/>
+                <a:cs typeface="Calibri" panose="020F0502020204030204" pitchFamily="34" charset="0"/>
+              </a:rPr>
+              <a:t>joue de sorte à minimiser ses pertes potentielles</a:t>
+            </a:r>
+            <a:r>
+              <a:rPr lang="fr-FR" sz="2000" kern="0" dirty="0" smtClean="0">
+                <a:solidFill>
+                  <a:sysClr val="windowText" lastClr="000000"/>
+                </a:solidFill>
+                <a:latin typeface="Calibri" panose="020F0502020204030204" pitchFamily="34" charset="0"/>
+                <a:cs typeface="Calibri" panose="020F0502020204030204" pitchFamily="34" charset="0"/>
+              </a:rPr>
+              <a:t>. Pour cela, elle </a:t>
+            </a:r>
+            <a:r>
+              <a:rPr lang="fr-FR" sz="2000" kern="0" dirty="0" smtClean="0">
+                <a:solidFill>
+                  <a:sysClr val="windowText" lastClr="000000"/>
+                </a:solidFill>
+                <a:latin typeface="Calibri" panose="020F0502020204030204" pitchFamily="34" charset="0"/>
+                <a:cs typeface="Calibri" panose="020F0502020204030204" pitchFamily="34" charset="0"/>
+              </a:rPr>
+              <a:t>simule </a:t>
+            </a:r>
+            <a:r>
+              <a:rPr lang="fr-FR" sz="2000" kern="0" dirty="0">
+                <a:solidFill>
+                  <a:sysClr val="windowText" lastClr="000000"/>
+                </a:solidFill>
+                <a:latin typeface="Calibri" panose="020F0502020204030204" pitchFamily="34" charset="0"/>
+                <a:cs typeface="Calibri" panose="020F0502020204030204" pitchFamily="34" charset="0"/>
+              </a:rPr>
+              <a:t>un ou plusieurs </a:t>
+            </a:r>
+            <a:r>
+              <a:rPr lang="fr-FR" sz="2000" kern="0" dirty="0" smtClean="0">
+                <a:solidFill>
+                  <a:sysClr val="windowText" lastClr="000000"/>
+                </a:solidFill>
+                <a:latin typeface="Calibri" panose="020F0502020204030204" pitchFamily="34" charset="0"/>
+                <a:cs typeface="Calibri" panose="020F0502020204030204" pitchFamily="34" charset="0"/>
+              </a:rPr>
+              <a:t>tours grâce à la fonction </a:t>
+            </a:r>
+            <a:r>
+              <a:rPr lang="fr-FR" sz="2000" i="1" kern="0" dirty="0" smtClean="0">
+                <a:solidFill>
+                  <a:sysClr val="windowText" lastClr="000000"/>
+                </a:solidFill>
+                <a:latin typeface="Calibri" panose="020F0502020204030204" pitchFamily="34" charset="0"/>
+                <a:cs typeface="Calibri" panose="020F0502020204030204" pitchFamily="34" charset="0"/>
+              </a:rPr>
+              <a:t>simuler</a:t>
+            </a:r>
+            <a:r>
+              <a:rPr lang="fr-FR" sz="2000" kern="0" dirty="0" smtClean="0">
+                <a:solidFill>
+                  <a:sysClr val="windowText" lastClr="000000"/>
+                </a:solidFill>
+                <a:latin typeface="Calibri" panose="020F0502020204030204" pitchFamily="34" charset="0"/>
+                <a:cs typeface="Calibri" panose="020F0502020204030204" pitchFamily="34" charset="0"/>
+              </a:rPr>
+              <a:t>.</a:t>
+            </a:r>
+            <a:endParaRPr lang="fr-FR" sz="2000" kern="0" dirty="0" smtClean="0">
+              <a:solidFill>
+                <a:sysClr val="windowText" lastClr="000000"/>
+              </a:solidFill>
+              <a:latin typeface="Calibri" panose="020F0502020204030204" pitchFamily="34" charset="0"/>
+              <a:cs typeface="Calibri" panose="020F0502020204030204" pitchFamily="34" charset="0"/>
+            </a:endParaRPr>
+          </a:p>
+          <a:p>
+            <a:pPr lvl="1">
+              <a:spcAft>
+                <a:spcPts val="600"/>
+              </a:spcAft>
+              <a:buFont typeface="Wingdings" panose="05000000000000000000" pitchFamily="2" charset="2"/>
+              <a:buChar char="§"/>
+            </a:pPr>
+            <a:r>
+              <a:rPr lang="fr-FR" sz="2000" kern="0" dirty="0" smtClean="0">
+                <a:solidFill>
+                  <a:sysClr val="windowText" lastClr="000000"/>
+                </a:solidFill>
+                <a:latin typeface="Calibri" panose="020F0502020204030204" pitchFamily="34" charset="0"/>
+                <a:cs typeface="Calibri" panose="020F0502020204030204" pitchFamily="34" charset="0"/>
+              </a:rPr>
+              <a:t>Cet algorithme suppose que l’adversaire maximise constamment ses gains.</a:t>
+            </a:r>
+            <a:endParaRPr lang="fr-FR" sz="2000" kern="0" dirty="0">
+              <a:solidFill>
+                <a:sysClr val="windowText" lastClr="000000"/>
+              </a:solidFill>
+              <a:latin typeface="Calibri" panose="020F0502020204030204" pitchFamily="34" charset="0"/>
+              <a:cs typeface="Calibri" panose="020F0502020204030204" pitchFamily="34" charset="0"/>
+            </a:endParaRPr>
+          </a:p>
+          <a:p>
             <a:pPr lvl="1">
               <a:spcAft>
                 <a:spcPts val="1000"/>
@@ -6894,16 +7427,13 @@
               <a:buFont typeface="Wingdings" panose="05000000000000000000" pitchFamily="2" charset="2"/>
               <a:buChar char="§"/>
             </a:pPr>
-            <a:r>
-              <a:rPr lang="fr-FR" sz="2000" kern="0" dirty="0">
-                <a:solidFill>
-                  <a:sysClr val="windowText" lastClr="000000"/>
-                </a:solidFill>
-                <a:latin typeface="Calibri" panose="020F0502020204030204" pitchFamily="34" charset="0"/>
-                <a:cs typeface="Calibri" panose="020F0502020204030204" pitchFamily="34" charset="0"/>
-              </a:rPr>
-              <a:t>Intégrer correctement l’environnement du jeu (plateau, pions, joueurs…)</a:t>
-            </a:r>
+            <a:endParaRPr lang="fr-FR" sz="2000" kern="0" dirty="0">
+              <a:solidFill>
+                <a:sysClr val="windowText" lastClr="000000"/>
+              </a:solidFill>
+              <a:latin typeface="Calibri" panose="020F0502020204030204" pitchFamily="34" charset="0"/>
+              <a:cs typeface="Calibri" panose="020F0502020204030204" pitchFamily="34" charset="0"/>
+            </a:endParaRPr>
           </a:p>
           <a:p>
             <a:pPr lvl="1">
@@ -6913,162 +7443,6 @@
               <a:buFont typeface="Wingdings" panose="05000000000000000000" pitchFamily="2" charset="2"/>
               <a:buChar char="§"/>
             </a:pPr>
-            <a:endParaRPr lang="fr-FR" sz="2000" kern="0" dirty="0">
-              <a:solidFill>
-                <a:sysClr val="windowText" lastClr="000000"/>
-              </a:solidFill>
-              <a:latin typeface="Calibri" panose="020F0502020204030204" pitchFamily="34" charset="0"/>
-              <a:cs typeface="Calibri" panose="020F0502020204030204" pitchFamily="34" charset="0"/>
-            </a:endParaRPr>
-          </a:p>
-          <a:p>
-            <a:pPr lvl="1">
-              <a:spcAft>
-                <a:spcPts val="1000"/>
-              </a:spcAft>
-              <a:buFont typeface="Wingdings" panose="05000000000000000000" pitchFamily="2" charset="2"/>
-              <a:buChar char="§"/>
-            </a:pPr>
-            <a:r>
-              <a:rPr lang="fr-FR" sz="2000" kern="0" dirty="0">
-                <a:solidFill>
-                  <a:sysClr val="windowText" lastClr="000000"/>
-                </a:solidFill>
-                <a:latin typeface="Calibri" panose="020F0502020204030204" pitchFamily="34" charset="0"/>
-                <a:cs typeface="Calibri" panose="020F0502020204030204" pitchFamily="34" charset="0"/>
-              </a:rPr>
-              <a:t>Créer un jeu qui respecte les règles énoncées.</a:t>
-            </a:r>
-          </a:p>
-          <a:p>
-            <a:pPr lvl="1">
-              <a:spcAft>
-                <a:spcPts val="1000"/>
-              </a:spcAft>
-              <a:buFont typeface="Wingdings" panose="05000000000000000000" pitchFamily="2" charset="2"/>
-              <a:buChar char="§"/>
-            </a:pPr>
-            <a:endParaRPr lang="fr-FR" sz="2000" kern="0" dirty="0">
-              <a:solidFill>
-                <a:sysClr val="windowText" lastClr="000000"/>
-              </a:solidFill>
-              <a:latin typeface="Calibri" panose="020F0502020204030204" pitchFamily="34" charset="0"/>
-              <a:cs typeface="Calibri" panose="020F0502020204030204" pitchFamily="34" charset="0"/>
-            </a:endParaRPr>
-          </a:p>
-          <a:p>
-            <a:pPr lvl="1">
-              <a:spcAft>
-                <a:spcPts val="1000"/>
-              </a:spcAft>
-              <a:buFont typeface="Wingdings" panose="05000000000000000000" pitchFamily="2" charset="2"/>
-              <a:buChar char="§"/>
-            </a:pPr>
-            <a:r>
-              <a:rPr lang="fr-FR" sz="2000" kern="0" dirty="0">
-                <a:solidFill>
-                  <a:sysClr val="windowText" lastClr="000000"/>
-                </a:solidFill>
-                <a:latin typeface="Calibri" panose="020F0502020204030204" pitchFamily="34" charset="0"/>
-                <a:cs typeface="Calibri" panose="020F0502020204030204" pitchFamily="34" charset="0"/>
-              </a:rPr>
-              <a:t>Tester notre code.</a:t>
-            </a:r>
-          </a:p>
-          <a:p>
-            <a:pPr lvl="1">
-              <a:spcAft>
-                <a:spcPts val="1000"/>
-              </a:spcAft>
-              <a:buFont typeface="Wingdings" panose="05000000000000000000" pitchFamily="2" charset="2"/>
-              <a:buChar char="§"/>
-            </a:pPr>
-            <a:endParaRPr lang="fr-FR" sz="2000" kern="0" dirty="0">
-              <a:solidFill>
-                <a:sysClr val="windowText" lastClr="000000"/>
-              </a:solidFill>
-              <a:latin typeface="Calibri" panose="020F0502020204030204" pitchFamily="34" charset="0"/>
-              <a:cs typeface="Calibri" panose="020F0502020204030204" pitchFamily="34" charset="0"/>
-            </a:endParaRPr>
-          </a:p>
-          <a:p>
-            <a:pPr lvl="1">
-              <a:spcAft>
-                <a:spcPts val="1000"/>
-              </a:spcAft>
-              <a:buFont typeface="Wingdings" panose="05000000000000000000" pitchFamily="2" charset="2"/>
-              <a:buChar char="§"/>
-            </a:pPr>
-            <a:r>
-              <a:rPr lang="fr-FR" sz="2000" kern="0" dirty="0">
-                <a:solidFill>
-                  <a:sysClr val="windowText" lastClr="000000"/>
-                </a:solidFill>
-                <a:latin typeface="Calibri" panose="020F0502020204030204" pitchFamily="34" charset="0"/>
-                <a:cs typeface="Calibri" panose="020F0502020204030204" pitchFamily="34" charset="0"/>
-              </a:rPr>
-              <a:t>Créer des intelligences artificielles.</a:t>
-            </a:r>
-          </a:p>
-          <a:p>
-            <a:pPr lvl="1">
-              <a:spcAft>
-                <a:spcPts val="1000"/>
-              </a:spcAft>
-              <a:buFont typeface="Wingdings" panose="05000000000000000000" pitchFamily="2" charset="2"/>
-              <a:buChar char="§"/>
-            </a:pPr>
-            <a:endParaRPr lang="fr-FR" sz="2000" kern="0" dirty="0">
-              <a:solidFill>
-                <a:sysClr val="windowText" lastClr="000000"/>
-              </a:solidFill>
-              <a:latin typeface="Calibri" panose="020F0502020204030204" pitchFamily="34" charset="0"/>
-              <a:cs typeface="Calibri" panose="020F0502020204030204" pitchFamily="34" charset="0"/>
-            </a:endParaRPr>
-          </a:p>
-          <a:p>
-            <a:pPr lvl="1">
-              <a:spcAft>
-                <a:spcPts val="600"/>
-              </a:spcAft>
-              <a:buFont typeface="Wingdings" panose="05000000000000000000" pitchFamily="2" charset="2"/>
-              <a:buChar char="§"/>
-            </a:pPr>
-            <a:r>
-              <a:rPr lang="fr-FR" sz="2000" kern="0" dirty="0">
-                <a:solidFill>
-                  <a:sysClr val="windowText" lastClr="000000"/>
-                </a:solidFill>
-                <a:latin typeface="Calibri" panose="020F0502020204030204" pitchFamily="34" charset="0"/>
-                <a:cs typeface="Calibri" panose="020F0502020204030204" pitchFamily="34" charset="0"/>
-              </a:rPr>
-              <a:t>Mettre en place une interface homme-machine (IHM) ergonomique.</a:t>
-            </a:r>
-          </a:p>
-          <a:p>
-            <a:pPr lvl="1">
-              <a:spcAft>
-                <a:spcPts val="1000"/>
-              </a:spcAft>
-              <a:buFont typeface="Wingdings" panose="05000000000000000000" pitchFamily="2" charset="2"/>
-              <a:buChar char="§"/>
-            </a:pPr>
-            <a:endParaRPr lang="fr-FR" sz="2000" kern="0" dirty="0">
-              <a:solidFill>
-                <a:sysClr val="windowText" lastClr="000000"/>
-              </a:solidFill>
-              <a:latin typeface="Calibri" panose="020F0502020204030204" pitchFamily="34" charset="0"/>
-              <a:cs typeface="Calibri" panose="020F0502020204030204" pitchFamily="34" charset="0"/>
-            </a:endParaRPr>
-          </a:p>
-          <a:p>
-            <a:pPr lvl="1">
-              <a:spcAft>
-                <a:spcPts val="1000"/>
-              </a:spcAft>
-              <a:buFont typeface="Wingdings" panose="05000000000000000000" pitchFamily="2" charset="2"/>
-              <a:buChar char="§"/>
-            </a:pPr>
             <a:endParaRPr lang="fr-FR" sz="1600" kern="0" dirty="0">
               <a:solidFill>
                 <a:sysClr val="windowText" lastClr="000000"/>
@@ -7217,6 +7591,92 @@
           </a:p>
         </p:txBody>
       </p:sp>
+      <p:sp>
+        <p:nvSpPr>
+          <p:cNvPr id="4" name="ZoneTexte 3"/>
+          <p:cNvSpPr txBox="1"/>
+          <p:nvPr/>
+        </p:nvSpPr>
+        <p:spPr>
+          <a:xfrm>
+            <a:off x="7361827" y="6475263"/>
+            <a:ext cx="1769395" cy="338554"/>
+          </a:xfrm>
+          <a:prstGeom prst="rect">
+            <a:avLst/>
+          </a:prstGeom>
+          <a:noFill/>
+        </p:spPr>
+        <p:txBody>
+          <a:bodyPr wrap="none" rtlCol="0">
+            <a:spAutoFit/>
+          </a:bodyPr>
+          <a:lstStyle/>
+          <a:p>
+            <a:r>
+              <a:rPr lang="fr-FR" sz="1600" dirty="0">
+                <a:latin typeface="Calibri Light" panose="020F0302020204030204" pitchFamily="34" charset="0"/>
+                <a:cs typeface="Calibri Light" panose="020F0302020204030204" pitchFamily="34" charset="0"/>
+              </a:rPr>
+              <a:t>2. Types de joueurs</a:t>
+            </a:r>
+          </a:p>
+        </p:txBody>
+      </p:sp>
+      <p:pic>
+        <p:nvPicPr>
+          <p:cNvPr id="3074" name="Picture 2"/>
+          <p:cNvPicPr>
+            <a:picLocks noChangeAspect="1" noChangeArrowheads="1"/>
+          </p:cNvPicPr>
+          <p:nvPr/>
+        </p:nvPicPr>
+        <p:blipFill>
+          <a:blip r:embed="rId3">
+            <a:extLst>
+              <a:ext uri="{28A0092B-C50C-407E-A947-70E740481C1C}">
+                <a14:useLocalDpi xmlns:a14="http://schemas.microsoft.com/office/drawing/2010/main" val="0"/>
+              </a:ext>
+            </a:extLst>
+          </a:blip>
+          <a:srcRect/>
+          <a:stretch>
+            <a:fillRect/>
+          </a:stretch>
+        </p:blipFill>
+        <p:spPr bwMode="auto">
+          <a:xfrm>
+            <a:off x="1256984" y="1628800"/>
+            <a:ext cx="6554572" cy="2933096"/>
+          </a:xfrm>
+          <a:prstGeom prst="rect">
+            <a:avLst/>
+          </a:prstGeom>
+          <a:noFill/>
+          <a:ln>
+            <a:noFill/>
+          </a:ln>
+          <a:extLst>
+            <a:ext uri="{909E8E84-426E-40DD-AFC4-6F175D3DCCD1}">
+              <a14:hiddenFill xmlns:a14="http://schemas.microsoft.com/office/drawing/2010/main">
+                <a:solidFill>
+                  <a:schemeClr val="accent1"/>
+                </a:solidFill>
+              </a14:hiddenFill>
+            </a:ext>
+            <a:ext uri="{91240B29-F687-4F45-9708-019B960494DF}">
+              <a14:hiddenLine xmlns:a14="http://schemas.microsoft.com/office/drawing/2010/main" w="9525">
+                <a:solidFill>
+                  <a:schemeClr val="tx1"/>
+                </a:solidFill>
+                <a:miter lim="800000"/>
+                <a:headEnd/>
+                <a:tailEnd/>
+              </a14:hiddenLine>
+            </a:ext>
+          </a:extLst>
+        </p:spPr>
+      </p:pic>
     </p:spTree>
     <p:extLst>
       <p:ext uri="{BB962C8B-B14F-4D97-AF65-F5344CB8AC3E}">
@@ -7239,6 +7699,13 @@
       </p:transition>
     </mc:Fallback>
   </mc:AlternateContent>
+  <p:timing>
+    <p:tnLst>
+      <p:par>
+        <p:cTn id="1" dur="indefinite" restart="never" nodeType="tmRoot"/>
+      </p:par>
+    </p:tnLst>
+  </p:timing>
 </p:sld>
 </file>
 
@@ -7669,7 +8136,7 @@
           <p:cNvPr id="3" name="Image 2">
             <a:extLst>
               <a:ext uri="{FF2B5EF4-FFF2-40B4-BE49-F238E27FC236}">
-                <a16:creationId xmlns:a16="http://schemas.microsoft.com/office/drawing/2014/main" id="{2B1C6E2D-ED03-4D0A-8186-52B05DEDAA92}"/>
+                <a16:creationId xmlns:a16="http://schemas.microsoft.com/office/drawing/2014/main" xmlns="" id="{2B1C6E2D-ED03-4D0A-8186-52B05DEDAA92}"/>
               </a:ext>
             </a:extLst>
           </p:cNvPr>
@@ -7715,6 +8182,13 @@
       </p:transition>
     </mc:Fallback>
   </mc:AlternateContent>
+  <p:timing>
+    <p:tnLst>
+      <p:par>
+        <p:cTn id="1" dur="indefinite" restart="never" nodeType="tmRoot"/>
+      </p:par>
+    </p:tnLst>
+  </p:timing>
 </p:sld>
 </file>
 
@@ -7735,38 +8209,6 @@
           <a:chExt cx="0" cy="0"/>
         </a:xfrm>
       </p:grpSpPr>
-      <p:sp>
-        <p:nvSpPr>
-          <p:cNvPr id="5" name="ZoneTexte 4"/>
-          <p:cNvSpPr txBox="1"/>
-          <p:nvPr/>
-        </p:nvSpPr>
-        <p:spPr>
-          <a:xfrm>
-            <a:off x="6981805" y="6495297"/>
-            <a:ext cx="2162195" cy="338554"/>
-          </a:xfrm>
-          <a:prstGeom prst="rect">
-            <a:avLst/>
-          </a:prstGeom>
-          <a:noFill/>
-        </p:spPr>
-        <p:txBody>
-          <a:bodyPr wrap="none" rtlCol="0">
-            <a:spAutoFit/>
-          </a:bodyPr>
-          <a:lstStyle/>
-          <a:p>
-            <a:r>
-              <a:rPr lang="fr-FR" sz="1600" dirty="0">
-                <a:latin typeface="Calibri Light" panose="020F0302020204030204" pitchFamily="34" charset="0"/>
-                <a:cs typeface="Calibri Light" panose="020F0302020204030204" pitchFamily="34" charset="0"/>
-              </a:rPr>
-              <a:t>4. Précisions techniques</a:t>
-            </a:r>
-          </a:p>
-        </p:txBody>
-      </p:sp>
       <p:sp>
         <p:nvSpPr>
           <p:cNvPr id="282" name="Sous-titre 2"/>
@@ -8107,7 +8549,7 @@
           <p:cNvPr id="2" name="ZoneTexte 1">
             <a:extLst>
               <a:ext uri="{FF2B5EF4-FFF2-40B4-BE49-F238E27FC236}">
-                <a16:creationId xmlns:a16="http://schemas.microsoft.com/office/drawing/2014/main" id="{5F6520F7-B89A-47A7-ADCE-F7784E1CDF12}"/>
+                <a16:creationId xmlns:a16="http://schemas.microsoft.com/office/drawing/2014/main" xmlns="" id="{5F6520F7-B89A-47A7-ADCE-F7784E1CDF12}"/>
               </a:ext>
             </a:extLst>
           </p:cNvPr>
@@ -8259,6 +8701,38 @@
           </a:p>
         </p:txBody>
       </p:sp>
+      <p:sp>
+        <p:nvSpPr>
+          <p:cNvPr id="6" name="ZoneTexte 5"/>
+          <p:cNvSpPr txBox="1"/>
+          <p:nvPr/>
+        </p:nvSpPr>
+        <p:spPr>
+          <a:xfrm>
+            <a:off x="6482759" y="6475263"/>
+            <a:ext cx="2661241" cy="338554"/>
+          </a:xfrm>
+          <a:prstGeom prst="rect">
+            <a:avLst/>
+          </a:prstGeom>
+          <a:noFill/>
+        </p:spPr>
+        <p:txBody>
+          <a:bodyPr wrap="none" rtlCol="0">
+            <a:spAutoFit/>
+          </a:bodyPr>
+          <a:lstStyle/>
+          <a:p>
+            <a:r>
+              <a:rPr lang="fr-FR" sz="1600" dirty="0">
+                <a:latin typeface="Calibri Light" panose="020F0302020204030204" pitchFamily="34" charset="0"/>
+                <a:cs typeface="Calibri Light" panose="020F0302020204030204" pitchFamily="34" charset="0"/>
+              </a:rPr>
+              <a:t>3. Interaction avec l’utilisateur</a:t>
+            </a:r>
+          </a:p>
+        </p:txBody>
+      </p:sp>
     </p:spTree>
     <p:extLst>
       <p:ext uri="{BB962C8B-B14F-4D97-AF65-F5344CB8AC3E}">
@@ -8269,13 +8743,13 @@
   <p:clrMapOvr>
     <a:masterClrMapping/>
   </p:clrMapOvr>
-  <mc:AlternateContent xmlns:mc="http://schemas.openxmlformats.org/markup-compatibility/2006">
-    <mc:Choice xmlns:p14="http://schemas.microsoft.com/office/powerpoint/2010/main" Requires="p14">
+  <mc:AlternateContent xmlns:mc="http://schemas.openxmlformats.org/markup-compatibility/2006" xmlns:p14="http://schemas.microsoft.com/office/powerpoint/2010/main">
+    <mc:Choice Requires="p14">
       <p:transition p14:dur="100">
         <p:cut/>
       </p:transition>
     </mc:Choice>
-    <mc:Fallback>
+    <mc:Fallback xmlns="">
       <p:transition>
         <p:cut/>
       </p:transition>
@@ -8909,13 +9383,13 @@
               <a:buNone/>
             </a:pPr>
             <a:r>
-              <a:rPr lang="fr-FR" dirty="0">
+              <a:rPr lang="fr-FR" dirty="0" smtClean="0">
                 <a:latin typeface="Calibri" panose="020F0502020204030204" pitchFamily="34" charset="0"/>
                 <a:cs typeface="Calibri" panose="020F0502020204030204" pitchFamily="34" charset="0"/>
               </a:rPr>
               <a:t>Introduction</a:t>
             </a:r>
-            <a:endParaRPr lang="fr-FR" sz="2400" dirty="0">
+            <a:endParaRPr lang="fr-FR" sz="2400" dirty="0" smtClean="0">
               <a:latin typeface="Calibri" panose="020F0502020204030204" pitchFamily="34" charset="0"/>
               <a:cs typeface="Calibri" panose="020F0502020204030204" pitchFamily="34" charset="0"/>
             </a:endParaRPr>
@@ -8927,7 +9401,7 @@
               </a:spcBef>
             </a:pPr>
             <a:r>
-              <a:rPr lang="fr-FR" sz="2000" dirty="0">
+              <a:rPr lang="fr-FR" sz="2000" dirty="0" smtClean="0">
                 <a:latin typeface="Calibri" panose="020F0502020204030204" pitchFamily="34" charset="0"/>
                 <a:cs typeface="Calibri" panose="020F0502020204030204" pitchFamily="34" charset="0"/>
               </a:rPr>
@@ -8941,7 +9415,7 @@
               </a:spcBef>
             </a:pPr>
             <a:r>
-              <a:rPr lang="fr-FR" sz="2000" dirty="0">
+              <a:rPr lang="fr-FR" sz="2000" dirty="0" smtClean="0">
                 <a:latin typeface="Calibri" panose="020F0502020204030204" pitchFamily="34" charset="0"/>
                 <a:cs typeface="Calibri" panose="020F0502020204030204" pitchFamily="34" charset="0"/>
               </a:rPr>
@@ -8954,7 +9428,7 @@
                 <a:spcPts val="300"/>
               </a:spcBef>
             </a:pPr>
-            <a:endParaRPr lang="fr-FR" sz="2000" dirty="0">
+            <a:endParaRPr lang="fr-FR" sz="2000" dirty="0" smtClean="0">
               <a:latin typeface="Calibri" panose="020F0502020204030204" pitchFamily="34" charset="0"/>
               <a:cs typeface="Calibri" panose="020F0502020204030204" pitchFamily="34" charset="0"/>
             </a:endParaRPr>
@@ -8976,7 +9450,7 @@
               <a:buAutoNum type="arabicPeriod"/>
             </a:pPr>
             <a:r>
-              <a:rPr lang="fr-FR" sz="2400" dirty="0">
+              <a:rPr lang="fr-FR" sz="2400" dirty="0" smtClean="0">
                 <a:latin typeface="Calibri" panose="020F0502020204030204" pitchFamily="34" charset="0"/>
                 <a:cs typeface="Calibri" panose="020F0502020204030204" pitchFamily="34" charset="0"/>
               </a:rPr>
@@ -9000,7 +9474,7 @@
               <a:buAutoNum type="arabicPeriod"/>
             </a:pPr>
             <a:r>
-              <a:rPr lang="fr-FR" dirty="0">
+              <a:rPr lang="fr-FR" dirty="0" smtClean="0">
                 <a:latin typeface="Calibri" panose="020F0502020204030204" pitchFamily="34" charset="0"/>
                 <a:cs typeface="Calibri" panose="020F0502020204030204" pitchFamily="34" charset="0"/>
               </a:rPr>
@@ -9024,34 +9498,27 @@
               <a:buAutoNum type="arabicPeriod"/>
             </a:pPr>
             <a:r>
-              <a:rPr lang="en-GB" dirty="0">
+              <a:rPr lang="fr-FR" dirty="0" smtClean="0">
                 <a:latin typeface="Calibri" panose="020F0502020204030204" pitchFamily="34" charset="0"/>
                 <a:cs typeface="Calibri" panose="020F0502020204030204" pitchFamily="34" charset="0"/>
               </a:rPr>
               <a:t>P</a:t>
             </a:r>
             <a:r>
-              <a:rPr lang="fr-FR" dirty="0" err="1">
+              <a:rPr lang="fr-FR" dirty="0" smtClean="0">
                 <a:latin typeface="Calibri" panose="020F0502020204030204" pitchFamily="34" charset="0"/>
                 <a:cs typeface="Calibri" panose="020F0502020204030204" pitchFamily="34" charset="0"/>
               </a:rPr>
-              <a:t>récisions</a:t>
-            </a:r>
-            <a:r>
-              <a:rPr lang="fr-FR" dirty="0">
+              <a:t>récisions : Méthode </a:t>
+            </a:r>
+            <a:r>
+              <a:rPr lang="fr-FR" i="1" dirty="0" smtClean="0">
                 <a:latin typeface="Calibri" panose="020F0502020204030204" pitchFamily="34" charset="0"/>
                 <a:cs typeface="Calibri" panose="020F0502020204030204" pitchFamily="34" charset="0"/>
               </a:rPr>
-              <a:t> : Méthode </a:t>
-            </a:r>
-            <a:r>
-              <a:rPr lang="fr-FR" i="1" dirty="0" err="1">
-                <a:latin typeface="Calibri" panose="020F0502020204030204" pitchFamily="34" charset="0"/>
-                <a:cs typeface="Calibri" panose="020F0502020204030204" pitchFamily="34" charset="0"/>
-              </a:rPr>
               <a:t>coupValide</a:t>
             </a:r>
-            <a:endParaRPr lang="fr-FR" dirty="0">
+            <a:endParaRPr lang="fr-FR" dirty="0" smtClean="0">
               <a:latin typeface="Calibri" panose="020F0502020204030204" pitchFamily="34" charset="0"/>
               <a:cs typeface="Calibri" panose="020F0502020204030204" pitchFamily="34" charset="0"/>
             </a:endParaRPr>
@@ -9073,7 +9540,7 @@
               <a:buAutoNum type="arabicPeriod"/>
             </a:pPr>
             <a:r>
-              <a:rPr lang="fr-FR" dirty="0">
+              <a:rPr lang="fr-FR" dirty="0" smtClean="0">
                 <a:latin typeface="Calibri" panose="020F0502020204030204" pitchFamily="34" charset="0"/>
                 <a:cs typeface="Calibri" panose="020F0502020204030204" pitchFamily="34" charset="0"/>
               </a:rPr>
@@ -9096,7 +9563,7 @@
               <a:buFont typeface="+mj-lt"/>
               <a:buAutoNum type="arabicPeriod"/>
             </a:pPr>
-            <a:endParaRPr lang="fr-FR" dirty="0">
+            <a:endParaRPr lang="fr-FR" dirty="0" smtClean="0">
               <a:latin typeface="Calibri" panose="020F0502020204030204" pitchFamily="34" charset="0"/>
               <a:cs typeface="Calibri" panose="020F0502020204030204" pitchFamily="34" charset="0"/>
             </a:endParaRPr>
@@ -9115,7 +9582,7 @@
               <a:buAutoNum type="arabicPeriod"/>
             </a:pPr>
             <a:r>
-              <a:rPr lang="fr-FR" sz="2400" dirty="0">
+              <a:rPr lang="fr-FR" sz="2400" dirty="0" smtClean="0">
                 <a:latin typeface="Calibri" panose="020F0502020204030204" pitchFamily="34" charset="0"/>
                 <a:cs typeface="Calibri" panose="020F0502020204030204" pitchFamily="34" charset="0"/>
               </a:rPr>
@@ -9136,7 +9603,7 @@
               <a:buAutoNum type="arabicPeriod"/>
             </a:pPr>
             <a:r>
-              <a:rPr lang="fr-FR" dirty="0">
+              <a:rPr lang="fr-FR" dirty="0" smtClean="0">
                 <a:latin typeface="Calibri" panose="020F0502020204030204" pitchFamily="34" charset="0"/>
                 <a:cs typeface="Calibri" panose="020F0502020204030204" pitchFamily="34" charset="0"/>
               </a:rPr>
@@ -9157,7 +9624,7 @@
               <a:buAutoNum type="arabicPeriod"/>
             </a:pPr>
             <a:r>
-              <a:rPr lang="fr-FR" dirty="0">
+              <a:rPr lang="fr-FR" dirty="0" smtClean="0">
                 <a:latin typeface="Calibri" panose="020F0502020204030204" pitchFamily="34" charset="0"/>
                 <a:cs typeface="Calibri" panose="020F0502020204030204" pitchFamily="34" charset="0"/>
               </a:rPr>
@@ -9178,53 +9645,11 @@
               <a:buAutoNum type="arabicPeriod"/>
             </a:pPr>
             <a:r>
-              <a:rPr lang="en-GB" dirty="0" err="1">
+              <a:rPr lang="fr-FR" dirty="0" smtClean="0">
                 <a:latin typeface="Calibri" panose="020F0502020204030204" pitchFamily="34" charset="0"/>
                 <a:cs typeface="Calibri" panose="020F0502020204030204" pitchFamily="34" charset="0"/>
               </a:rPr>
-              <a:t>Précisions</a:t>
-            </a:r>
-            <a:r>
-              <a:rPr lang="en-GB" dirty="0">
-                <a:latin typeface="Calibri" panose="020F0502020204030204" pitchFamily="34" charset="0"/>
-                <a:cs typeface="Calibri" panose="020F0502020204030204" pitchFamily="34" charset="0"/>
-              </a:rPr>
-              <a:t> : Intelligence </a:t>
-            </a:r>
-            <a:r>
-              <a:rPr lang="en-GB" dirty="0" err="1">
-                <a:latin typeface="Calibri" panose="020F0502020204030204" pitchFamily="34" charset="0"/>
-                <a:cs typeface="Calibri" panose="020F0502020204030204" pitchFamily="34" charset="0"/>
-              </a:rPr>
-              <a:t>artificielle</a:t>
-            </a:r>
-            <a:r>
-              <a:rPr lang="en-GB" dirty="0">
-                <a:latin typeface="Calibri" panose="020F0502020204030204" pitchFamily="34" charset="0"/>
-                <a:cs typeface="Calibri" panose="020F0502020204030204" pitchFamily="34" charset="0"/>
-              </a:rPr>
-              <a:t> </a:t>
-            </a:r>
-            <a:r>
-              <a:rPr lang="fr-FR" dirty="0">
-                <a:latin typeface="Calibri" panose="020F0502020204030204" pitchFamily="34" charset="0"/>
-                <a:cs typeface="Calibri" panose="020F0502020204030204" pitchFamily="34" charset="0"/>
-              </a:rPr>
-              <a:t>« </a:t>
-            </a:r>
-            <a:r>
-              <a:rPr lang="fr-FR" dirty="0" err="1">
-                <a:latin typeface="Calibri" panose="020F0502020204030204" pitchFamily="34" charset="0"/>
-                <a:cs typeface="Calibri" panose="020F0502020204030204" pitchFamily="34" charset="0"/>
-              </a:rPr>
-              <a:t>minmax</a:t>
-            </a:r>
-            <a:r>
-              <a:rPr lang="fr-FR" dirty="0">
-                <a:latin typeface="Calibri" panose="020F0502020204030204" pitchFamily="34" charset="0"/>
-                <a:cs typeface="Calibri" panose="020F0502020204030204" pitchFamily="34" charset="0"/>
-              </a:rPr>
-              <a:t> »</a:t>
+              <a:t>Précisions : Intelligence artificielle « minmax »</a:t>
             </a:r>
           </a:p>
           <a:p>
@@ -9240,7 +9665,7 @@
               <a:buFont typeface="+mj-lt"/>
               <a:buAutoNum type="arabicPeriod"/>
             </a:pPr>
-            <a:endParaRPr lang="fr-FR" sz="2400" dirty="0">
+            <a:endParaRPr lang="fr-FR" sz="2400" dirty="0" smtClean="0">
               <a:latin typeface="Calibri" panose="020F0502020204030204" pitchFamily="34" charset="0"/>
               <a:cs typeface="Calibri" panose="020F0502020204030204" pitchFamily="34" charset="0"/>
             </a:endParaRPr>
@@ -9259,7 +9684,7 @@
               <a:buAutoNum type="arabicPeriod"/>
             </a:pPr>
             <a:r>
-              <a:rPr lang="fr-FR" dirty="0">
+              <a:rPr lang="fr-FR" dirty="0" smtClean="0">
                 <a:latin typeface="Calibri" panose="020F0502020204030204" pitchFamily="34" charset="0"/>
                 <a:cs typeface="Calibri" panose="020F0502020204030204" pitchFamily="34" charset="0"/>
               </a:rPr>
@@ -9280,7 +9705,7 @@
               <a:buAutoNum type="arabicPeriod"/>
             </a:pPr>
             <a:r>
-              <a:rPr lang="en-GB" dirty="0">
+              <a:rPr lang="fr-FR" dirty="0" smtClean="0">
                 <a:latin typeface="Calibri" panose="020F0502020204030204" pitchFamily="34" charset="0"/>
                 <a:cs typeface="Calibri" panose="020F0502020204030204" pitchFamily="34" charset="0"/>
               </a:rPr>
@@ -9301,72 +9726,12 @@
               <a:buAutoNum type="arabicPeriod"/>
             </a:pPr>
             <a:r>
-              <a:rPr lang="en-GB" dirty="0" err="1">
+              <a:rPr lang="fr-FR" dirty="0" smtClean="0">
                 <a:latin typeface="Calibri" panose="020F0502020204030204" pitchFamily="34" charset="0"/>
                 <a:cs typeface="Calibri" panose="020F0502020204030204" pitchFamily="34" charset="0"/>
               </a:rPr>
-              <a:t>Précisions</a:t>
-            </a:r>
-            <a:r>
-              <a:rPr lang="en-GB" dirty="0">
-                <a:latin typeface="Calibri" panose="020F0502020204030204" pitchFamily="34" charset="0"/>
-                <a:cs typeface="Calibri" panose="020F0502020204030204" pitchFamily="34" charset="0"/>
-              </a:rPr>
-              <a:t> : Faire </a:t>
-            </a:r>
-            <a:r>
-              <a:rPr lang="en-GB" dirty="0" err="1">
-                <a:latin typeface="Calibri" panose="020F0502020204030204" pitchFamily="34" charset="0"/>
-                <a:cs typeface="Calibri" panose="020F0502020204030204" pitchFamily="34" charset="0"/>
-              </a:rPr>
-              <a:t>jouer</a:t>
-            </a:r>
-            <a:r>
-              <a:rPr lang="en-GB" dirty="0">
-                <a:latin typeface="Calibri" panose="020F0502020204030204" pitchFamily="34" charset="0"/>
-                <a:cs typeface="Calibri" panose="020F0502020204030204" pitchFamily="34" charset="0"/>
-              </a:rPr>
-              <a:t> un </a:t>
-            </a:r>
-            <a:r>
-              <a:rPr lang="en-GB" dirty="0" err="1">
-                <a:latin typeface="Calibri" panose="020F0502020204030204" pitchFamily="34" charset="0"/>
-                <a:cs typeface="Calibri" panose="020F0502020204030204" pitchFamily="34" charset="0"/>
-              </a:rPr>
-              <a:t>humain</a:t>
-            </a:r>
-            <a:r>
-              <a:rPr lang="en-GB" dirty="0">
-                <a:latin typeface="Calibri" panose="020F0502020204030204" pitchFamily="34" charset="0"/>
-                <a:cs typeface="Calibri" panose="020F0502020204030204" pitchFamily="34" charset="0"/>
-              </a:rPr>
-              <a:t> </a:t>
-            </a:r>
-            <a:r>
-              <a:rPr lang="en-GB" dirty="0" err="1">
-                <a:latin typeface="Calibri" panose="020F0502020204030204" pitchFamily="34" charset="0"/>
-                <a:cs typeface="Calibri" panose="020F0502020204030204" pitchFamily="34" charset="0"/>
-              </a:rPr>
-              <a:t>ou</a:t>
-            </a:r>
-            <a:r>
-              <a:rPr lang="en-GB" dirty="0">
-                <a:latin typeface="Calibri" panose="020F0502020204030204" pitchFamily="34" charset="0"/>
-                <a:cs typeface="Calibri" panose="020F0502020204030204" pitchFamily="34" charset="0"/>
-              </a:rPr>
-              <a:t> </a:t>
-            </a:r>
-            <a:r>
-              <a:rPr lang="en-GB" dirty="0" err="1">
-                <a:latin typeface="Calibri" panose="020F0502020204030204" pitchFamily="34" charset="0"/>
-                <a:cs typeface="Calibri" panose="020F0502020204030204" pitchFamily="34" charset="0"/>
-              </a:rPr>
-              <a:t>deux</a:t>
-            </a:r>
-            <a:endParaRPr lang="fr-FR" dirty="0">
-              <a:latin typeface="Calibri" panose="020F0502020204030204" pitchFamily="34" charset="0"/>
-              <a:cs typeface="Calibri" panose="020F0502020204030204" pitchFamily="34" charset="0"/>
-            </a:endParaRPr>
+              <a:t>Précisions : Faire jouer un humain ou deux</a:t>
+            </a:r>
           </a:p>
           <a:p>
             <a:pPr marL="514350" indent="-514350">
@@ -11367,7 +11732,7 @@
         </p:spPr>
         <p:txBody>
           <a:bodyPr>
-            <a:normAutofit/>
+            <a:normAutofit lnSpcReduction="10000"/>
           </a:bodyPr>
           <a:lstStyle>
             <a:defPPr>
@@ -11469,15 +11834,22 @@
               <a:buChar char="§"/>
             </a:pPr>
             <a:r>
-              <a:rPr lang="fr-FR" sz="2000" kern="0" dirty="0">
+              <a:rPr lang="fr-FR" sz="2000" kern="0" dirty="0" smtClean="0">
                 <a:solidFill>
                   <a:sysClr val="windowText" lastClr="000000"/>
                 </a:solidFill>
                 <a:latin typeface="Calibri" panose="020F0502020204030204" pitchFamily="34" charset="0"/>
                 <a:cs typeface="Calibri" panose="020F0502020204030204" pitchFamily="34" charset="0"/>
               </a:rPr>
-              <a:t>Intégrer correctement l’environnement du jeu (plateau, pions, joueurs…)</a:t>
-            </a:r>
+              <a:t>Le joueur 1 choisit une position.</a:t>
+            </a:r>
+            <a:endParaRPr lang="fr-FR" sz="2000" kern="0" dirty="0">
+              <a:solidFill>
+                <a:sysClr val="windowText" lastClr="000000"/>
+              </a:solidFill>
+              <a:latin typeface="Calibri" panose="020F0502020204030204" pitchFamily="34" charset="0"/>
+              <a:cs typeface="Calibri" panose="020F0502020204030204" pitchFamily="34" charset="0"/>
+            </a:endParaRPr>
           </a:p>
           <a:p>
             <a:pPr lvl="1">
@@ -11504,15 +11876,42 @@
               <a:buChar char="§"/>
             </a:pPr>
             <a:r>
-              <a:rPr lang="fr-FR" sz="2000" kern="0" dirty="0">
+              <a:rPr lang="fr-FR" sz="2000" kern="0" dirty="0" smtClean="0">
                 <a:solidFill>
                   <a:sysClr val="windowText" lastClr="000000"/>
                 </a:solidFill>
                 <a:latin typeface="Calibri" panose="020F0502020204030204" pitchFamily="34" charset="0"/>
                 <a:cs typeface="Calibri" panose="020F0502020204030204" pitchFamily="34" charset="0"/>
               </a:rPr>
-              <a:t>Créer un jeu qui respecte les règles énoncées.</a:t>
-            </a:r>
+              <a:t>La fonction </a:t>
+            </a:r>
+            <a:r>
+              <a:rPr lang="fr-FR" sz="2000" i="1" kern="0" dirty="0" smtClean="0">
+                <a:solidFill>
+                  <a:sysClr val="windowText" lastClr="000000"/>
+                </a:solidFill>
+                <a:latin typeface="Calibri" panose="020F0502020204030204" pitchFamily="34" charset="0"/>
+                <a:cs typeface="Calibri" panose="020F0502020204030204" pitchFamily="34" charset="0"/>
+              </a:rPr>
+              <a:t>coupValide</a:t>
+            </a:r>
+            <a:r>
+              <a:rPr lang="fr-FR" sz="2000" kern="0" dirty="0" smtClean="0">
+                <a:solidFill>
+                  <a:sysClr val="windowText" lastClr="000000"/>
+                </a:solidFill>
+                <a:latin typeface="Calibri" panose="020F0502020204030204" pitchFamily="34" charset="0"/>
+                <a:cs typeface="Calibri" panose="020F0502020204030204" pitchFamily="34" charset="0"/>
+              </a:rPr>
+              <a:t> analyse la validité du coup.</a:t>
+            </a:r>
+            <a:endParaRPr lang="fr-FR" sz="2000" kern="0" dirty="0">
+              <a:solidFill>
+                <a:sysClr val="windowText" lastClr="000000"/>
+              </a:solidFill>
+              <a:latin typeface="Calibri" panose="020F0502020204030204" pitchFamily="34" charset="0"/>
+              <a:cs typeface="Calibri" panose="020F0502020204030204" pitchFamily="34" charset="0"/>
+            </a:endParaRPr>
           </a:p>
           <a:p>
             <a:pPr lvl="1">
@@ -11539,15 +11938,42 @@
               <a:buChar char="§"/>
             </a:pPr>
             <a:r>
-              <a:rPr lang="fr-FR" sz="2000" kern="0" dirty="0">
+              <a:rPr lang="fr-FR" sz="2000" kern="0" dirty="0" smtClean="0">
                 <a:solidFill>
                   <a:sysClr val="windowText" lastClr="000000"/>
                 </a:solidFill>
                 <a:latin typeface="Calibri" panose="020F0502020204030204" pitchFamily="34" charset="0"/>
                 <a:cs typeface="Calibri" panose="020F0502020204030204" pitchFamily="34" charset="0"/>
               </a:rPr>
-              <a:t>Tester notre code.</a:t>
-            </a:r>
+              <a:t>Si le coup est valide, le pion est positionné et les pions adverses sont retournés par la fonction </a:t>
+            </a:r>
+            <a:r>
+              <a:rPr lang="fr-FR" sz="2000" i="1" kern="0" dirty="0" smtClean="0">
+                <a:solidFill>
+                  <a:sysClr val="windowText" lastClr="000000"/>
+                </a:solidFill>
+                <a:latin typeface="Calibri" panose="020F0502020204030204" pitchFamily="34" charset="0"/>
+                <a:cs typeface="Calibri" panose="020F0502020204030204" pitchFamily="34" charset="0"/>
+              </a:rPr>
+              <a:t>retourner</a:t>
+            </a:r>
+            <a:r>
+              <a:rPr lang="fr-FR" sz="2000" kern="0" dirty="0" smtClean="0">
+                <a:solidFill>
+                  <a:sysClr val="windowText" lastClr="000000"/>
+                </a:solidFill>
+                <a:latin typeface="Calibri" panose="020F0502020204030204" pitchFamily="34" charset="0"/>
+                <a:cs typeface="Calibri" panose="020F0502020204030204" pitchFamily="34" charset="0"/>
+              </a:rPr>
+              <a:t>.</a:t>
+            </a:r>
+            <a:endParaRPr lang="fr-FR" sz="2000" kern="0" dirty="0">
+              <a:solidFill>
+                <a:sysClr val="windowText" lastClr="000000"/>
+              </a:solidFill>
+              <a:latin typeface="Calibri" panose="020F0502020204030204" pitchFamily="34" charset="0"/>
+              <a:cs typeface="Calibri" panose="020F0502020204030204" pitchFamily="34" charset="0"/>
+            </a:endParaRPr>
           </a:p>
           <a:p>
             <a:pPr lvl="1">
@@ -11574,14 +12000,14 @@
               <a:buChar char="§"/>
             </a:pPr>
             <a:r>
-              <a:rPr lang="fr-FR" sz="2000" kern="0" dirty="0">
+              <a:rPr lang="fr-FR" sz="2000" kern="0" dirty="0" smtClean="0">
                 <a:solidFill>
                   <a:sysClr val="windowText" lastClr="000000"/>
                 </a:solidFill>
                 <a:latin typeface="Calibri" panose="020F0502020204030204" pitchFamily="34" charset="0"/>
                 <a:cs typeface="Calibri" panose="020F0502020204030204" pitchFamily="34" charset="0"/>
               </a:rPr>
-              <a:t>Créer des intelligences artificielles.</a:t>
+              <a:t>L’affichage graphique est mis à jour.</a:t>
             </a:r>
           </a:p>
           <a:p>
@@ -11603,21 +12029,28 @@
           <a:p>
             <a:pPr lvl="1">
               <a:spcAft>
-                <a:spcPts val="600"/>
+                <a:spcPts val="1000"/>
               </a:spcAft>
               <a:buFont typeface="Wingdings" panose="05000000000000000000" pitchFamily="2" charset="2"/>
               <a:buChar char="§"/>
             </a:pPr>
             <a:r>
-              <a:rPr lang="fr-FR" sz="2000" kern="0" dirty="0">
+              <a:rPr lang="fr-FR" sz="2000" kern="0" dirty="0" smtClean="0">
                 <a:solidFill>
                   <a:sysClr val="windowText" lastClr="000000"/>
                 </a:solidFill>
                 <a:latin typeface="Calibri" panose="020F0502020204030204" pitchFamily="34" charset="0"/>
                 <a:cs typeface="Calibri" panose="020F0502020204030204" pitchFamily="34" charset="0"/>
               </a:rPr>
-              <a:t>Mettre en place une interface homme-machine (IHM) ergonomique.</a:t>
-            </a:r>
+              <a:t>Le joueur 2 prend la main.</a:t>
+            </a:r>
+            <a:endParaRPr lang="fr-FR" sz="2000" kern="0" dirty="0">
+              <a:solidFill>
+                <a:sysClr val="windowText" lastClr="000000"/>
+              </a:solidFill>
+              <a:latin typeface="Calibri" panose="020F0502020204030204" pitchFamily="34" charset="0"/>
+              <a:cs typeface="Calibri" panose="020F0502020204030204" pitchFamily="34" charset="0"/>
+            </a:endParaRPr>
           </a:p>
           <a:p>
             <a:pPr lvl="1">
@@ -11626,6 +12059,21 @@
               </a:spcAft>
               <a:buFont typeface="Wingdings" panose="05000000000000000000" pitchFamily="2" charset="2"/>
               <a:buChar char="§"/>
+            </a:pPr>
+            <a:endParaRPr lang="fr-FR" sz="2000" kern="0" dirty="0">
+              <a:solidFill>
+                <a:sysClr val="windowText" lastClr="000000"/>
+              </a:solidFill>
+              <a:latin typeface="Calibri" panose="020F0502020204030204" pitchFamily="34" charset="0"/>
+              <a:cs typeface="Calibri" panose="020F0502020204030204" pitchFamily="34" charset="0"/>
+            </a:endParaRPr>
+          </a:p>
+          <a:p>
+            <a:pPr marL="457200" lvl="1" indent="0">
+              <a:spcAft>
+                <a:spcPts val="1000"/>
+              </a:spcAft>
+              <a:buNone/>
             </a:pPr>
             <a:endParaRPr lang="fr-FR" sz="2000" kern="0" dirty="0">
               <a:solidFill>
@@ -11813,6 +12261,13 @@
       </p:transition>
     </mc:Fallback>
   </mc:AlternateContent>
+  <p:timing>
+    <p:tnLst>
+      <p:par>
+        <p:cTn id="1" dur="indefinite" restart="never" nodeType="tmRoot"/>
+      </p:par>
+    </p:tnLst>
+  </p:timing>
 </p:sld>
 </file>
 
@@ -11833,38 +12288,6 @@
           <a:chExt cx="0" cy="0"/>
         </a:xfrm>
       </p:grpSpPr>
-      <p:sp>
-        <p:nvSpPr>
-          <p:cNvPr id="5" name="ZoneTexte 4"/>
-          <p:cNvSpPr txBox="1"/>
-          <p:nvPr/>
-        </p:nvSpPr>
-        <p:spPr>
-          <a:xfrm>
-            <a:off x="6981805" y="6495297"/>
-            <a:ext cx="2162195" cy="338554"/>
-          </a:xfrm>
-          <a:prstGeom prst="rect">
-            <a:avLst/>
-          </a:prstGeom>
-          <a:noFill/>
-        </p:spPr>
-        <p:txBody>
-          <a:bodyPr wrap="none" rtlCol="0">
-            <a:spAutoFit/>
-          </a:bodyPr>
-          <a:lstStyle/>
-          <a:p>
-            <a:r>
-              <a:rPr lang="fr-FR" sz="1600" dirty="0">
-                <a:latin typeface="Calibri Light" panose="020F0302020204030204" pitchFamily="34" charset="0"/>
-                <a:cs typeface="Calibri Light" panose="020F0302020204030204" pitchFamily="34" charset="0"/>
-              </a:rPr>
-              <a:t>4. Précisions techniques</a:t>
-            </a:r>
-          </a:p>
-        </p:txBody>
-      </p:sp>
       <p:sp>
         <p:nvSpPr>
           <p:cNvPr id="282" name="Sous-titre 2"/>
@@ -11962,22 +12385,15 @@
               <a:t>  Méthode </a:t>
             </a:r>
             <a:r>
-              <a:rPr lang="fr-FR" sz="2400" b="1" i="1" kern="0" dirty="0" err="1">
+              <a:rPr lang="fr-FR" sz="2400" b="1" i="1" kern="0" dirty="0">
                 <a:solidFill>
                   <a:srgbClr val="002060"/>
                 </a:solidFill>
-                <a:latin typeface="+mj-lt"/>
+                <a:latin typeface="Calibri" panose="020F0502020204030204" pitchFamily="34" charset="0"/>
                 <a:cs typeface="Calibri" panose="020F0502020204030204" pitchFamily="34" charset="0"/>
               </a:rPr>
               <a:t>coupValide</a:t>
             </a:r>
-            <a:endParaRPr lang="fr-FR" sz="2400" b="1" i="1" kern="0" dirty="0">
-              <a:solidFill>
-                <a:srgbClr val="002060"/>
-              </a:solidFill>
-              <a:latin typeface="+mj-lt"/>
-              <a:cs typeface="Calibri" panose="020F0502020204030204" pitchFamily="34" charset="0"/>
-            </a:endParaRPr>
           </a:p>
           <a:p>
             <a:pPr marL="0" indent="0">
@@ -12027,7 +12443,17 @@
                 <a:latin typeface="Calibri" panose="020F0502020204030204" pitchFamily="34" charset="0"/>
                 <a:cs typeface="Calibri" panose="020F0502020204030204" pitchFamily="34" charset="0"/>
               </a:rPr>
-              <a:t>	Entrées : position, couleur</a:t>
+              <a:t>	Entrées : </a:t>
+            </a:r>
+            <a:r>
+              <a:rPr lang="en-GB" sz="2000" i="1" kern="0" dirty="0">
+                <a:solidFill>
+                  <a:srgbClr val="002060"/>
+                </a:solidFill>
+                <a:latin typeface="Calibri" panose="020F0502020204030204" pitchFamily="34" charset="0"/>
+                <a:cs typeface="Calibri" panose="020F0502020204030204" pitchFamily="34" charset="0"/>
+              </a:rPr>
+              <a:t>position, couleur</a:t>
             </a:r>
           </a:p>
           <a:p>
@@ -12045,107 +12471,56 @@
                 <a:latin typeface="Calibri" panose="020F0502020204030204" pitchFamily="34" charset="0"/>
                 <a:cs typeface="Calibri" panose="020F0502020204030204" pitchFamily="34" charset="0"/>
               </a:rPr>
-              <a:t>	Sorties : (</a:t>
-            </a:r>
-            <a:r>
-              <a:rPr lang="en-GB" sz="2000" b="1" i="1" kern="0" dirty="0" err="1">
+              <a:t>	Sorties : </a:t>
+            </a:r>
+            <a:r>
+              <a:rPr lang="fr-FR" sz="2000" i="1" kern="0" dirty="0" smtClean="0">
                 <a:solidFill>
                   <a:srgbClr val="002060"/>
                 </a:solidFill>
                 <a:latin typeface="Calibri" panose="020F0502020204030204" pitchFamily="34" charset="0"/>
                 <a:cs typeface="Calibri" panose="020F0502020204030204" pitchFamily="34" charset="0"/>
               </a:rPr>
-              <a:t>Bouléen</a:t>
-            </a:r>
-            <a:r>
-              <a:rPr lang="en-GB" sz="2000" b="1" i="1" kern="0" dirty="0">
-                <a:solidFill>
-                  <a:srgbClr val="002060"/>
-                </a:solidFill>
-                <a:latin typeface="Calibri" panose="020F0502020204030204" pitchFamily="34" charset="0"/>
-                <a:cs typeface="Calibri" panose="020F0502020204030204" pitchFamily="34" charset="0"/>
-              </a:rPr>
-              <a:t> pour la </a:t>
-            </a:r>
-            <a:r>
-              <a:rPr lang="en-GB" sz="2000" b="1" i="1" kern="0" dirty="0" err="1">
-                <a:solidFill>
-                  <a:srgbClr val="002060"/>
-                </a:solidFill>
-                <a:latin typeface="Calibri" panose="020F0502020204030204" pitchFamily="34" charset="0"/>
-                <a:cs typeface="Calibri" panose="020F0502020204030204" pitchFamily="34" charset="0"/>
-              </a:rPr>
-              <a:t>validité</a:t>
-            </a:r>
-            <a:r>
-              <a:rPr lang="en-GB" sz="2000" b="1" i="1" kern="0" dirty="0">
-                <a:solidFill>
-                  <a:srgbClr val="002060"/>
-                </a:solidFill>
-                <a:latin typeface="Calibri" panose="020F0502020204030204" pitchFamily="34" charset="0"/>
-                <a:cs typeface="Calibri" panose="020F0502020204030204" pitchFamily="34" charset="0"/>
-              </a:rPr>
-              <a:t>, </a:t>
-            </a:r>
-            <a:r>
-              <a:rPr lang="en-GB" sz="2000" b="1" i="1" kern="0" dirty="0" err="1">
-                <a:solidFill>
-                  <a:srgbClr val="002060"/>
-                </a:solidFill>
-                <a:latin typeface="Calibri" panose="020F0502020204030204" pitchFamily="34" charset="0"/>
-                <a:cs typeface="Calibri" panose="020F0502020204030204" pitchFamily="34" charset="0"/>
-              </a:rPr>
-              <a:t>liste</a:t>
-            </a:r>
-            <a:r>
-              <a:rPr lang="en-GB" sz="2000" b="1" i="1" kern="0" dirty="0">
-                <a:solidFill>
-                  <a:srgbClr val="002060"/>
-                </a:solidFill>
-                <a:latin typeface="Calibri" panose="020F0502020204030204" pitchFamily="34" charset="0"/>
-                <a:cs typeface="Calibri" panose="020F0502020204030204" pitchFamily="34" charset="0"/>
-              </a:rPr>
-              <a:t> des </a:t>
-            </a:r>
-            <a:r>
-              <a:rPr lang="en-GB" sz="2000" b="1" i="1" kern="0" dirty="0" err="1">
-                <a:solidFill>
-                  <a:srgbClr val="002060"/>
-                </a:solidFill>
-                <a:latin typeface="Calibri" panose="020F0502020204030204" pitchFamily="34" charset="0"/>
-                <a:cs typeface="Calibri" panose="020F0502020204030204" pitchFamily="34" charset="0"/>
-              </a:rPr>
-              <a:t>pions</a:t>
-            </a:r>
-            <a:r>
-              <a:rPr lang="en-GB" sz="2000" b="1" i="1" kern="0" dirty="0">
-                <a:solidFill>
-                  <a:srgbClr val="002060"/>
-                </a:solidFill>
-                <a:latin typeface="Calibri" panose="020F0502020204030204" pitchFamily="34" charset="0"/>
-                <a:cs typeface="Calibri" panose="020F0502020204030204" pitchFamily="34" charset="0"/>
-              </a:rPr>
-              <a:t> à </a:t>
-            </a:r>
-            <a:r>
-              <a:rPr lang="en-GB" sz="2000" b="1" i="1" kern="0" dirty="0" err="1">
-                <a:solidFill>
-                  <a:srgbClr val="002060"/>
-                </a:solidFill>
-                <a:latin typeface="Calibri" panose="020F0502020204030204" pitchFamily="34" charset="0"/>
-                <a:cs typeface="Calibri" panose="020F0502020204030204" pitchFamily="34" charset="0"/>
-              </a:rPr>
-              <a:t>retourner</a:t>
-            </a:r>
-            <a:r>
-              <a:rPr lang="en-GB" sz="2000" b="1" i="1" kern="0" dirty="0">
-                <a:solidFill>
-                  <a:srgbClr val="002060"/>
-                </a:solidFill>
-                <a:latin typeface="Calibri" panose="020F0502020204030204" pitchFamily="34" charset="0"/>
-                <a:cs typeface="Calibri" panose="020F0502020204030204" pitchFamily="34" charset="0"/>
-              </a:rPr>
-              <a:t>)</a:t>
+              <a:t>(Booléen pour la validité, [liste des pions à retourner])</a:t>
+            </a:r>
+            <a:endParaRPr lang="fr-FR" sz="2000" i="1" kern="0" dirty="0">
+              <a:solidFill>
+                <a:srgbClr val="002060"/>
+              </a:solidFill>
+              <a:latin typeface="Calibri" panose="020F0502020204030204" pitchFamily="34" charset="0"/>
+              <a:cs typeface="Calibri" panose="020F0502020204030204" pitchFamily="34" charset="0"/>
+            </a:endParaRPr>
+          </a:p>
+        </p:txBody>
+      </p:sp>
+      <p:sp>
+        <p:nvSpPr>
+          <p:cNvPr id="4" name="ZoneTexte 3"/>
+          <p:cNvSpPr txBox="1"/>
+          <p:nvPr/>
+        </p:nvSpPr>
+        <p:spPr>
+          <a:xfrm>
+            <a:off x="6083034" y="6487017"/>
+            <a:ext cx="3060966" cy="338554"/>
+          </a:xfrm>
+          <a:prstGeom prst="rect">
+            <a:avLst/>
+          </a:prstGeom>
+          <a:noFill/>
+        </p:spPr>
+        <p:txBody>
+          <a:bodyPr wrap="none" rtlCol="0">
+            <a:spAutoFit/>
+          </a:bodyPr>
+          <a:lstStyle/>
+          <a:p>
+            <a:r>
+              <a:rPr lang="fr-FR" sz="1600" dirty="0">
+                <a:latin typeface="Calibri Light" panose="020F0302020204030204" pitchFamily="34" charset="0"/>
+                <a:cs typeface="Calibri Light" panose="020F0302020204030204" pitchFamily="34" charset="0"/>
+              </a:rPr>
+              <a:t>1. Intégration des structures de jeu</a:t>
             </a:r>
           </a:p>
         </p:txBody>
@@ -12172,6 +12547,13 @@
       </p:transition>
     </mc:Fallback>
   </mc:AlternateContent>
+  <p:timing>
+    <p:tnLst>
+      <p:par>
+        <p:cTn id="1" dur="indefinite" restart="never" nodeType="tmRoot"/>
+      </p:par>
+    </p:tnLst>
+  </p:timing>
 </p:sld>
 </file>
 
@@ -12194,38 +12576,6 @@
       </p:grpSpPr>
       <p:sp>
         <p:nvSpPr>
-          <p:cNvPr id="5" name="ZoneTexte 4"/>
-          <p:cNvSpPr txBox="1"/>
-          <p:nvPr/>
-        </p:nvSpPr>
-        <p:spPr>
-          <a:xfrm>
-            <a:off x="6981805" y="6495297"/>
-            <a:ext cx="2162195" cy="338554"/>
-          </a:xfrm>
-          <a:prstGeom prst="rect">
-            <a:avLst/>
-          </a:prstGeom>
-          <a:noFill/>
-        </p:spPr>
-        <p:txBody>
-          <a:bodyPr wrap="none" rtlCol="0">
-            <a:spAutoFit/>
-          </a:bodyPr>
-          <a:lstStyle/>
-          <a:p>
-            <a:r>
-              <a:rPr lang="fr-FR" sz="1600" dirty="0">
-                <a:latin typeface="Calibri Light" panose="020F0302020204030204" pitchFamily="34" charset="0"/>
-                <a:cs typeface="Calibri Light" panose="020F0302020204030204" pitchFamily="34" charset="0"/>
-              </a:rPr>
-              <a:t>4. Précisions techniques</a:t>
-            </a:r>
-          </a:p>
-        </p:txBody>
-      </p:sp>
-      <p:sp>
-        <p:nvSpPr>
           <p:cNvPr id="282" name="Sous-titre 2"/>
           <p:cNvSpPr txBox="1">
             <a:spLocks/>
@@ -12234,7 +12584,7 @@
         </p:nvSpPr>
         <p:spPr>
           <a:xfrm>
-            <a:off x="107504" y="908719"/>
+            <a:off x="107504" y="665310"/>
             <a:ext cx="8853533" cy="6192690"/>
           </a:xfrm>
           <a:prstGeom prst="rect">
@@ -12311,154 +12661,14 @@
               <a:buNone/>
             </a:pPr>
             <a:r>
-              <a:rPr lang="en-GB" sz="1800" kern="0" dirty="0">
+              <a:rPr lang="fr-FR" sz="1800" kern="0" dirty="0" smtClean="0">
                 <a:solidFill>
                   <a:sysClr val="windowText" lastClr="000000"/>
                 </a:solidFill>
                 <a:latin typeface="Calibri" panose="020F0502020204030204" pitchFamily="34" charset="0"/>
                 <a:cs typeface="Calibri" panose="020F0502020204030204" pitchFamily="34" charset="0"/>
               </a:rPr>
-              <a:t>Si la position </a:t>
-            </a:r>
-            <a:r>
-              <a:rPr lang="en-GB" sz="1800" kern="0" dirty="0" err="1">
-                <a:solidFill>
-                  <a:sysClr val="windowText" lastClr="000000"/>
-                </a:solidFill>
-                <a:latin typeface="Calibri" panose="020F0502020204030204" pitchFamily="34" charset="0"/>
-                <a:cs typeface="Calibri" panose="020F0502020204030204" pitchFamily="34" charset="0"/>
-              </a:rPr>
-              <a:t>est</a:t>
-            </a:r>
-            <a:r>
-              <a:rPr lang="en-GB" sz="1800" kern="0" dirty="0">
-                <a:solidFill>
-                  <a:sysClr val="windowText" lastClr="000000"/>
-                </a:solidFill>
-                <a:latin typeface="Calibri" panose="020F0502020204030204" pitchFamily="34" charset="0"/>
-                <a:cs typeface="Calibri" panose="020F0502020204030204" pitchFamily="34" charset="0"/>
-              </a:rPr>
-              <a:t> </a:t>
-            </a:r>
-            <a:r>
-              <a:rPr lang="en-GB" sz="1800" kern="0" dirty="0" err="1">
-                <a:solidFill>
-                  <a:sysClr val="windowText" lastClr="000000"/>
-                </a:solidFill>
-                <a:latin typeface="Calibri" panose="020F0502020204030204" pitchFamily="34" charset="0"/>
-                <a:cs typeface="Calibri" panose="020F0502020204030204" pitchFamily="34" charset="0"/>
-              </a:rPr>
-              <a:t>en-dehors</a:t>
-            </a:r>
-            <a:r>
-              <a:rPr lang="en-GB" sz="1800" kern="0" dirty="0">
-                <a:solidFill>
-                  <a:sysClr val="windowText" lastClr="000000"/>
-                </a:solidFill>
-                <a:latin typeface="Calibri" panose="020F0502020204030204" pitchFamily="34" charset="0"/>
-                <a:cs typeface="Calibri" panose="020F0502020204030204" pitchFamily="34" charset="0"/>
-              </a:rPr>
-              <a:t> de la grille </a:t>
-            </a:r>
-            <a:r>
-              <a:rPr lang="en-GB" sz="1800" kern="0" dirty="0" err="1">
-                <a:solidFill>
-                  <a:sysClr val="windowText" lastClr="000000"/>
-                </a:solidFill>
-                <a:latin typeface="Calibri" panose="020F0502020204030204" pitchFamily="34" charset="0"/>
-                <a:cs typeface="Calibri" panose="020F0502020204030204" pitchFamily="34" charset="0"/>
-              </a:rPr>
-              <a:t>ou</a:t>
-            </a:r>
-            <a:r>
-              <a:rPr lang="en-GB" sz="1800" kern="0" dirty="0">
-                <a:solidFill>
-                  <a:sysClr val="windowText" lastClr="000000"/>
-                </a:solidFill>
-                <a:latin typeface="Calibri" panose="020F0502020204030204" pitchFamily="34" charset="0"/>
-                <a:cs typeface="Calibri" panose="020F0502020204030204" pitchFamily="34" charset="0"/>
-              </a:rPr>
-              <a:t> </a:t>
-            </a:r>
-            <a:r>
-              <a:rPr lang="en-GB" sz="1800" kern="0" dirty="0" err="1">
-                <a:solidFill>
-                  <a:sysClr val="windowText" lastClr="000000"/>
-                </a:solidFill>
-                <a:latin typeface="Calibri" panose="020F0502020204030204" pitchFamily="34" charset="0"/>
-                <a:cs typeface="Calibri" panose="020F0502020204030204" pitchFamily="34" charset="0"/>
-              </a:rPr>
-              <a:t>si</a:t>
-            </a:r>
-            <a:r>
-              <a:rPr lang="en-GB" sz="1800" kern="0" dirty="0">
-                <a:solidFill>
-                  <a:sysClr val="windowText" lastClr="000000"/>
-                </a:solidFill>
-                <a:latin typeface="Calibri" panose="020F0502020204030204" pitchFamily="34" charset="0"/>
-                <a:cs typeface="Calibri" panose="020F0502020204030204" pitchFamily="34" charset="0"/>
-              </a:rPr>
-              <a:t> </a:t>
-            </a:r>
-            <a:r>
-              <a:rPr lang="en-GB" sz="1800" kern="0" dirty="0" err="1">
-                <a:solidFill>
-                  <a:sysClr val="windowText" lastClr="000000"/>
-                </a:solidFill>
-                <a:latin typeface="Calibri" panose="020F0502020204030204" pitchFamily="34" charset="0"/>
-                <a:cs typeface="Calibri" panose="020F0502020204030204" pitchFamily="34" charset="0"/>
-              </a:rPr>
-              <a:t>elle</a:t>
-            </a:r>
-            <a:r>
-              <a:rPr lang="en-GB" sz="1800" kern="0" dirty="0">
-                <a:solidFill>
-                  <a:sysClr val="windowText" lastClr="000000"/>
-                </a:solidFill>
-                <a:latin typeface="Calibri" panose="020F0502020204030204" pitchFamily="34" charset="0"/>
-                <a:cs typeface="Calibri" panose="020F0502020204030204" pitchFamily="34" charset="0"/>
-              </a:rPr>
-              <a:t> </a:t>
-            </a:r>
-            <a:r>
-              <a:rPr lang="en-GB" sz="1800" kern="0" dirty="0" err="1">
-                <a:solidFill>
-                  <a:sysClr val="windowText" lastClr="000000"/>
-                </a:solidFill>
-                <a:latin typeface="Calibri" panose="020F0502020204030204" pitchFamily="34" charset="0"/>
-                <a:cs typeface="Calibri" panose="020F0502020204030204" pitchFamily="34" charset="0"/>
-              </a:rPr>
-              <a:t>est</a:t>
-            </a:r>
-            <a:r>
-              <a:rPr lang="en-GB" sz="1800" kern="0" dirty="0">
-                <a:solidFill>
-                  <a:sysClr val="windowText" lastClr="000000"/>
-                </a:solidFill>
-                <a:latin typeface="Calibri" panose="020F0502020204030204" pitchFamily="34" charset="0"/>
-                <a:cs typeface="Calibri" panose="020F0502020204030204" pitchFamily="34" charset="0"/>
-              </a:rPr>
-              <a:t> </a:t>
-            </a:r>
-            <a:r>
-              <a:rPr lang="en-GB" sz="1800" kern="0" dirty="0" err="1">
-                <a:solidFill>
-                  <a:sysClr val="windowText" lastClr="000000"/>
-                </a:solidFill>
-                <a:latin typeface="Calibri" panose="020F0502020204030204" pitchFamily="34" charset="0"/>
-                <a:cs typeface="Calibri" panose="020F0502020204030204" pitchFamily="34" charset="0"/>
-              </a:rPr>
-              <a:t>occupée</a:t>
-            </a:r>
-            <a:r>
-              <a:rPr lang="en-GB" sz="1800" kern="0" dirty="0">
-                <a:solidFill>
-                  <a:sysClr val="windowText" lastClr="000000"/>
-                </a:solidFill>
-                <a:latin typeface="Calibri" panose="020F0502020204030204" pitchFamily="34" charset="0"/>
-                <a:cs typeface="Calibri" panose="020F0502020204030204" pitchFamily="34" charset="0"/>
-              </a:rPr>
-              <a:t> :</a:t>
+              <a:t>Si la position est en-dehors de la grille ou si elle est occupée :</a:t>
             </a:r>
           </a:p>
           <a:p>
@@ -12469,132 +12679,15 @@
               <a:buNone/>
             </a:pPr>
             <a:r>
-              <a:rPr lang="en-GB" sz="1800" kern="0" dirty="0">
+              <a:rPr lang="fr-FR" sz="1800" kern="0" dirty="0" smtClean="0">
                 <a:solidFill>
                   <a:sysClr val="windowText" lastClr="000000"/>
                 </a:solidFill>
                 <a:latin typeface="Calibri" panose="020F0502020204030204" pitchFamily="34" charset="0"/>
                 <a:cs typeface="Calibri" panose="020F0502020204030204" pitchFamily="34" charset="0"/>
               </a:rPr>
-              <a:t>	Le coup </a:t>
-            </a:r>
-            <a:r>
-              <a:rPr lang="en-GB" sz="1800" kern="0" dirty="0" err="1">
-                <a:solidFill>
-                  <a:sysClr val="windowText" lastClr="000000"/>
-                </a:solidFill>
-                <a:latin typeface="Calibri" panose="020F0502020204030204" pitchFamily="34" charset="0"/>
-                <a:cs typeface="Calibri" panose="020F0502020204030204" pitchFamily="34" charset="0"/>
-              </a:rPr>
-              <a:t>est</a:t>
-            </a:r>
-            <a:r>
-              <a:rPr lang="en-GB" sz="1800" kern="0" dirty="0">
-                <a:solidFill>
-                  <a:sysClr val="windowText" lastClr="000000"/>
-                </a:solidFill>
-                <a:latin typeface="Calibri" panose="020F0502020204030204" pitchFamily="34" charset="0"/>
-                <a:cs typeface="Calibri" panose="020F0502020204030204" pitchFamily="34" charset="0"/>
-              </a:rPr>
-              <a:t> </a:t>
-            </a:r>
-            <a:r>
-              <a:rPr lang="en-GB" sz="1800" kern="0" dirty="0" err="1">
-                <a:solidFill>
-                  <a:sysClr val="windowText" lastClr="000000"/>
-                </a:solidFill>
-                <a:latin typeface="Calibri" panose="020F0502020204030204" pitchFamily="34" charset="0"/>
-                <a:cs typeface="Calibri" panose="020F0502020204030204" pitchFamily="34" charset="0"/>
-              </a:rPr>
-              <a:t>invalidé</a:t>
-            </a:r>
-            <a:r>
-              <a:rPr lang="en-GB" sz="1800" kern="0" dirty="0">
-                <a:solidFill>
-                  <a:sysClr val="windowText" lastClr="000000"/>
-                </a:solidFill>
-                <a:latin typeface="Calibri" panose="020F0502020204030204" pitchFamily="34" charset="0"/>
-                <a:cs typeface="Calibri" panose="020F0502020204030204" pitchFamily="34" charset="0"/>
-              </a:rPr>
-              <a:t>, </a:t>
-            </a:r>
-            <a:r>
-              <a:rPr lang="en-GB" sz="1800" kern="0" dirty="0" err="1">
-                <a:solidFill>
-                  <a:sysClr val="windowText" lastClr="000000"/>
-                </a:solidFill>
-                <a:latin typeface="Calibri" panose="020F0502020204030204" pitchFamily="34" charset="0"/>
-                <a:cs typeface="Calibri" panose="020F0502020204030204" pitchFamily="34" charset="0"/>
-              </a:rPr>
-              <a:t>une</a:t>
-            </a:r>
-            <a:r>
-              <a:rPr lang="en-GB" sz="1800" kern="0" dirty="0">
-                <a:solidFill>
-                  <a:sysClr val="windowText" lastClr="000000"/>
-                </a:solidFill>
-                <a:latin typeface="Calibri" panose="020F0502020204030204" pitchFamily="34" charset="0"/>
-                <a:cs typeface="Calibri" panose="020F0502020204030204" pitchFamily="34" charset="0"/>
-              </a:rPr>
-              <a:t> </a:t>
-            </a:r>
-            <a:r>
-              <a:rPr lang="en-GB" sz="1800" kern="0" dirty="0" err="1">
-                <a:solidFill>
-                  <a:sysClr val="windowText" lastClr="000000"/>
-                </a:solidFill>
-                <a:latin typeface="Calibri" panose="020F0502020204030204" pitchFamily="34" charset="0"/>
-                <a:cs typeface="Calibri" panose="020F0502020204030204" pitchFamily="34" charset="0"/>
-              </a:rPr>
-              <a:t>liste</a:t>
-            </a:r>
-            <a:r>
-              <a:rPr lang="en-GB" sz="1800" kern="0" dirty="0">
-                <a:solidFill>
-                  <a:sysClr val="windowText" lastClr="000000"/>
-                </a:solidFill>
-                <a:latin typeface="Calibri" panose="020F0502020204030204" pitchFamily="34" charset="0"/>
-                <a:cs typeface="Calibri" panose="020F0502020204030204" pitchFamily="34" charset="0"/>
-              </a:rPr>
-              <a:t> vide </a:t>
-            </a:r>
-            <a:r>
-              <a:rPr lang="en-GB" sz="1800" kern="0" dirty="0" err="1">
-                <a:solidFill>
-                  <a:sysClr val="windowText" lastClr="000000"/>
-                </a:solidFill>
-                <a:latin typeface="Calibri" panose="020F0502020204030204" pitchFamily="34" charset="0"/>
-                <a:cs typeface="Calibri" panose="020F0502020204030204" pitchFamily="34" charset="0"/>
-              </a:rPr>
-              <a:t>est</a:t>
-            </a:r>
-            <a:r>
-              <a:rPr lang="en-GB" sz="1800" kern="0" dirty="0">
-                <a:solidFill>
-                  <a:sysClr val="windowText" lastClr="000000"/>
-                </a:solidFill>
-                <a:latin typeface="Calibri" panose="020F0502020204030204" pitchFamily="34" charset="0"/>
-                <a:cs typeface="Calibri" panose="020F0502020204030204" pitchFamily="34" charset="0"/>
-              </a:rPr>
-              <a:t> </a:t>
-            </a:r>
-            <a:r>
-              <a:rPr lang="en-GB" sz="1800" kern="0" dirty="0" err="1">
-                <a:solidFill>
-                  <a:sysClr val="windowText" lastClr="000000"/>
-                </a:solidFill>
-                <a:latin typeface="Calibri" panose="020F0502020204030204" pitchFamily="34" charset="0"/>
-                <a:cs typeface="Calibri" panose="020F0502020204030204" pitchFamily="34" charset="0"/>
-              </a:rPr>
-              <a:t>renvoyée</a:t>
-            </a:r>
-            <a:endParaRPr lang="en-GB" sz="1800" kern="0" dirty="0">
-              <a:solidFill>
-                <a:sysClr val="windowText" lastClr="000000"/>
-              </a:solidFill>
-              <a:latin typeface="Calibri" panose="020F0502020204030204" pitchFamily="34" charset="0"/>
-              <a:cs typeface="Calibri" panose="020F0502020204030204" pitchFamily="34" charset="0"/>
-            </a:endParaRPr>
+              <a:t>	Le coup est invalidé, une liste vide est renvoyée</a:t>
+            </a:r>
           </a:p>
           <a:p>
             <a:pPr marL="0" indent="0">
@@ -12604,34 +12697,14 @@
               <a:buNone/>
             </a:pPr>
             <a:r>
-              <a:rPr lang="en-GB" sz="1800" kern="0" dirty="0">
+              <a:rPr lang="fr-FR" sz="1800" kern="0" dirty="0" smtClean="0">
                 <a:solidFill>
                   <a:schemeClr val="tx2"/>
                 </a:solidFill>
                 <a:latin typeface="Calibri" panose="020F0502020204030204" pitchFamily="34" charset="0"/>
                 <a:cs typeface="Calibri" panose="020F0502020204030204" pitchFamily="34" charset="0"/>
               </a:rPr>
-              <a:t>Pour </a:t>
-            </a:r>
-            <a:r>
-              <a:rPr lang="en-GB" sz="1800" kern="0" dirty="0" err="1">
-                <a:solidFill>
-                  <a:schemeClr val="tx2"/>
-                </a:solidFill>
-                <a:latin typeface="Calibri" panose="020F0502020204030204" pitchFamily="34" charset="0"/>
-                <a:cs typeface="Calibri" panose="020F0502020204030204" pitchFamily="34" charset="0"/>
-              </a:rPr>
-              <a:t>chaque</a:t>
-            </a:r>
-            <a:r>
-              <a:rPr lang="en-GB" sz="1800" kern="0" dirty="0">
-                <a:solidFill>
-                  <a:schemeClr val="tx2"/>
-                </a:solidFill>
-                <a:latin typeface="Calibri" panose="020F0502020204030204" pitchFamily="34" charset="0"/>
-                <a:cs typeface="Calibri" panose="020F0502020204030204" pitchFamily="34" charset="0"/>
-              </a:rPr>
-              <a:t> direction:</a:t>
+              <a:t>Pour chaque direction:</a:t>
             </a:r>
           </a:p>
           <a:p>
@@ -12642,7 +12715,7 @@
               <a:buNone/>
             </a:pPr>
             <a:r>
-              <a:rPr lang="en-GB" sz="1800" kern="0" dirty="0">
+              <a:rPr lang="fr-FR" sz="1800" kern="0" dirty="0" smtClean="0">
                 <a:solidFill>
                   <a:sysClr val="windowText" lastClr="000000"/>
                 </a:solidFill>
@@ -12652,127 +12725,17 @@
               <a:t>	</a:t>
             </a:r>
             <a:r>
-              <a:rPr lang="en-GB" sz="1800" kern="0" dirty="0" err="1">
+              <a:rPr lang="fr-FR" sz="1800" kern="0" dirty="0" smtClean="0">
                 <a:solidFill>
                   <a:srgbClr val="0070C0"/>
                 </a:solidFill>
                 <a:latin typeface="Calibri" panose="020F0502020204030204" pitchFamily="34" charset="0"/>
                 <a:cs typeface="Calibri" panose="020F0502020204030204" pitchFamily="34" charset="0"/>
               </a:rPr>
-              <a:t>Tant</a:t>
-            </a:r>
-            <a:r>
-              <a:rPr lang="en-GB" sz="1800" kern="0" dirty="0">
-                <a:solidFill>
-                  <a:srgbClr val="0070C0"/>
-                </a:solidFill>
-                <a:latin typeface="Calibri" panose="020F0502020204030204" pitchFamily="34" charset="0"/>
-                <a:cs typeface="Calibri" panose="020F0502020204030204" pitchFamily="34" charset="0"/>
-              </a:rPr>
-              <a:t> que </a:t>
-            </a:r>
-            <a:r>
-              <a:rPr lang="en-GB" sz="1800" kern="0" dirty="0" err="1">
-                <a:solidFill>
-                  <a:srgbClr val="0070C0"/>
-                </a:solidFill>
-                <a:latin typeface="Calibri" panose="020F0502020204030204" pitchFamily="34" charset="0"/>
-                <a:cs typeface="Calibri" panose="020F0502020204030204" pitchFamily="34" charset="0"/>
-              </a:rPr>
-              <a:t>l’on</a:t>
-            </a:r>
-            <a:r>
-              <a:rPr lang="en-GB" sz="1800" kern="0" dirty="0">
-                <a:solidFill>
-                  <a:srgbClr val="0070C0"/>
-                </a:solidFill>
-                <a:latin typeface="Calibri" panose="020F0502020204030204" pitchFamily="34" charset="0"/>
-                <a:cs typeface="Calibri" panose="020F0502020204030204" pitchFamily="34" charset="0"/>
-              </a:rPr>
-              <a:t> </a:t>
-            </a:r>
-            <a:r>
-              <a:rPr lang="en-GB" sz="1800" kern="0" dirty="0" err="1">
-                <a:solidFill>
-                  <a:srgbClr val="0070C0"/>
-                </a:solidFill>
-                <a:latin typeface="Calibri" panose="020F0502020204030204" pitchFamily="34" charset="0"/>
-                <a:cs typeface="Calibri" panose="020F0502020204030204" pitchFamily="34" charset="0"/>
-              </a:rPr>
-              <a:t>n’a</a:t>
-            </a:r>
-            <a:r>
-              <a:rPr lang="en-GB" sz="1800" kern="0" dirty="0">
-                <a:solidFill>
-                  <a:srgbClr val="0070C0"/>
-                </a:solidFill>
-                <a:latin typeface="Calibri" panose="020F0502020204030204" pitchFamily="34" charset="0"/>
-                <a:cs typeface="Calibri" panose="020F0502020204030204" pitchFamily="34" charset="0"/>
-              </a:rPr>
-              <a:t> pas </a:t>
-            </a:r>
-            <a:r>
-              <a:rPr lang="en-GB" sz="1800" kern="0" dirty="0" err="1">
-                <a:solidFill>
-                  <a:srgbClr val="0070C0"/>
-                </a:solidFill>
-                <a:latin typeface="Calibri" panose="020F0502020204030204" pitchFamily="34" charset="0"/>
-                <a:cs typeface="Calibri" panose="020F0502020204030204" pitchFamily="34" charset="0"/>
-              </a:rPr>
-              <a:t>fini</a:t>
-            </a:r>
-            <a:r>
-              <a:rPr lang="en-GB" sz="1800" kern="0" dirty="0">
-                <a:solidFill>
-                  <a:srgbClr val="0070C0"/>
-                </a:solidFill>
-                <a:latin typeface="Calibri" panose="020F0502020204030204" pitchFamily="34" charset="0"/>
-                <a:cs typeface="Calibri" panose="020F0502020204030204" pitchFamily="34" charset="0"/>
-              </a:rPr>
-              <a:t> </a:t>
-            </a:r>
-            <a:r>
-              <a:rPr lang="en-GB" sz="1800" kern="0" dirty="0" err="1">
-                <a:solidFill>
-                  <a:srgbClr val="0070C0"/>
-                </a:solidFill>
-                <a:latin typeface="Calibri" panose="020F0502020204030204" pitchFamily="34" charset="0"/>
-                <a:cs typeface="Calibri" panose="020F0502020204030204" pitchFamily="34" charset="0"/>
-              </a:rPr>
-              <a:t>dans</a:t>
-            </a:r>
-            <a:r>
-              <a:rPr lang="en-GB" sz="1800" kern="0" dirty="0">
-                <a:solidFill>
-                  <a:srgbClr val="0070C0"/>
-                </a:solidFill>
-                <a:latin typeface="Calibri" panose="020F0502020204030204" pitchFamily="34" charset="0"/>
-                <a:cs typeface="Calibri" panose="020F0502020204030204" pitchFamily="34" charset="0"/>
-              </a:rPr>
-              <a:t> </a:t>
-            </a:r>
-            <a:r>
-              <a:rPr lang="en-GB" sz="1800" kern="0" dirty="0" err="1">
-                <a:solidFill>
-                  <a:srgbClr val="0070C0"/>
-                </a:solidFill>
-                <a:latin typeface="Calibri" panose="020F0502020204030204" pitchFamily="34" charset="0"/>
-                <a:cs typeface="Calibri" panose="020F0502020204030204" pitchFamily="34" charset="0"/>
-              </a:rPr>
-              <a:t>cette</a:t>
-            </a:r>
-            <a:r>
-              <a:rPr lang="en-GB" sz="1800" kern="0" dirty="0">
-                <a:solidFill>
-                  <a:srgbClr val="0070C0"/>
-                </a:solidFill>
-                <a:latin typeface="Calibri" panose="020F0502020204030204" pitchFamily="34" charset="0"/>
-                <a:cs typeface="Calibri" panose="020F0502020204030204" pitchFamily="34" charset="0"/>
-              </a:rPr>
-              <a:t> direction </a:t>
-            </a:r>
-            <a:r>
-              <a:rPr lang="en-GB" sz="1800" kern="0" dirty="0">
+              <a:t>Tant que l’on n’a pas fini dans cette direction </a:t>
+            </a:r>
+            <a:r>
+              <a:rPr lang="fr-FR" sz="1800" kern="0" dirty="0" smtClean="0">
                 <a:solidFill>
                   <a:sysClr val="windowText" lastClr="000000"/>
                 </a:solidFill>
@@ -12790,7 +12753,7 @@
               <a:buNone/>
             </a:pPr>
             <a:r>
-              <a:rPr lang="en-GB" sz="1800" kern="0" dirty="0">
+              <a:rPr lang="fr-FR" sz="1800" kern="0" dirty="0" smtClean="0">
                 <a:solidFill>
                   <a:sysClr val="windowText" lastClr="000000"/>
                 </a:solidFill>
@@ -12800,74 +12763,34 @@
               <a:t>		</a:t>
             </a:r>
             <a:r>
-              <a:rPr lang="en-GB" sz="1800" kern="0" dirty="0">
+              <a:rPr lang="fr-FR" sz="1800" kern="0" dirty="0" smtClean="0">
                 <a:solidFill>
                   <a:srgbClr val="00B050"/>
                 </a:solidFill>
                 <a:latin typeface="Calibri" panose="020F0502020204030204" pitchFamily="34" charset="0"/>
                 <a:cs typeface="Calibri" panose="020F0502020204030204" pitchFamily="34" charset="0"/>
               </a:rPr>
-              <a:t>Si </a:t>
-            </a:r>
-            <a:r>
-              <a:rPr lang="en-GB" sz="1800" kern="0" dirty="0" err="1">
+              <a:t>Si cette boucle s’</a:t>
+            </a:r>
+            <a:r>
+              <a:rPr lang="fr-FR" sz="1800" kern="0" dirty="0" err="1" smtClean="0">
                 <a:solidFill>
                   <a:srgbClr val="00B050"/>
                 </a:solidFill>
                 <a:latin typeface="Calibri" panose="020F0502020204030204" pitchFamily="34" charset="0"/>
                 <a:cs typeface="Calibri" panose="020F0502020204030204" pitchFamily="34" charset="0"/>
               </a:rPr>
-              <a:t>cette</a:t>
-            </a:r>
-            <a:r>
-              <a:rPr lang="en-GB" sz="1800" kern="0" dirty="0">
+              <a:t>execute</a:t>
+            </a:r>
+            <a:r>
+              <a:rPr lang="fr-FR" sz="1800" kern="0" dirty="0" smtClean="0">
                 <a:solidFill>
                   <a:srgbClr val="00B050"/>
                 </a:solidFill>
                 <a:latin typeface="Calibri" panose="020F0502020204030204" pitchFamily="34" charset="0"/>
                 <a:cs typeface="Calibri" panose="020F0502020204030204" pitchFamily="34" charset="0"/>
               </a:rPr>
-              <a:t> boucle </a:t>
-            </a:r>
-            <a:r>
-              <a:rPr lang="en-GB" sz="1800" kern="0" dirty="0" err="1">
-                <a:solidFill>
-                  <a:srgbClr val="00B050"/>
-                </a:solidFill>
-                <a:latin typeface="Calibri" panose="020F0502020204030204" pitchFamily="34" charset="0"/>
-                <a:cs typeface="Calibri" panose="020F0502020204030204" pitchFamily="34" charset="0"/>
-              </a:rPr>
-              <a:t>s’execute</a:t>
-            </a:r>
-            <a:r>
-              <a:rPr lang="en-GB" sz="1800" kern="0" dirty="0">
-                <a:solidFill>
-                  <a:srgbClr val="00B050"/>
-                </a:solidFill>
-                <a:latin typeface="Calibri" panose="020F0502020204030204" pitchFamily="34" charset="0"/>
-                <a:cs typeface="Calibri" panose="020F0502020204030204" pitchFamily="34" charset="0"/>
-              </a:rPr>
-              <a:t> pour la première </a:t>
-            </a:r>
-            <a:r>
-              <a:rPr lang="en-GB" sz="1800" kern="0" dirty="0" err="1">
-                <a:solidFill>
-                  <a:srgbClr val="00B050"/>
-                </a:solidFill>
-                <a:latin typeface="Calibri" panose="020F0502020204030204" pitchFamily="34" charset="0"/>
-                <a:cs typeface="Calibri" panose="020F0502020204030204" pitchFamily="34" charset="0"/>
-              </a:rPr>
-              <a:t>fois</a:t>
-            </a:r>
-            <a:r>
-              <a:rPr lang="en-GB" sz="1800" kern="0" dirty="0">
-                <a:solidFill>
-                  <a:srgbClr val="00B050"/>
-                </a:solidFill>
-                <a:latin typeface="Calibri" panose="020F0502020204030204" pitchFamily="34" charset="0"/>
-                <a:cs typeface="Calibri" panose="020F0502020204030204" pitchFamily="34" charset="0"/>
-              </a:rPr>
-              <a:t>:</a:t>
+              <a:t> pour la première fois:</a:t>
             </a:r>
           </a:p>
           <a:p>
@@ -12878,34 +12801,14 @@
               <a:buNone/>
             </a:pPr>
             <a:r>
-              <a:rPr lang="en-GB" sz="1800" kern="0" dirty="0">
+              <a:rPr lang="fr-FR" sz="1800" kern="0" dirty="0" smtClean="0">
                 <a:solidFill>
                   <a:sysClr val="windowText" lastClr="000000"/>
                 </a:solidFill>
                 <a:latin typeface="Calibri" panose="020F0502020204030204" pitchFamily="34" charset="0"/>
                 <a:cs typeface="Calibri" panose="020F0502020204030204" pitchFamily="34" charset="0"/>
               </a:rPr>
-              <a:t>			</a:t>
-            </a:r>
-            <a:r>
-              <a:rPr lang="en-GB" sz="1800" kern="0" dirty="0" err="1">
-                <a:solidFill>
-                  <a:sysClr val="windowText" lastClr="000000"/>
-                </a:solidFill>
-                <a:latin typeface="Calibri" panose="020F0502020204030204" pitchFamily="34" charset="0"/>
-                <a:cs typeface="Calibri" panose="020F0502020204030204" pitchFamily="34" charset="0"/>
-              </a:rPr>
-              <a:t>Incrémentation</a:t>
-            </a:r>
-            <a:r>
-              <a:rPr lang="en-GB" sz="1800" kern="0" dirty="0">
-                <a:solidFill>
-                  <a:sysClr val="windowText" lastClr="000000"/>
-                </a:solidFill>
-                <a:latin typeface="Calibri" panose="020F0502020204030204" pitchFamily="34" charset="0"/>
-                <a:cs typeface="Calibri" panose="020F0502020204030204" pitchFamily="34" charset="0"/>
-              </a:rPr>
-              <a:t> de la position</a:t>
+              <a:t>			Incrémentation de la position</a:t>
             </a:r>
           </a:p>
           <a:p>
@@ -12916,74 +12819,14 @@
               <a:buNone/>
             </a:pPr>
             <a:r>
-              <a:rPr lang="en-GB" sz="1800" kern="0" dirty="0">
+              <a:rPr lang="fr-FR" sz="1800" kern="0" dirty="0" smtClean="0">
                 <a:solidFill>
                   <a:sysClr val="windowText" lastClr="000000"/>
                 </a:solidFill>
                 <a:latin typeface="Calibri" panose="020F0502020204030204" pitchFamily="34" charset="0"/>
                 <a:cs typeface="Calibri" panose="020F0502020204030204" pitchFamily="34" charset="0"/>
               </a:rPr>
-              <a:t>			Si la position </a:t>
-            </a:r>
-            <a:r>
-              <a:rPr lang="en-GB" sz="1800" kern="0" dirty="0" err="1">
-                <a:solidFill>
-                  <a:sysClr val="windowText" lastClr="000000"/>
-                </a:solidFill>
-                <a:latin typeface="Calibri" panose="020F0502020204030204" pitchFamily="34" charset="0"/>
-                <a:cs typeface="Calibri" panose="020F0502020204030204" pitchFamily="34" charset="0"/>
-              </a:rPr>
-              <a:t>est</a:t>
-            </a:r>
-            <a:r>
-              <a:rPr lang="en-GB" sz="1800" kern="0" dirty="0">
-                <a:solidFill>
-                  <a:sysClr val="windowText" lastClr="000000"/>
-                </a:solidFill>
-                <a:latin typeface="Calibri" panose="020F0502020204030204" pitchFamily="34" charset="0"/>
-                <a:cs typeface="Calibri" panose="020F0502020204030204" pitchFamily="34" charset="0"/>
-              </a:rPr>
-              <a:t> </a:t>
-            </a:r>
-            <a:r>
-              <a:rPr lang="en-GB" sz="1800" kern="0" dirty="0" err="1">
-                <a:solidFill>
-                  <a:sysClr val="windowText" lastClr="000000"/>
-                </a:solidFill>
-                <a:latin typeface="Calibri" panose="020F0502020204030204" pitchFamily="34" charset="0"/>
-                <a:cs typeface="Calibri" panose="020F0502020204030204" pitchFamily="34" charset="0"/>
-              </a:rPr>
-              <a:t>occupée</a:t>
-            </a:r>
-            <a:r>
-              <a:rPr lang="en-GB" sz="1800" kern="0" dirty="0">
-                <a:solidFill>
-                  <a:sysClr val="windowText" lastClr="000000"/>
-                </a:solidFill>
-                <a:latin typeface="Calibri" panose="020F0502020204030204" pitchFamily="34" charset="0"/>
-                <a:cs typeface="Calibri" panose="020F0502020204030204" pitchFamily="34" charset="0"/>
-              </a:rPr>
-              <a:t> par un pion de couleur </a:t>
-            </a:r>
-            <a:r>
-              <a:rPr lang="en-GB" sz="1800" kern="0" dirty="0" err="1">
-                <a:solidFill>
-                  <a:sysClr val="windowText" lastClr="000000"/>
-                </a:solidFill>
-                <a:latin typeface="Calibri" panose="020F0502020204030204" pitchFamily="34" charset="0"/>
-                <a:cs typeface="Calibri" panose="020F0502020204030204" pitchFamily="34" charset="0"/>
-              </a:rPr>
-              <a:t>différente</a:t>
-            </a:r>
-            <a:r>
-              <a:rPr lang="en-GB" sz="1800" kern="0" dirty="0">
-                <a:solidFill>
-                  <a:sysClr val="windowText" lastClr="000000"/>
-                </a:solidFill>
-                <a:latin typeface="Calibri" panose="020F0502020204030204" pitchFamily="34" charset="0"/>
-                <a:cs typeface="Calibri" panose="020F0502020204030204" pitchFamily="34" charset="0"/>
-              </a:rPr>
-              <a:t>:</a:t>
+              <a:t>			Si la position est occupée par un pion de couleur différente:</a:t>
             </a:r>
           </a:p>
           <a:p>
@@ -12994,54 +12837,14 @@
               <a:buNone/>
             </a:pPr>
             <a:r>
-              <a:rPr lang="en-GB" sz="1800" kern="0" dirty="0">
+              <a:rPr lang="fr-FR" sz="1800" kern="0" dirty="0" smtClean="0">
                 <a:solidFill>
                   <a:sysClr val="windowText" lastClr="000000"/>
                 </a:solidFill>
                 <a:latin typeface="Calibri" panose="020F0502020204030204" pitchFamily="34" charset="0"/>
                 <a:cs typeface="Calibri" panose="020F0502020204030204" pitchFamily="34" charset="0"/>
               </a:rPr>
-              <a:t>				On </a:t>
-            </a:r>
-            <a:r>
-              <a:rPr lang="en-GB" sz="1800" kern="0" dirty="0" err="1">
-                <a:solidFill>
-                  <a:sysClr val="windowText" lastClr="000000"/>
-                </a:solidFill>
-                <a:latin typeface="Calibri" panose="020F0502020204030204" pitchFamily="34" charset="0"/>
-                <a:cs typeface="Calibri" panose="020F0502020204030204" pitchFamily="34" charset="0"/>
-              </a:rPr>
-              <a:t>enregistre</a:t>
-            </a:r>
-            <a:r>
-              <a:rPr lang="en-GB" sz="1800" kern="0" dirty="0">
-                <a:solidFill>
-                  <a:sysClr val="windowText" lastClr="000000"/>
-                </a:solidFill>
-                <a:latin typeface="Calibri" panose="020F0502020204030204" pitchFamily="34" charset="0"/>
-                <a:cs typeface="Calibri" panose="020F0502020204030204" pitchFamily="34" charset="0"/>
-              </a:rPr>
-              <a:t> </a:t>
-            </a:r>
-            <a:r>
-              <a:rPr lang="en-GB" sz="1800" kern="0" dirty="0" err="1">
-                <a:solidFill>
-                  <a:sysClr val="windowText" lastClr="000000"/>
-                </a:solidFill>
-                <a:latin typeface="Calibri" panose="020F0502020204030204" pitchFamily="34" charset="0"/>
-                <a:cs typeface="Calibri" panose="020F0502020204030204" pitchFamily="34" charset="0"/>
-              </a:rPr>
-              <a:t>cette</a:t>
-            </a:r>
-            <a:r>
-              <a:rPr lang="en-GB" sz="1800" kern="0" dirty="0">
-                <a:solidFill>
-                  <a:sysClr val="windowText" lastClr="000000"/>
-                </a:solidFill>
-                <a:latin typeface="Calibri" panose="020F0502020204030204" pitchFamily="34" charset="0"/>
-                <a:cs typeface="Calibri" panose="020F0502020204030204" pitchFamily="34" charset="0"/>
-              </a:rPr>
-              <a:t> position</a:t>
+              <a:t>				On enregistre cette position</a:t>
             </a:r>
           </a:p>
           <a:p>
@@ -13052,94 +12855,14 @@
               <a:buNone/>
             </a:pPr>
             <a:r>
-              <a:rPr lang="en-GB" sz="1800" kern="0" dirty="0">
+              <a:rPr lang="fr-FR" sz="1800" kern="0" dirty="0" smtClean="0">
                 <a:solidFill>
                   <a:sysClr val="windowText" lastClr="000000"/>
                 </a:solidFill>
                 <a:latin typeface="Calibri" panose="020F0502020204030204" pitchFamily="34" charset="0"/>
                 <a:cs typeface="Calibri" panose="020F0502020204030204" pitchFamily="34" charset="0"/>
               </a:rPr>
-              <a:t>			</a:t>
-            </a:r>
-            <a:r>
-              <a:rPr lang="en-GB" sz="1800" kern="0" dirty="0" err="1">
-                <a:solidFill>
-                  <a:sysClr val="windowText" lastClr="000000"/>
-                </a:solidFill>
-                <a:latin typeface="Calibri" panose="020F0502020204030204" pitchFamily="34" charset="0"/>
-                <a:cs typeface="Calibri" panose="020F0502020204030204" pitchFamily="34" charset="0"/>
-              </a:rPr>
-              <a:t>Sinon</a:t>
-            </a:r>
-            <a:r>
-              <a:rPr lang="en-GB" sz="1800" kern="0" dirty="0">
-                <a:solidFill>
-                  <a:sysClr val="windowText" lastClr="000000"/>
-                </a:solidFill>
-                <a:latin typeface="Calibri" panose="020F0502020204030204" pitchFamily="34" charset="0"/>
-                <a:cs typeface="Calibri" panose="020F0502020204030204" pitchFamily="34" charset="0"/>
-              </a:rPr>
-              <a:t>: On a </a:t>
-            </a:r>
-            <a:r>
-              <a:rPr lang="en-GB" sz="1800" kern="0" dirty="0" err="1">
-                <a:solidFill>
-                  <a:sysClr val="windowText" lastClr="000000"/>
-                </a:solidFill>
-                <a:latin typeface="Calibri" panose="020F0502020204030204" pitchFamily="34" charset="0"/>
-                <a:cs typeface="Calibri" panose="020F0502020204030204" pitchFamily="34" charset="0"/>
-              </a:rPr>
-              <a:t>fini</a:t>
-            </a:r>
-            <a:r>
-              <a:rPr lang="en-GB" sz="1800" kern="0" dirty="0">
-                <a:solidFill>
-                  <a:sysClr val="windowText" lastClr="000000"/>
-                </a:solidFill>
-                <a:latin typeface="Calibri" panose="020F0502020204030204" pitchFamily="34" charset="0"/>
-                <a:cs typeface="Calibri" panose="020F0502020204030204" pitchFamily="34" charset="0"/>
-              </a:rPr>
-              <a:t> </a:t>
-            </a:r>
-            <a:r>
-              <a:rPr lang="en-GB" sz="1800" kern="0" dirty="0" err="1">
-                <a:solidFill>
-                  <a:sysClr val="windowText" lastClr="000000"/>
-                </a:solidFill>
-                <a:latin typeface="Calibri" panose="020F0502020204030204" pitchFamily="34" charset="0"/>
-                <a:cs typeface="Calibri" panose="020F0502020204030204" pitchFamily="34" charset="0"/>
-              </a:rPr>
-              <a:t>dans</a:t>
-            </a:r>
-            <a:r>
-              <a:rPr lang="en-GB" sz="1800" kern="0" dirty="0">
-                <a:solidFill>
-                  <a:sysClr val="windowText" lastClr="000000"/>
-                </a:solidFill>
-                <a:latin typeface="Calibri" panose="020F0502020204030204" pitchFamily="34" charset="0"/>
-                <a:cs typeface="Calibri" panose="020F0502020204030204" pitchFamily="34" charset="0"/>
-              </a:rPr>
-              <a:t> </a:t>
-            </a:r>
-            <a:r>
-              <a:rPr lang="en-GB" sz="1800" kern="0" dirty="0" err="1">
-                <a:solidFill>
-                  <a:sysClr val="windowText" lastClr="000000"/>
-                </a:solidFill>
-                <a:latin typeface="Calibri" panose="020F0502020204030204" pitchFamily="34" charset="0"/>
-                <a:cs typeface="Calibri" panose="020F0502020204030204" pitchFamily="34" charset="0"/>
-              </a:rPr>
-              <a:t>cette</a:t>
-            </a:r>
-            <a:r>
-              <a:rPr lang="en-GB" sz="1800" kern="0" dirty="0">
-                <a:solidFill>
-                  <a:sysClr val="windowText" lastClr="000000"/>
-                </a:solidFill>
-                <a:latin typeface="Calibri" panose="020F0502020204030204" pitchFamily="34" charset="0"/>
-                <a:cs typeface="Calibri" panose="020F0502020204030204" pitchFamily="34" charset="0"/>
-              </a:rPr>
-              <a:t> direction</a:t>
+              <a:t>			Sinon: On a fini dans cette direction</a:t>
             </a:r>
           </a:p>
           <a:p>
@@ -13150,7 +12873,7 @@
               <a:buNone/>
             </a:pPr>
             <a:r>
-              <a:rPr lang="en-GB" sz="1800" kern="0" dirty="0">
+              <a:rPr lang="fr-FR" sz="1800" kern="0" dirty="0" smtClean="0">
                 <a:solidFill>
                   <a:sysClr val="windowText" lastClr="000000"/>
                 </a:solidFill>
@@ -13160,24 +12883,14 @@
               <a:t>		</a:t>
             </a:r>
             <a:r>
-              <a:rPr lang="en-GB" sz="1800" kern="0" dirty="0" err="1">
+              <a:rPr lang="fr-FR" sz="1800" kern="0" dirty="0" smtClean="0">
                 <a:solidFill>
                   <a:srgbClr val="00B050"/>
                 </a:solidFill>
                 <a:latin typeface="Calibri" panose="020F0502020204030204" pitchFamily="34" charset="0"/>
                 <a:cs typeface="Calibri" panose="020F0502020204030204" pitchFamily="34" charset="0"/>
               </a:rPr>
-              <a:t>Sinon</a:t>
-            </a:r>
-            <a:r>
-              <a:rPr lang="en-GB" sz="1800" kern="0" dirty="0">
-                <a:solidFill>
-                  <a:srgbClr val="00B050"/>
-                </a:solidFill>
-                <a:latin typeface="Calibri" panose="020F0502020204030204" pitchFamily="34" charset="0"/>
-                <a:cs typeface="Calibri" panose="020F0502020204030204" pitchFamily="34" charset="0"/>
-              </a:rPr>
-              <a:t>:</a:t>
+              <a:t>Sinon:</a:t>
             </a:r>
           </a:p>
           <a:p>
@@ -13188,74 +12901,14 @@
               <a:buNone/>
             </a:pPr>
             <a:r>
-              <a:rPr lang="en-GB" sz="1800" kern="0" dirty="0">
+              <a:rPr lang="fr-FR" sz="1800" kern="0" dirty="0" smtClean="0">
                 <a:solidFill>
                   <a:sysClr val="windowText" lastClr="000000"/>
                 </a:solidFill>
                 <a:latin typeface="Calibri" panose="020F0502020204030204" pitchFamily="34" charset="0"/>
                 <a:cs typeface="Calibri" panose="020F0502020204030204" pitchFamily="34" charset="0"/>
               </a:rPr>
-              <a:t>			Si la position </a:t>
-            </a:r>
-            <a:r>
-              <a:rPr lang="en-GB" sz="1800" kern="0" dirty="0" err="1">
-                <a:solidFill>
-                  <a:sysClr val="windowText" lastClr="000000"/>
-                </a:solidFill>
-                <a:latin typeface="Calibri" panose="020F0502020204030204" pitchFamily="34" charset="0"/>
-                <a:cs typeface="Calibri" panose="020F0502020204030204" pitchFamily="34" charset="0"/>
-              </a:rPr>
-              <a:t>est</a:t>
-            </a:r>
-            <a:r>
-              <a:rPr lang="en-GB" sz="1800" kern="0" dirty="0">
-                <a:solidFill>
-                  <a:sysClr val="windowText" lastClr="000000"/>
-                </a:solidFill>
-                <a:latin typeface="Calibri" panose="020F0502020204030204" pitchFamily="34" charset="0"/>
-                <a:cs typeface="Calibri" panose="020F0502020204030204" pitchFamily="34" charset="0"/>
-              </a:rPr>
-              <a:t> </a:t>
-            </a:r>
-            <a:r>
-              <a:rPr lang="en-GB" sz="1800" kern="0" dirty="0" err="1">
-                <a:solidFill>
-                  <a:sysClr val="windowText" lastClr="000000"/>
-                </a:solidFill>
-                <a:latin typeface="Calibri" panose="020F0502020204030204" pitchFamily="34" charset="0"/>
-                <a:cs typeface="Calibri" panose="020F0502020204030204" pitchFamily="34" charset="0"/>
-              </a:rPr>
-              <a:t>occupée</a:t>
-            </a:r>
-            <a:r>
-              <a:rPr lang="en-GB" sz="1800" kern="0" dirty="0">
-                <a:solidFill>
-                  <a:sysClr val="windowText" lastClr="000000"/>
-                </a:solidFill>
-                <a:latin typeface="Calibri" panose="020F0502020204030204" pitchFamily="34" charset="0"/>
-                <a:cs typeface="Calibri" panose="020F0502020204030204" pitchFamily="34" charset="0"/>
-              </a:rPr>
-              <a:t> par un pion de couleur </a:t>
-            </a:r>
-            <a:r>
-              <a:rPr lang="en-GB" sz="1800" kern="0" dirty="0" err="1">
-                <a:solidFill>
-                  <a:sysClr val="windowText" lastClr="000000"/>
-                </a:solidFill>
-                <a:latin typeface="Calibri" panose="020F0502020204030204" pitchFamily="34" charset="0"/>
-                <a:cs typeface="Calibri" panose="020F0502020204030204" pitchFamily="34" charset="0"/>
-              </a:rPr>
-              <a:t>différente</a:t>
-            </a:r>
-            <a:r>
-              <a:rPr lang="en-GB" sz="1800" kern="0" dirty="0">
-                <a:solidFill>
-                  <a:sysClr val="windowText" lastClr="000000"/>
-                </a:solidFill>
-                <a:latin typeface="Calibri" panose="020F0502020204030204" pitchFamily="34" charset="0"/>
-                <a:cs typeface="Calibri" panose="020F0502020204030204" pitchFamily="34" charset="0"/>
-              </a:rPr>
-              <a:t>:</a:t>
+              <a:t>			Si la position est occupée par un pion de couleur différente:</a:t>
             </a:r>
           </a:p>
           <a:p>
@@ -13266,54 +12919,14 @@
               <a:buNone/>
             </a:pPr>
             <a:r>
-              <a:rPr lang="en-GB" sz="1800" kern="0" dirty="0">
+              <a:rPr lang="fr-FR" sz="1800" kern="0" dirty="0" smtClean="0">
                 <a:solidFill>
                   <a:sysClr val="windowText" lastClr="000000"/>
                 </a:solidFill>
                 <a:latin typeface="Calibri" panose="020F0502020204030204" pitchFamily="34" charset="0"/>
                 <a:cs typeface="Calibri" panose="020F0502020204030204" pitchFamily="34" charset="0"/>
               </a:rPr>
-              <a:t>				On </a:t>
-            </a:r>
-            <a:r>
-              <a:rPr lang="en-GB" sz="1800" kern="0" dirty="0" err="1">
-                <a:solidFill>
-                  <a:sysClr val="windowText" lastClr="000000"/>
-                </a:solidFill>
-                <a:latin typeface="Calibri" panose="020F0502020204030204" pitchFamily="34" charset="0"/>
-                <a:cs typeface="Calibri" panose="020F0502020204030204" pitchFamily="34" charset="0"/>
-              </a:rPr>
-              <a:t>enregistre</a:t>
-            </a:r>
-            <a:r>
-              <a:rPr lang="en-GB" sz="1800" kern="0" dirty="0">
-                <a:solidFill>
-                  <a:sysClr val="windowText" lastClr="000000"/>
-                </a:solidFill>
-                <a:latin typeface="Calibri" panose="020F0502020204030204" pitchFamily="34" charset="0"/>
-                <a:cs typeface="Calibri" panose="020F0502020204030204" pitchFamily="34" charset="0"/>
-              </a:rPr>
-              <a:t> </a:t>
-            </a:r>
-            <a:r>
-              <a:rPr lang="en-GB" sz="1800" kern="0" dirty="0" err="1">
-                <a:solidFill>
-                  <a:sysClr val="windowText" lastClr="000000"/>
-                </a:solidFill>
-                <a:latin typeface="Calibri" panose="020F0502020204030204" pitchFamily="34" charset="0"/>
-                <a:cs typeface="Calibri" panose="020F0502020204030204" pitchFamily="34" charset="0"/>
-              </a:rPr>
-              <a:t>cette</a:t>
-            </a:r>
-            <a:r>
-              <a:rPr lang="en-GB" sz="1800" kern="0" dirty="0">
-                <a:solidFill>
-                  <a:sysClr val="windowText" lastClr="000000"/>
-                </a:solidFill>
-                <a:latin typeface="Calibri" panose="020F0502020204030204" pitchFamily="34" charset="0"/>
-                <a:cs typeface="Calibri" panose="020F0502020204030204" pitchFamily="34" charset="0"/>
-              </a:rPr>
-              <a:t> position</a:t>
+              <a:t>				On enregistre cette position</a:t>
             </a:r>
           </a:p>
           <a:p>
@@ -13324,94 +12937,14 @@
               <a:buNone/>
             </a:pPr>
             <a:r>
-              <a:rPr lang="en-GB" sz="1800" kern="0" dirty="0">
+              <a:rPr lang="fr-FR" sz="1800" kern="0" dirty="0" smtClean="0">
                 <a:solidFill>
                   <a:sysClr val="windowText" lastClr="000000"/>
                 </a:solidFill>
                 <a:latin typeface="Calibri" panose="020F0502020204030204" pitchFamily="34" charset="0"/>
                 <a:cs typeface="Calibri" panose="020F0502020204030204" pitchFamily="34" charset="0"/>
               </a:rPr>
-              <a:t>			</a:t>
-            </a:r>
-            <a:r>
-              <a:rPr lang="en-GB" sz="1800" kern="0" dirty="0" err="1">
-                <a:solidFill>
-                  <a:sysClr val="windowText" lastClr="000000"/>
-                </a:solidFill>
-                <a:latin typeface="Calibri" panose="020F0502020204030204" pitchFamily="34" charset="0"/>
-                <a:cs typeface="Calibri" panose="020F0502020204030204" pitchFamily="34" charset="0"/>
-              </a:rPr>
-              <a:t>Sinon</a:t>
-            </a:r>
-            <a:r>
-              <a:rPr lang="en-GB" sz="1800" kern="0" dirty="0">
-                <a:solidFill>
-                  <a:sysClr val="windowText" lastClr="000000"/>
-                </a:solidFill>
-                <a:latin typeface="Calibri" panose="020F0502020204030204" pitchFamily="34" charset="0"/>
-                <a:cs typeface="Calibri" panose="020F0502020204030204" pitchFamily="34" charset="0"/>
-              </a:rPr>
-              <a:t> </a:t>
-            </a:r>
-            <a:r>
-              <a:rPr lang="en-GB" sz="1800" kern="0" dirty="0" err="1">
-                <a:solidFill>
-                  <a:sysClr val="windowText" lastClr="000000"/>
-                </a:solidFill>
-                <a:latin typeface="Calibri" panose="020F0502020204030204" pitchFamily="34" charset="0"/>
-                <a:cs typeface="Calibri" panose="020F0502020204030204" pitchFamily="34" charset="0"/>
-              </a:rPr>
-              <a:t>si</a:t>
-            </a:r>
-            <a:r>
-              <a:rPr lang="en-GB" sz="1800" kern="0" dirty="0">
-                <a:solidFill>
-                  <a:sysClr val="windowText" lastClr="000000"/>
-                </a:solidFill>
-                <a:latin typeface="Calibri" panose="020F0502020204030204" pitchFamily="34" charset="0"/>
-                <a:cs typeface="Calibri" panose="020F0502020204030204" pitchFamily="34" charset="0"/>
-              </a:rPr>
-              <a:t> on </a:t>
-            </a:r>
-            <a:r>
-              <a:rPr lang="en-GB" sz="1800" kern="0" dirty="0" err="1">
-                <a:solidFill>
-                  <a:sysClr val="windowText" lastClr="000000"/>
-                </a:solidFill>
-                <a:latin typeface="Calibri" panose="020F0502020204030204" pitchFamily="34" charset="0"/>
-                <a:cs typeface="Calibri" panose="020F0502020204030204" pitchFamily="34" charset="0"/>
-              </a:rPr>
-              <a:t>trouve</a:t>
-            </a:r>
-            <a:r>
-              <a:rPr lang="en-GB" sz="1800" kern="0" dirty="0">
-                <a:solidFill>
-                  <a:sysClr val="windowText" lastClr="000000"/>
-                </a:solidFill>
-                <a:latin typeface="Calibri" panose="020F0502020204030204" pitchFamily="34" charset="0"/>
-                <a:cs typeface="Calibri" panose="020F0502020204030204" pitchFamily="34" charset="0"/>
-              </a:rPr>
-              <a:t> un pion de la </a:t>
-            </a:r>
-            <a:r>
-              <a:rPr lang="en-GB" sz="1800" kern="0" dirty="0" err="1">
-                <a:solidFill>
-                  <a:sysClr val="windowText" lastClr="000000"/>
-                </a:solidFill>
-                <a:latin typeface="Calibri" panose="020F0502020204030204" pitchFamily="34" charset="0"/>
-                <a:cs typeface="Calibri" panose="020F0502020204030204" pitchFamily="34" charset="0"/>
-              </a:rPr>
-              <a:t>même</a:t>
-            </a:r>
-            <a:r>
-              <a:rPr lang="en-GB" sz="1800" kern="0" dirty="0">
-                <a:solidFill>
-                  <a:sysClr val="windowText" lastClr="000000"/>
-                </a:solidFill>
-                <a:latin typeface="Calibri" panose="020F0502020204030204" pitchFamily="34" charset="0"/>
-                <a:cs typeface="Calibri" panose="020F0502020204030204" pitchFamily="34" charset="0"/>
-              </a:rPr>
-              <a:t> couleur:</a:t>
+              <a:t>			Sinon si on trouve un pion de la même couleur:</a:t>
             </a:r>
           </a:p>
           <a:p>
@@ -13422,74 +12955,14 @@
               <a:buNone/>
             </a:pPr>
             <a:r>
-              <a:rPr lang="en-GB" sz="1800" kern="0" dirty="0">
+              <a:rPr lang="fr-FR" sz="1800" kern="0" dirty="0" smtClean="0">
                 <a:solidFill>
                   <a:sysClr val="windowText" lastClr="000000"/>
                 </a:solidFill>
                 <a:latin typeface="Calibri" panose="020F0502020204030204" pitchFamily="34" charset="0"/>
                 <a:cs typeface="Calibri" panose="020F0502020204030204" pitchFamily="34" charset="0"/>
               </a:rPr>
-              <a:t>				On a </a:t>
-            </a:r>
-            <a:r>
-              <a:rPr lang="en-GB" sz="1800" kern="0" dirty="0" err="1">
-                <a:solidFill>
-                  <a:sysClr val="windowText" lastClr="000000"/>
-                </a:solidFill>
-                <a:latin typeface="Calibri" panose="020F0502020204030204" pitchFamily="34" charset="0"/>
-                <a:cs typeface="Calibri" panose="020F0502020204030204" pitchFamily="34" charset="0"/>
-              </a:rPr>
-              <a:t>fini</a:t>
-            </a:r>
-            <a:r>
-              <a:rPr lang="en-GB" sz="1800" kern="0" dirty="0">
-                <a:solidFill>
-                  <a:sysClr val="windowText" lastClr="000000"/>
-                </a:solidFill>
-                <a:latin typeface="Calibri" panose="020F0502020204030204" pitchFamily="34" charset="0"/>
-                <a:cs typeface="Calibri" panose="020F0502020204030204" pitchFamily="34" charset="0"/>
-              </a:rPr>
-              <a:t> </a:t>
-            </a:r>
-            <a:r>
-              <a:rPr lang="en-GB" sz="1800" kern="0" dirty="0" err="1">
-                <a:solidFill>
-                  <a:sysClr val="windowText" lastClr="000000"/>
-                </a:solidFill>
-                <a:latin typeface="Calibri" panose="020F0502020204030204" pitchFamily="34" charset="0"/>
-                <a:cs typeface="Calibri" panose="020F0502020204030204" pitchFamily="34" charset="0"/>
-              </a:rPr>
-              <a:t>dans</a:t>
-            </a:r>
-            <a:r>
-              <a:rPr lang="en-GB" sz="1800" kern="0" dirty="0">
-                <a:solidFill>
-                  <a:sysClr val="windowText" lastClr="000000"/>
-                </a:solidFill>
-                <a:latin typeface="Calibri" panose="020F0502020204030204" pitchFamily="34" charset="0"/>
-                <a:cs typeface="Calibri" panose="020F0502020204030204" pitchFamily="34" charset="0"/>
-              </a:rPr>
-              <a:t> </a:t>
-            </a:r>
-            <a:r>
-              <a:rPr lang="en-GB" sz="1800" kern="0" dirty="0" err="1">
-                <a:solidFill>
-                  <a:sysClr val="windowText" lastClr="000000"/>
-                </a:solidFill>
-                <a:latin typeface="Calibri" panose="020F0502020204030204" pitchFamily="34" charset="0"/>
-                <a:cs typeface="Calibri" panose="020F0502020204030204" pitchFamily="34" charset="0"/>
-              </a:rPr>
-              <a:t>cette</a:t>
-            </a:r>
-            <a:r>
-              <a:rPr lang="en-GB" sz="1800" kern="0" dirty="0">
-                <a:solidFill>
-                  <a:sysClr val="windowText" lastClr="000000"/>
-                </a:solidFill>
-                <a:latin typeface="Calibri" panose="020F0502020204030204" pitchFamily="34" charset="0"/>
-                <a:cs typeface="Calibri" panose="020F0502020204030204" pitchFamily="34" charset="0"/>
-              </a:rPr>
-              <a:t> direction</a:t>
+              <a:t>				On a fini dans cette direction</a:t>
             </a:r>
           </a:p>
           <a:p>
@@ -13500,52 +12973,15 @@
               <a:buNone/>
             </a:pPr>
             <a:r>
-              <a:rPr lang="en-GB" sz="1800" kern="0" dirty="0">
+              <a:rPr lang="fr-FR" sz="1800" kern="0" dirty="0" smtClean="0">
                 <a:solidFill>
                   <a:sysClr val="windowText" lastClr="000000"/>
                 </a:solidFill>
                 <a:latin typeface="Calibri" panose="020F0502020204030204" pitchFamily="34" charset="0"/>
                 <a:cs typeface="Calibri" panose="020F0502020204030204" pitchFamily="34" charset="0"/>
               </a:rPr>
-              <a:t>				Le coup </a:t>
-            </a:r>
-            <a:r>
-              <a:rPr lang="en-GB" sz="1800" kern="0" dirty="0" err="1">
-                <a:solidFill>
-                  <a:sysClr val="windowText" lastClr="000000"/>
-                </a:solidFill>
-                <a:latin typeface="Calibri" panose="020F0502020204030204" pitchFamily="34" charset="0"/>
-                <a:cs typeface="Calibri" panose="020F0502020204030204" pitchFamily="34" charset="0"/>
-              </a:rPr>
-              <a:t>est</a:t>
-            </a:r>
-            <a:r>
-              <a:rPr lang="en-GB" sz="1800" kern="0" dirty="0">
-                <a:solidFill>
-                  <a:sysClr val="windowText" lastClr="000000"/>
-                </a:solidFill>
-                <a:latin typeface="Calibri" panose="020F0502020204030204" pitchFamily="34" charset="0"/>
-                <a:cs typeface="Calibri" panose="020F0502020204030204" pitchFamily="34" charset="0"/>
-              </a:rPr>
-              <a:t> </a:t>
-            </a:r>
-            <a:r>
-              <a:rPr lang="en-GB" sz="1800" kern="0" dirty="0" err="1">
-                <a:solidFill>
-                  <a:sysClr val="windowText" lastClr="000000"/>
-                </a:solidFill>
-                <a:latin typeface="Calibri" panose="020F0502020204030204" pitchFamily="34" charset="0"/>
-                <a:cs typeface="Calibri" panose="020F0502020204030204" pitchFamily="34" charset="0"/>
-              </a:rPr>
-              <a:t>validé</a:t>
-            </a:r>
-            <a:endParaRPr lang="en-GB" sz="1800" kern="0" dirty="0">
-              <a:solidFill>
-                <a:sysClr val="windowText" lastClr="000000"/>
-              </a:solidFill>
-              <a:latin typeface="Calibri" panose="020F0502020204030204" pitchFamily="34" charset="0"/>
-              <a:cs typeface="Calibri" panose="020F0502020204030204" pitchFamily="34" charset="0"/>
-            </a:endParaRPr>
+              <a:t>				Le coup est validé</a:t>
+            </a:r>
           </a:p>
           <a:p>
             <a:pPr marL="0" indent="0">
@@ -13555,34 +12991,14 @@
               <a:buNone/>
             </a:pPr>
             <a:r>
-              <a:rPr lang="en-GB" sz="1800" kern="0" dirty="0">
+              <a:rPr lang="fr-FR" sz="1800" kern="0" dirty="0" smtClean="0">
                 <a:solidFill>
                   <a:sysClr val="windowText" lastClr="000000"/>
                 </a:solidFill>
                 <a:latin typeface="Calibri" panose="020F0502020204030204" pitchFamily="34" charset="0"/>
                 <a:cs typeface="Calibri" panose="020F0502020204030204" pitchFamily="34" charset="0"/>
               </a:rPr>
-              <a:t>			</a:t>
-            </a:r>
-            <a:r>
-              <a:rPr lang="en-GB" sz="1800" kern="0" dirty="0" err="1">
-                <a:solidFill>
-                  <a:sysClr val="windowText" lastClr="000000"/>
-                </a:solidFill>
-                <a:latin typeface="Calibri" panose="020F0502020204030204" pitchFamily="34" charset="0"/>
-                <a:cs typeface="Calibri" panose="020F0502020204030204" pitchFamily="34" charset="0"/>
-              </a:rPr>
-              <a:t>Sinon</a:t>
-            </a:r>
-            <a:r>
-              <a:rPr lang="en-GB" sz="1800" kern="0" dirty="0">
-                <a:solidFill>
-                  <a:sysClr val="windowText" lastClr="000000"/>
-                </a:solidFill>
-                <a:latin typeface="Calibri" panose="020F0502020204030204" pitchFamily="34" charset="0"/>
-                <a:cs typeface="Calibri" panose="020F0502020204030204" pitchFamily="34" charset="0"/>
-              </a:rPr>
-              <a:t> (hors plateau):</a:t>
+              <a:t>			Sinon (hors plateau):</a:t>
             </a:r>
           </a:p>
           <a:p>
@@ -13593,112 +13009,15 @@
               <a:buNone/>
             </a:pPr>
             <a:r>
-              <a:rPr lang="en-GB" sz="1800" kern="0" dirty="0">
+              <a:rPr lang="fr-FR" sz="1800" kern="0" dirty="0" smtClean="0">
                 <a:solidFill>
                   <a:sysClr val="windowText" lastClr="000000"/>
                 </a:solidFill>
                 <a:latin typeface="Calibri" panose="020F0502020204030204" pitchFamily="34" charset="0"/>
                 <a:cs typeface="Calibri" panose="020F0502020204030204" pitchFamily="34" charset="0"/>
               </a:rPr>
-              <a:t>				On a </a:t>
-            </a:r>
-            <a:r>
-              <a:rPr lang="en-GB" sz="1800" kern="0" dirty="0" err="1">
-                <a:solidFill>
-                  <a:sysClr val="windowText" lastClr="000000"/>
-                </a:solidFill>
-                <a:latin typeface="Calibri" panose="020F0502020204030204" pitchFamily="34" charset="0"/>
-                <a:cs typeface="Calibri" panose="020F0502020204030204" pitchFamily="34" charset="0"/>
-              </a:rPr>
-              <a:t>fini</a:t>
-            </a:r>
-            <a:r>
-              <a:rPr lang="en-GB" sz="1800" kern="0" dirty="0">
-                <a:solidFill>
-                  <a:sysClr val="windowText" lastClr="000000"/>
-                </a:solidFill>
-                <a:latin typeface="Calibri" panose="020F0502020204030204" pitchFamily="34" charset="0"/>
-                <a:cs typeface="Calibri" panose="020F0502020204030204" pitchFamily="34" charset="0"/>
-              </a:rPr>
-              <a:t> </a:t>
-            </a:r>
-            <a:r>
-              <a:rPr lang="en-GB" sz="1800" kern="0" dirty="0" err="1">
-                <a:solidFill>
-                  <a:sysClr val="windowText" lastClr="000000"/>
-                </a:solidFill>
-                <a:latin typeface="Calibri" panose="020F0502020204030204" pitchFamily="34" charset="0"/>
-                <a:cs typeface="Calibri" panose="020F0502020204030204" pitchFamily="34" charset="0"/>
-              </a:rPr>
-              <a:t>dans</a:t>
-            </a:r>
-            <a:r>
-              <a:rPr lang="en-GB" sz="1800" kern="0" dirty="0">
-                <a:solidFill>
-                  <a:sysClr val="windowText" lastClr="000000"/>
-                </a:solidFill>
-                <a:latin typeface="Calibri" panose="020F0502020204030204" pitchFamily="34" charset="0"/>
-                <a:cs typeface="Calibri" panose="020F0502020204030204" pitchFamily="34" charset="0"/>
-              </a:rPr>
-              <a:t> </a:t>
-            </a:r>
-            <a:r>
-              <a:rPr lang="en-GB" sz="1800" kern="0" dirty="0" err="1">
-                <a:solidFill>
-                  <a:sysClr val="windowText" lastClr="000000"/>
-                </a:solidFill>
-                <a:latin typeface="Calibri" panose="020F0502020204030204" pitchFamily="34" charset="0"/>
-                <a:cs typeface="Calibri" panose="020F0502020204030204" pitchFamily="34" charset="0"/>
-              </a:rPr>
-              <a:t>cette</a:t>
-            </a:r>
-            <a:r>
-              <a:rPr lang="en-GB" sz="1800" kern="0" dirty="0">
-                <a:solidFill>
-                  <a:sysClr val="windowText" lastClr="000000"/>
-                </a:solidFill>
-                <a:latin typeface="Calibri" panose="020F0502020204030204" pitchFamily="34" charset="0"/>
-                <a:cs typeface="Calibri" panose="020F0502020204030204" pitchFamily="34" charset="0"/>
-              </a:rPr>
-              <a:t> direction, le coup </a:t>
-            </a:r>
-            <a:r>
-              <a:rPr lang="en-GB" sz="1800" kern="0" dirty="0" err="1">
-                <a:solidFill>
-                  <a:sysClr val="windowText" lastClr="000000"/>
-                </a:solidFill>
-                <a:latin typeface="Calibri" panose="020F0502020204030204" pitchFamily="34" charset="0"/>
-                <a:cs typeface="Calibri" panose="020F0502020204030204" pitchFamily="34" charset="0"/>
-              </a:rPr>
-              <a:t>n’est</a:t>
-            </a:r>
-            <a:r>
-              <a:rPr lang="en-GB" sz="1800" kern="0" dirty="0">
-                <a:solidFill>
-                  <a:sysClr val="windowText" lastClr="000000"/>
-                </a:solidFill>
-                <a:latin typeface="Calibri" panose="020F0502020204030204" pitchFamily="34" charset="0"/>
-                <a:cs typeface="Calibri" panose="020F0502020204030204" pitchFamily="34" charset="0"/>
-              </a:rPr>
-              <a:t> pas </a:t>
-            </a:r>
-            <a:r>
-              <a:rPr lang="en-GB" sz="1800" kern="0" dirty="0" err="1">
-                <a:solidFill>
-                  <a:sysClr val="windowText" lastClr="000000"/>
-                </a:solidFill>
-                <a:latin typeface="Calibri" panose="020F0502020204030204" pitchFamily="34" charset="0"/>
-                <a:cs typeface="Calibri" panose="020F0502020204030204" pitchFamily="34" charset="0"/>
-              </a:rPr>
-              <a:t>valide</a:t>
-            </a:r>
-            <a:endParaRPr lang="en-GB" sz="1800" kern="0" dirty="0">
-              <a:solidFill>
-                <a:sysClr val="windowText" lastClr="000000"/>
-              </a:solidFill>
-              <a:latin typeface="Calibri" panose="020F0502020204030204" pitchFamily="34" charset="0"/>
-              <a:cs typeface="Calibri" panose="020F0502020204030204" pitchFamily="34" charset="0"/>
-            </a:endParaRPr>
+              <a:t>				On a fini dans cette direction, le coup n’est pas valide</a:t>
+            </a:r>
           </a:p>
           <a:p>
             <a:pPr marL="0" indent="0">
@@ -13708,7 +13027,7 @@
               <a:buNone/>
             </a:pPr>
             <a:r>
-              <a:rPr lang="en-GB" sz="2000" kern="0" dirty="0">
+              <a:rPr lang="fr-FR" sz="2000" kern="0" dirty="0" smtClean="0">
                 <a:solidFill>
                   <a:sysClr val="windowText" lastClr="000000"/>
                 </a:solidFill>
@@ -13717,13 +13036,6 @@
               </a:rPr>
               <a:t>	</a:t>
             </a:r>
-            <a:endParaRPr lang="fr-FR" sz="2000" kern="0" dirty="0">
-              <a:solidFill>
-                <a:sysClr val="windowText" lastClr="000000"/>
-              </a:solidFill>
-              <a:latin typeface="Calibri" panose="020F0502020204030204" pitchFamily="34" charset="0"/>
-              <a:cs typeface="Calibri" panose="020F0502020204030204" pitchFamily="34" charset="0"/>
-            </a:endParaRPr>
           </a:p>
           <a:p>
             <a:pPr>
@@ -13849,6 +13161,38 @@
               <a:latin typeface="Calibri" panose="020F0502020204030204" pitchFamily="34" charset="0"/>
               <a:cs typeface="Calibri" panose="020F0502020204030204" pitchFamily="34" charset="0"/>
             </a:endParaRPr>
+          </a:p>
+        </p:txBody>
+      </p:sp>
+      <p:sp>
+        <p:nvSpPr>
+          <p:cNvPr id="4" name="ZoneTexte 3"/>
+          <p:cNvSpPr txBox="1"/>
+          <p:nvPr/>
+        </p:nvSpPr>
+        <p:spPr>
+          <a:xfrm>
+            <a:off x="6083034" y="6487017"/>
+            <a:ext cx="3060966" cy="338554"/>
+          </a:xfrm>
+          <a:prstGeom prst="rect">
+            <a:avLst/>
+          </a:prstGeom>
+          <a:noFill/>
+        </p:spPr>
+        <p:txBody>
+          <a:bodyPr wrap="none" rtlCol="0">
+            <a:spAutoFit/>
+          </a:bodyPr>
+          <a:lstStyle/>
+          <a:p>
+            <a:r>
+              <a:rPr lang="fr-FR" sz="1600" dirty="0">
+                <a:latin typeface="Calibri Light" panose="020F0302020204030204" pitchFamily="34" charset="0"/>
+                <a:cs typeface="Calibri Light" panose="020F0302020204030204" pitchFamily="34" charset="0"/>
+              </a:rPr>
+              <a:t>1. Intégration des structures de jeu</a:t>
+            </a:r>
           </a:p>
         </p:txBody>
       </p:sp>
@@ -13874,6 +13218,13 @@
       </p:transition>
     </mc:Fallback>
   </mc:AlternateContent>
+  <p:timing>
+    <p:tnLst>
+      <p:par>
+        <p:cTn id="1" dur="indefinite" restart="never" nodeType="tmRoot"/>
+      </p:par>
+    </p:tnLst>
+  </p:timing>
 </p:sld>
 </file>
 
@@ -13945,7 +13296,7 @@
         </p:spPr>
         <p:txBody>
           <a:bodyPr>
-            <a:normAutofit/>
+            <a:normAutofit fontScale="92500" lnSpcReduction="10000"/>
           </a:bodyPr>
           <a:lstStyle>
             <a:defPPr>
@@ -14020,7 +13371,17 @@
                 <a:latin typeface="Calibri" panose="020F0502020204030204" pitchFamily="34" charset="0"/>
                 <a:cs typeface="Calibri" panose="020F0502020204030204" pitchFamily="34" charset="0"/>
               </a:rPr>
-              <a:t>  Réalisation d’une partie</a:t>
+              <a:t>  </a:t>
+            </a:r>
+            <a:r>
+              <a:rPr lang="fr-FR" sz="2600" b="1" kern="0" dirty="0">
+                <a:solidFill>
+                  <a:srgbClr val="002060"/>
+                </a:solidFill>
+                <a:latin typeface="Calibri" panose="020F0502020204030204" pitchFamily="34" charset="0"/>
+                <a:cs typeface="Calibri" panose="020F0502020204030204" pitchFamily="34" charset="0"/>
+              </a:rPr>
+              <a:t>Réalisation d’une partie</a:t>
             </a:r>
           </a:p>
           <a:p>
@@ -14047,15 +13408,42 @@
               <a:buChar char="§"/>
             </a:pPr>
             <a:r>
-              <a:rPr lang="fr-FR" sz="2000" kern="0" dirty="0">
+              <a:rPr lang="fr-FR" sz="2000" kern="0" dirty="0" smtClean="0">
                 <a:solidFill>
                   <a:sysClr val="windowText" lastClr="000000"/>
                 </a:solidFill>
                 <a:latin typeface="Calibri" panose="020F0502020204030204" pitchFamily="34" charset="0"/>
                 <a:cs typeface="Calibri" panose="020F0502020204030204" pitchFamily="34" charset="0"/>
               </a:rPr>
-              <a:t>Intégrer correctement l’environnement du jeu (plateau, pions, joueurs…)</a:t>
-            </a:r>
+              <a:t>La fonction </a:t>
+            </a:r>
+            <a:r>
+              <a:rPr lang="fr-FR" sz="2000" i="1" kern="0" dirty="0" smtClean="0">
+                <a:solidFill>
+                  <a:sysClr val="windowText" lastClr="000000"/>
+                </a:solidFill>
+                <a:latin typeface="Calibri" panose="020F0502020204030204" pitchFamily="34" charset="0"/>
+                <a:cs typeface="Calibri" panose="020F0502020204030204" pitchFamily="34" charset="0"/>
+              </a:rPr>
+              <a:t>generer </a:t>
+            </a:r>
+            <a:r>
+              <a:rPr lang="fr-FR" sz="2000" kern="0" dirty="0" smtClean="0">
+                <a:solidFill>
+                  <a:sysClr val="windowText" lastClr="000000"/>
+                </a:solidFill>
+                <a:latin typeface="Calibri" panose="020F0502020204030204" pitchFamily="34" charset="0"/>
+                <a:cs typeface="Calibri" panose="020F0502020204030204" pitchFamily="34" charset="0"/>
+              </a:rPr>
+              <a:t>crée un plateau et des joueurs.</a:t>
+            </a:r>
+            <a:endParaRPr lang="fr-FR" sz="2000" kern="0" dirty="0">
+              <a:solidFill>
+                <a:sysClr val="windowText" lastClr="000000"/>
+              </a:solidFill>
+              <a:latin typeface="Calibri" panose="020F0502020204030204" pitchFamily="34" charset="0"/>
+              <a:cs typeface="Calibri" panose="020F0502020204030204" pitchFamily="34" charset="0"/>
+            </a:endParaRPr>
           </a:p>
           <a:p>
             <a:pPr lvl="1">
@@ -14082,15 +13470,42 @@
               <a:buChar char="§"/>
             </a:pPr>
             <a:r>
-              <a:rPr lang="fr-FR" sz="2000" kern="0" dirty="0">
+              <a:rPr lang="fr-FR" sz="2000" kern="0" dirty="0" smtClean="0">
                 <a:solidFill>
                   <a:sysClr val="windowText" lastClr="000000"/>
                 </a:solidFill>
                 <a:latin typeface="Calibri" panose="020F0502020204030204" pitchFamily="34" charset="0"/>
                 <a:cs typeface="Calibri" panose="020F0502020204030204" pitchFamily="34" charset="0"/>
               </a:rPr>
-              <a:t>Créer un jeu qui respecte les règles énoncées.</a:t>
-            </a:r>
+              <a:t>Une fonction </a:t>
+            </a:r>
+            <a:r>
+              <a:rPr lang="fr-FR" sz="2000" i="1" kern="0" dirty="0" smtClean="0">
+                <a:solidFill>
+                  <a:sysClr val="windowText" lastClr="000000"/>
+                </a:solidFill>
+                <a:latin typeface="Calibri" panose="020F0502020204030204" pitchFamily="34" charset="0"/>
+                <a:cs typeface="Calibri" panose="020F0502020204030204" pitchFamily="34" charset="0"/>
+              </a:rPr>
+              <a:t>tour </a:t>
+            </a:r>
+            <a:r>
+              <a:rPr lang="fr-FR" sz="2000" kern="0" dirty="0" smtClean="0">
+                <a:solidFill>
+                  <a:sysClr val="windowText" lastClr="000000"/>
+                </a:solidFill>
+                <a:latin typeface="Calibri" panose="020F0502020204030204" pitchFamily="34" charset="0"/>
+                <a:cs typeface="Calibri" panose="020F0502020204030204" pitchFamily="34" charset="0"/>
+              </a:rPr>
+              <a:t>fait jouer le joueur noir puis le blanc. </a:t>
+            </a:r>
+            <a:endParaRPr lang="fr-FR" sz="2000" kern="0" dirty="0">
+              <a:solidFill>
+                <a:sysClr val="windowText" lastClr="000000"/>
+              </a:solidFill>
+              <a:latin typeface="Calibri" panose="020F0502020204030204" pitchFamily="34" charset="0"/>
+              <a:cs typeface="Calibri" panose="020F0502020204030204" pitchFamily="34" charset="0"/>
+            </a:endParaRPr>
           </a:p>
           <a:p>
             <a:pPr lvl="1">
@@ -14117,15 +13532,72 @@
               <a:buChar char="§"/>
             </a:pPr>
             <a:r>
-              <a:rPr lang="fr-FR" sz="2000" kern="0" dirty="0">
+              <a:rPr lang="fr-FR" sz="2000" kern="0" dirty="0" smtClean="0">
                 <a:solidFill>
                   <a:sysClr val="windowText" lastClr="000000"/>
                 </a:solidFill>
                 <a:latin typeface="Calibri" panose="020F0502020204030204" pitchFamily="34" charset="0"/>
                 <a:cs typeface="Calibri" panose="020F0502020204030204" pitchFamily="34" charset="0"/>
               </a:rPr>
-              <a:t>Tester notre code.</a:t>
-            </a:r>
+              <a:t>Une fonction </a:t>
+            </a:r>
+            <a:r>
+              <a:rPr lang="fr-FR" sz="2000" i="1" kern="0" dirty="0" smtClean="0">
+                <a:solidFill>
+                  <a:sysClr val="windowText" lastClr="000000"/>
+                </a:solidFill>
+                <a:latin typeface="Calibri" panose="020F0502020204030204" pitchFamily="34" charset="0"/>
+                <a:cs typeface="Calibri" panose="020F0502020204030204" pitchFamily="34" charset="0"/>
+              </a:rPr>
+              <a:t>partie </a:t>
+            </a:r>
+            <a:r>
+              <a:rPr lang="fr-FR" sz="2000" kern="0" dirty="0" smtClean="0">
+                <a:solidFill>
+                  <a:sysClr val="windowText" lastClr="000000"/>
+                </a:solidFill>
+                <a:latin typeface="Calibri" panose="020F0502020204030204" pitchFamily="34" charset="0"/>
+                <a:cs typeface="Calibri" panose="020F0502020204030204" pitchFamily="34" charset="0"/>
+              </a:rPr>
+              <a:t>exécute </a:t>
+            </a:r>
+            <a:r>
+              <a:rPr lang="fr-FR" sz="2000" i="1" kern="0" dirty="0" smtClean="0">
+                <a:solidFill>
+                  <a:sysClr val="windowText" lastClr="000000"/>
+                </a:solidFill>
+                <a:latin typeface="Calibri" panose="020F0502020204030204" pitchFamily="34" charset="0"/>
+                <a:cs typeface="Calibri" panose="020F0502020204030204" pitchFamily="34" charset="0"/>
+              </a:rPr>
+              <a:t>tour</a:t>
+            </a:r>
+            <a:r>
+              <a:rPr lang="fr-FR" sz="2000" kern="0" dirty="0" smtClean="0">
+                <a:solidFill>
+                  <a:sysClr val="windowText" lastClr="000000"/>
+                </a:solidFill>
+                <a:latin typeface="Calibri" panose="020F0502020204030204" pitchFamily="34" charset="0"/>
+                <a:cs typeface="Calibri" panose="020F0502020204030204" pitchFamily="34" charset="0"/>
+              </a:rPr>
+              <a:t> jusqu’à ce qu’il y ait blocage ou que le plateau soit rempli</a:t>
+            </a:r>
+            <a:r>
+              <a:rPr lang="fr-FR" sz="2000" kern="0" dirty="0" smtClean="0">
+                <a:solidFill>
+                  <a:sysClr val="windowText" lastClr="000000"/>
+                </a:solidFill>
+                <a:latin typeface="Calibri" panose="020F0502020204030204" pitchFamily="34" charset="0"/>
+                <a:cs typeface="Calibri" panose="020F0502020204030204" pitchFamily="34" charset="0"/>
+              </a:rPr>
+              <a:t>.</a:t>
+            </a:r>
+            <a:endParaRPr lang="fr-FR" sz="2000" kern="0" dirty="0">
+              <a:solidFill>
+                <a:sysClr val="windowText" lastClr="000000"/>
+              </a:solidFill>
+              <a:latin typeface="Calibri" panose="020F0502020204030204" pitchFamily="34" charset="0"/>
+              <a:cs typeface="Calibri" panose="020F0502020204030204" pitchFamily="34" charset="0"/>
+            </a:endParaRPr>
           </a:p>
           <a:p>
             <a:pPr lvl="1">
@@ -14152,15 +13624,42 @@
               <a:buChar char="§"/>
             </a:pPr>
             <a:r>
-              <a:rPr lang="fr-FR" sz="2000" kern="0" dirty="0">
+              <a:rPr lang="fr-FR" sz="2000" kern="0" dirty="0" smtClean="0">
                 <a:solidFill>
                   <a:sysClr val="windowText" lastClr="000000"/>
                 </a:solidFill>
                 <a:latin typeface="Calibri" panose="020F0502020204030204" pitchFamily="34" charset="0"/>
                 <a:cs typeface="Calibri" panose="020F0502020204030204" pitchFamily="34" charset="0"/>
               </a:rPr>
-              <a:t>Créer des intelligences artificielles.</a:t>
-            </a:r>
+              <a:t>Un message de fin de partie ou des </a:t>
+            </a:r>
+            <a:r>
+              <a:rPr lang="fr-FR" sz="2000" kern="0" dirty="0" smtClean="0">
+                <a:solidFill>
+                  <a:sysClr val="windowText" lastClr="000000"/>
+                </a:solidFill>
+                <a:latin typeface="Calibri" panose="020F0502020204030204" pitchFamily="34" charset="0"/>
+                <a:cs typeface="Calibri" panose="020F0502020204030204" pitchFamily="34" charset="0"/>
+              </a:rPr>
+              <a:t>données statistiques </a:t>
+            </a:r>
+            <a:r>
+              <a:rPr lang="fr-FR" sz="2000" kern="0" dirty="0" smtClean="0">
+                <a:solidFill>
+                  <a:sysClr val="windowText" lastClr="000000"/>
+                </a:solidFill>
+                <a:latin typeface="Calibri" panose="020F0502020204030204" pitchFamily="34" charset="0"/>
+                <a:cs typeface="Calibri" panose="020F0502020204030204" pitchFamily="34" charset="0"/>
+              </a:rPr>
+              <a:t>apparaissent (selon le mode de jeu choisi).</a:t>
+            </a:r>
+            <a:endParaRPr lang="fr-FR" sz="2000" kern="0" dirty="0">
+              <a:solidFill>
+                <a:sysClr val="windowText" lastClr="000000"/>
+              </a:solidFill>
+              <a:latin typeface="Calibri" panose="020F0502020204030204" pitchFamily="34" charset="0"/>
+              <a:cs typeface="Calibri" panose="020F0502020204030204" pitchFamily="34" charset="0"/>
+            </a:endParaRPr>
           </a:p>
           <a:p>
             <a:pPr lvl="1">
@@ -14179,23 +13678,79 @@
             </a:endParaRPr>
           </a:p>
           <a:p>
-            <a:pPr lvl="1">
+            <a:pPr marL="457200" lvl="1" indent="0">
               <a:spcAft>
                 <a:spcPts val="600"/>
               </a:spcAft>
-              <a:buFont typeface="Wingdings" panose="05000000000000000000" pitchFamily="2" charset="2"/>
-              <a:buChar char="§"/>
-            </a:pPr>
-            <a:r>
-              <a:rPr lang="fr-FR" sz="2000" kern="0" dirty="0">
+              <a:buNone/>
+            </a:pPr>
+            <a:r>
+              <a:rPr lang="fr-FR" sz="2000" kern="0" dirty="0" smtClean="0">
                 <a:solidFill>
                   <a:sysClr val="windowText" lastClr="000000"/>
                 </a:solidFill>
                 <a:latin typeface="Calibri" panose="020F0502020204030204" pitchFamily="34" charset="0"/>
                 <a:cs typeface="Calibri" panose="020F0502020204030204" pitchFamily="34" charset="0"/>
               </a:rPr>
-              <a:t>Mettre en place une interface homme-machine (IHM) ergonomique.</a:t>
-            </a:r>
+              <a:t>(Remarque </a:t>
+            </a:r>
+            <a:r>
+              <a:rPr lang="fr-FR" sz="2000" kern="0" dirty="0" smtClean="0">
+                <a:solidFill>
+                  <a:sysClr val="windowText" lastClr="000000"/>
+                </a:solidFill>
+                <a:latin typeface="Calibri" panose="020F0502020204030204" pitchFamily="34" charset="0"/>
+                <a:cs typeface="Calibri" panose="020F0502020204030204" pitchFamily="34" charset="0"/>
+              </a:rPr>
+              <a:t>: </a:t>
+            </a:r>
+            <a:r>
+              <a:rPr lang="fr-FR" sz="2000" kern="0" dirty="0">
+                <a:solidFill>
+                  <a:sysClr val="windowText" lastClr="000000"/>
+                </a:solidFill>
+                <a:latin typeface="Calibri" panose="020F0502020204030204" pitchFamily="34" charset="0"/>
+                <a:cs typeface="Calibri" panose="020F0502020204030204" pitchFamily="34" charset="0"/>
+              </a:rPr>
+              <a:t>dans la version </a:t>
+            </a:r>
+            <a:r>
+              <a:rPr lang="fr-FR" sz="2000" kern="0" dirty="0" smtClean="0">
+                <a:solidFill>
+                  <a:sysClr val="windowText" lastClr="000000"/>
+                </a:solidFill>
+                <a:latin typeface="Calibri" panose="020F0502020204030204" pitchFamily="34" charset="0"/>
+                <a:cs typeface="Calibri" panose="020F0502020204030204" pitchFamily="34" charset="0"/>
+              </a:rPr>
+              <a:t>graphique, </a:t>
+            </a:r>
+            <a:r>
+              <a:rPr lang="fr-FR" sz="2000" i="1" kern="0" dirty="0" smtClean="0">
+                <a:solidFill>
+                  <a:sysClr val="windowText" lastClr="000000"/>
+                </a:solidFill>
+                <a:latin typeface="Calibri" panose="020F0502020204030204" pitchFamily="34" charset="0"/>
+                <a:cs typeface="Calibri" panose="020F0502020204030204" pitchFamily="34" charset="0"/>
+              </a:rPr>
+              <a:t>partie</a:t>
+            </a:r>
+            <a:r>
+              <a:rPr lang="fr-FR" sz="2000" kern="0" dirty="0" smtClean="0">
+                <a:solidFill>
+                  <a:sysClr val="windowText" lastClr="000000"/>
+                </a:solidFill>
+                <a:latin typeface="Calibri" panose="020F0502020204030204" pitchFamily="34" charset="0"/>
+                <a:cs typeface="Calibri" panose="020F0502020204030204" pitchFamily="34" charset="0"/>
+              </a:rPr>
+              <a:t> ne sert que pour le mode simulation)</a:t>
+            </a:r>
+            <a:endParaRPr lang="fr-FR" sz="2000" kern="0" dirty="0">
+              <a:solidFill>
+                <a:sysClr val="windowText" lastClr="000000"/>
+              </a:solidFill>
+              <a:latin typeface="Calibri" panose="020F0502020204030204" pitchFamily="34" charset="0"/>
+              <a:cs typeface="Calibri" panose="020F0502020204030204" pitchFamily="34" charset="0"/>
+            </a:endParaRPr>
           </a:p>
           <a:p>
             <a:pPr lvl="1">
@@ -14391,6 +13946,13 @@
       </p:transition>
     </mc:Fallback>
   </mc:AlternateContent>
+  <p:timing>
+    <p:tnLst>
+      <p:par>
+        <p:cTn id="1" dur="indefinite" restart="never" nodeType="tmRoot"/>
+      </p:par>
+    </p:tnLst>
+  </p:timing>
 </p:sld>
 </file>
 
@@ -14421,8 +13983,8 @@
         </p:nvSpPr>
         <p:spPr>
           <a:xfrm>
-            <a:off x="107504" y="908720"/>
-            <a:ext cx="8853533" cy="5040560"/>
+            <a:off x="107504" y="908719"/>
+            <a:ext cx="8853533" cy="5566543"/>
           </a:xfrm>
           <a:prstGeom prst="rect">
             <a:avLst/>
@@ -14515,7 +14077,7 @@
               </a:spcAft>
               <a:buNone/>
             </a:pPr>
-            <a:endParaRPr lang="fr-FR" sz="2400" b="1" kern="0" dirty="0">
+            <a:endParaRPr lang="fr-FR" sz="2400" b="1" kern="0" dirty="0" smtClean="0">
               <a:solidFill>
                 <a:srgbClr val="002060"/>
               </a:solidFill>
@@ -14524,138 +14086,145 @@
             </a:endParaRPr>
           </a:p>
           <a:p>
-            <a:pPr lvl="1">
+            <a:pPr marL="0" indent="0">
               <a:spcAft>
                 <a:spcPts val="1000"/>
               </a:spcAft>
-              <a:buFont typeface="Wingdings" panose="05000000000000000000" pitchFamily="2" charset="2"/>
-              <a:buChar char="§"/>
-            </a:pPr>
-            <a:r>
-              <a:rPr lang="fr-FR" sz="2000" kern="0" dirty="0">
-                <a:solidFill>
-                  <a:sysClr val="windowText" lastClr="000000"/>
-                </a:solidFill>
-                <a:latin typeface="Calibri" panose="020F0502020204030204" pitchFamily="34" charset="0"/>
-                <a:cs typeface="Calibri" panose="020F0502020204030204" pitchFamily="34" charset="0"/>
-              </a:rPr>
-              <a:t>Intégrer correctement l’environnement du jeu (plateau, pions, joueurs…)</a:t>
-            </a:r>
-          </a:p>
-          <a:p>
-            <a:pPr lvl="1">
+              <a:buNone/>
+            </a:pPr>
+            <a:endParaRPr lang="fr-FR" sz="2400" b="1" kern="0" dirty="0">
+              <a:solidFill>
+                <a:srgbClr val="002060"/>
+              </a:solidFill>
+              <a:latin typeface="Calibri" panose="020F0502020204030204" pitchFamily="34" charset="0"/>
+              <a:cs typeface="Calibri" panose="020F0502020204030204" pitchFamily="34" charset="0"/>
+            </a:endParaRPr>
+          </a:p>
+          <a:p>
+            <a:pPr marL="0" indent="0">
               <a:spcAft>
                 <a:spcPts val="1000"/>
               </a:spcAft>
-              <a:buFont typeface="Wingdings" panose="05000000000000000000" pitchFamily="2" charset="2"/>
-              <a:buChar char="§"/>
-            </a:pPr>
-            <a:endParaRPr lang="fr-FR" sz="2000" kern="0" dirty="0">
-              <a:solidFill>
-                <a:sysClr val="windowText" lastClr="000000"/>
-              </a:solidFill>
-              <a:latin typeface="Calibri" panose="020F0502020204030204" pitchFamily="34" charset="0"/>
-              <a:cs typeface="Calibri" panose="020F0502020204030204" pitchFamily="34" charset="0"/>
-            </a:endParaRPr>
-          </a:p>
-          <a:p>
-            <a:pPr lvl="1">
+              <a:buNone/>
+            </a:pPr>
+            <a:endParaRPr lang="fr-FR" sz="2400" b="1" kern="0" dirty="0" smtClean="0">
+              <a:solidFill>
+                <a:srgbClr val="002060"/>
+              </a:solidFill>
+              <a:latin typeface="Calibri" panose="020F0502020204030204" pitchFamily="34" charset="0"/>
+              <a:cs typeface="Calibri" panose="020F0502020204030204" pitchFamily="34" charset="0"/>
+            </a:endParaRPr>
+          </a:p>
+          <a:p>
+            <a:pPr marL="0" indent="0">
               <a:spcAft>
                 <a:spcPts val="1000"/>
               </a:spcAft>
-              <a:buFont typeface="Wingdings" panose="05000000000000000000" pitchFamily="2" charset="2"/>
-              <a:buChar char="§"/>
-            </a:pPr>
-            <a:r>
-              <a:rPr lang="fr-FR" sz="2000" kern="0" dirty="0">
-                <a:solidFill>
-                  <a:sysClr val="windowText" lastClr="000000"/>
-                </a:solidFill>
-                <a:latin typeface="Calibri" panose="020F0502020204030204" pitchFamily="34" charset="0"/>
-                <a:cs typeface="Calibri" panose="020F0502020204030204" pitchFamily="34" charset="0"/>
-              </a:rPr>
-              <a:t>Créer un jeu qui respecte les règles énoncées.</a:t>
-            </a:r>
-          </a:p>
-          <a:p>
-            <a:pPr lvl="1">
+              <a:buNone/>
+            </a:pPr>
+            <a:endParaRPr lang="fr-FR" sz="2400" b="1" kern="0" dirty="0">
+              <a:solidFill>
+                <a:srgbClr val="002060"/>
+              </a:solidFill>
+              <a:latin typeface="Calibri" panose="020F0502020204030204" pitchFamily="34" charset="0"/>
+              <a:cs typeface="Calibri" panose="020F0502020204030204" pitchFamily="34" charset="0"/>
+            </a:endParaRPr>
+          </a:p>
+          <a:p>
+            <a:pPr marL="0" indent="0">
               <a:spcAft>
                 <a:spcPts val="1000"/>
               </a:spcAft>
-              <a:buFont typeface="Wingdings" panose="05000000000000000000" pitchFamily="2" charset="2"/>
-              <a:buChar char="§"/>
-            </a:pPr>
-            <a:endParaRPr lang="fr-FR" sz="2000" kern="0" dirty="0">
-              <a:solidFill>
-                <a:sysClr val="windowText" lastClr="000000"/>
-              </a:solidFill>
-              <a:latin typeface="Calibri" panose="020F0502020204030204" pitchFamily="34" charset="0"/>
-              <a:cs typeface="Calibri" panose="020F0502020204030204" pitchFamily="34" charset="0"/>
-            </a:endParaRPr>
-          </a:p>
-          <a:p>
-            <a:pPr lvl="1">
+              <a:buNone/>
+            </a:pPr>
+            <a:endParaRPr lang="fr-FR" sz="2400" b="1" kern="0" dirty="0" smtClean="0">
+              <a:solidFill>
+                <a:srgbClr val="002060"/>
+              </a:solidFill>
+              <a:latin typeface="Calibri" panose="020F0502020204030204" pitchFamily="34" charset="0"/>
+              <a:cs typeface="Calibri" panose="020F0502020204030204" pitchFamily="34" charset="0"/>
+            </a:endParaRPr>
+          </a:p>
+          <a:p>
+            <a:pPr marL="0" indent="0">
               <a:spcAft>
                 <a:spcPts val="1000"/>
               </a:spcAft>
+              <a:buNone/>
+            </a:pPr>
+            <a:endParaRPr lang="fr-FR" sz="2400" b="1" kern="0" dirty="0">
+              <a:solidFill>
+                <a:srgbClr val="002060"/>
+              </a:solidFill>
+              <a:latin typeface="Calibri" panose="020F0502020204030204" pitchFamily="34" charset="0"/>
+              <a:cs typeface="Calibri" panose="020F0502020204030204" pitchFamily="34" charset="0"/>
+            </a:endParaRPr>
+          </a:p>
+          <a:p>
+            <a:pPr marL="0" indent="0">
+              <a:buNone/>
+            </a:pPr>
+            <a:endParaRPr lang="fr-FR" sz="2400" b="1" kern="0" dirty="0" smtClean="0">
+              <a:solidFill>
+                <a:srgbClr val="002060"/>
+              </a:solidFill>
+              <a:latin typeface="Calibri" panose="020F0502020204030204" pitchFamily="34" charset="0"/>
+              <a:cs typeface="Calibri" panose="020F0502020204030204" pitchFamily="34" charset="0"/>
+            </a:endParaRPr>
+          </a:p>
+          <a:p>
+            <a:pPr marL="0" indent="0">
+              <a:buNone/>
+            </a:pPr>
+            <a:endParaRPr lang="fr-FR" sz="2400" b="1" kern="0" dirty="0">
+              <a:solidFill>
+                <a:srgbClr val="002060"/>
+              </a:solidFill>
+              <a:latin typeface="Calibri" panose="020F0502020204030204" pitchFamily="34" charset="0"/>
+              <a:cs typeface="Calibri" panose="020F0502020204030204" pitchFamily="34" charset="0"/>
+            </a:endParaRPr>
+          </a:p>
+          <a:p>
+            <a:pPr lvl="1">
               <a:buFont typeface="Wingdings" panose="05000000000000000000" pitchFamily="2" charset="2"/>
               <a:buChar char="§"/>
             </a:pPr>
             <a:r>
-              <a:rPr lang="fr-FR" sz="2000" kern="0" dirty="0">
+              <a:rPr lang="fr-FR" sz="2000" i="1" kern="0" dirty="0">
                 <a:solidFill>
                   <a:sysClr val="windowText" lastClr="000000"/>
                 </a:solidFill>
                 <a:latin typeface="Calibri" panose="020F0502020204030204" pitchFamily="34" charset="0"/>
                 <a:cs typeface="Calibri" panose="020F0502020204030204" pitchFamily="34" charset="0"/>
               </a:rPr>
-              <a:t>Tester notre code.</a:t>
-            </a:r>
-          </a:p>
-          <a:p>
-            <a:pPr lvl="1">
-              <a:spcAft>
-                <a:spcPts val="1000"/>
-              </a:spcAft>
-              <a:buFont typeface="Wingdings" panose="05000000000000000000" pitchFamily="2" charset="2"/>
-              <a:buChar char="§"/>
-            </a:pPr>
-            <a:endParaRPr lang="fr-FR" sz="2000" kern="0" dirty="0">
-              <a:solidFill>
-                <a:sysClr val="windowText" lastClr="000000"/>
-              </a:solidFill>
-              <a:latin typeface="Calibri" panose="020F0502020204030204" pitchFamily="34" charset="0"/>
-              <a:cs typeface="Calibri" panose="020F0502020204030204" pitchFamily="34" charset="0"/>
-            </a:endParaRPr>
-          </a:p>
-          <a:p>
-            <a:pPr lvl="1">
-              <a:spcAft>
-                <a:spcPts val="1000"/>
-              </a:spcAft>
-              <a:buFont typeface="Wingdings" panose="05000000000000000000" pitchFamily="2" charset="2"/>
-              <a:buChar char="§"/>
-            </a:pPr>
-            <a:r>
-              <a:rPr lang="fr-FR" sz="2000" kern="0" dirty="0">
+              <a:t>h</a:t>
+            </a:r>
+            <a:r>
+              <a:rPr lang="fr-FR" sz="2000" i="1" kern="0" dirty="0" smtClean="0">
                 <a:solidFill>
                   <a:sysClr val="windowText" lastClr="000000"/>
                 </a:solidFill>
                 <a:latin typeface="Calibri" panose="020F0502020204030204" pitchFamily="34" charset="0"/>
                 <a:cs typeface="Calibri" panose="020F0502020204030204" pitchFamily="34" charset="0"/>
               </a:rPr>
-              <a:t>Créer des intelligences artificielles.</a:t>
-            </a:r>
-          </a:p>
-          <a:p>
-            <a:pPr lvl="1">
-              <a:spcAft>
-                <a:spcPts val="1000"/>
-              </a:spcAft>
-              <a:buFont typeface="Wingdings" panose="05000000000000000000" pitchFamily="2" charset="2"/>
-              <a:buChar char="§"/>
-            </a:pPr>
-            <a:endParaRPr lang="fr-FR" sz="2000" kern="0" dirty="0">
+              <a:t>umain </a:t>
+            </a:r>
+            <a:r>
+              <a:rPr lang="fr-FR" sz="2000" kern="0" dirty="0" smtClean="0">
+                <a:solidFill>
+                  <a:sysClr val="windowText" lastClr="000000"/>
+                </a:solidFill>
+                <a:latin typeface="Calibri" panose="020F0502020204030204" pitchFamily="34" charset="0"/>
+                <a:cs typeface="Calibri" panose="020F0502020204030204" pitchFamily="34" charset="0"/>
+              </a:rPr>
+              <a:t>: utilise les coordonnées entrées par le joueur (pour la console).</a:t>
+            </a:r>
+          </a:p>
+          <a:p>
+            <a:pPr marL="457200" lvl="1" indent="0">
+              <a:buNone/>
+            </a:pPr>
+            <a:endParaRPr lang="fr-FR" sz="2000" kern="0" dirty="0" smtClean="0">
               <a:solidFill>
                 <a:sysClr val="windowText" lastClr="000000"/>
               </a:solidFill>
@@ -14672,36 +14241,47 @@
               <a:buChar char="§"/>
             </a:pPr>
             <a:r>
-              <a:rPr lang="fr-FR" sz="2000" kern="0" dirty="0">
+              <a:rPr lang="fr-FR" sz="2000" i="1" kern="0" dirty="0">
                 <a:solidFill>
                   <a:sysClr val="windowText" lastClr="000000"/>
                 </a:solidFill>
                 <a:latin typeface="Calibri" panose="020F0502020204030204" pitchFamily="34" charset="0"/>
                 <a:cs typeface="Calibri" panose="020F0502020204030204" pitchFamily="34" charset="0"/>
               </a:rPr>
-              <a:t>Mettre en place une interface homme-machine (IHM) ergonomique.</a:t>
-            </a:r>
+              <a:t>h</a:t>
+            </a:r>
+            <a:r>
+              <a:rPr lang="fr-FR" sz="2000" i="1" kern="0" dirty="0" smtClean="0">
+                <a:solidFill>
+                  <a:sysClr val="windowText" lastClr="000000"/>
+                </a:solidFill>
+                <a:latin typeface="Calibri" panose="020F0502020204030204" pitchFamily="34" charset="0"/>
+                <a:cs typeface="Calibri" panose="020F0502020204030204" pitchFamily="34" charset="0"/>
+              </a:rPr>
+              <a:t>umain_graphique</a:t>
+            </a:r>
+            <a:r>
+              <a:rPr lang="fr-FR" sz="2000" kern="0" dirty="0" smtClean="0">
+                <a:solidFill>
+                  <a:sysClr val="windowText" lastClr="000000"/>
+                </a:solidFill>
+                <a:latin typeface="Calibri" panose="020F0502020204030204" pitchFamily="34" charset="0"/>
+                <a:cs typeface="Calibri" panose="020F0502020204030204" pitchFamily="34" charset="0"/>
+              </a:rPr>
+              <a:t> : utilise la position du clic de la souris (pour l’IHM).</a:t>
+            </a:r>
+            <a:endParaRPr lang="fr-FR" sz="2000" i="1" kern="0" dirty="0">
+              <a:solidFill>
+                <a:sysClr val="windowText" lastClr="000000"/>
+              </a:solidFill>
+              <a:latin typeface="Calibri" panose="020F0502020204030204" pitchFamily="34" charset="0"/>
+              <a:cs typeface="Calibri" panose="020F0502020204030204" pitchFamily="34" charset="0"/>
+            </a:endParaRPr>
           </a:p>
           <a:p>
             <a:pPr lvl="1">
               <a:spcAft>
-                <a:spcPts val="1000"/>
-              </a:spcAft>
-              <a:buFont typeface="Wingdings" panose="05000000000000000000" pitchFamily="2" charset="2"/>
-              <a:buChar char="§"/>
-            </a:pPr>
-            <a:endParaRPr lang="fr-FR" sz="2000" kern="0" dirty="0">
-              <a:solidFill>
-                <a:sysClr val="windowText" lastClr="000000"/>
-              </a:solidFill>
-              <a:latin typeface="Calibri" panose="020F0502020204030204" pitchFamily="34" charset="0"/>
-              <a:cs typeface="Calibri" panose="020F0502020204030204" pitchFamily="34" charset="0"/>
-            </a:endParaRPr>
-          </a:p>
-          <a:p>
-            <a:pPr lvl="1">
-              <a:spcAft>
-                <a:spcPts val="1000"/>
+                <a:spcPts val="600"/>
               </a:spcAft>
               <a:buFont typeface="Wingdings" panose="05000000000000000000" pitchFamily="2" charset="2"/>
               <a:buChar char="§"/>
@@ -14883,6 +14463,195 @@
               </a:rPr>
               <a:t>2. Types de joueurs</a:t>
             </a:r>
+          </a:p>
+        </p:txBody>
+      </p:sp>
+      <p:pic>
+        <p:nvPicPr>
+          <p:cNvPr id="1026" name="Picture 2"/>
+          <p:cNvPicPr>
+            <a:picLocks noChangeAspect="1" noChangeArrowheads="1"/>
+          </p:cNvPicPr>
+          <p:nvPr/>
+        </p:nvPicPr>
+        <p:blipFill>
+          <a:blip r:embed="rId3">
+            <a:extLst>
+              <a:ext uri="{28A0092B-C50C-407E-A947-70E740481C1C}">
+                <a14:useLocalDpi xmlns:a14="http://schemas.microsoft.com/office/drawing/2010/main" val="0"/>
+              </a:ext>
+            </a:extLst>
+          </a:blip>
+          <a:srcRect/>
+          <a:stretch>
+            <a:fillRect/>
+          </a:stretch>
+        </p:blipFill>
+        <p:spPr bwMode="auto">
+          <a:xfrm>
+            <a:off x="2163190" y="1700808"/>
+            <a:ext cx="4742160" cy="2836176"/>
+          </a:xfrm>
+          <a:prstGeom prst="rect">
+            <a:avLst/>
+          </a:prstGeom>
+          <a:noFill/>
+          <a:ln>
+            <a:noFill/>
+          </a:ln>
+          <a:extLst>
+            <a:ext uri="{909E8E84-426E-40DD-AFC4-6F175D3DCCD1}">
+              <a14:hiddenFill xmlns:a14="http://schemas.microsoft.com/office/drawing/2010/main">
+                <a:solidFill>
+                  <a:schemeClr val="accent1"/>
+                </a:solidFill>
+              </a14:hiddenFill>
+            </a:ext>
+            <a:ext uri="{91240B29-F687-4F45-9708-019B960494DF}">
+              <a14:hiddenLine xmlns:a14="http://schemas.microsoft.com/office/drawing/2010/main" w="9525">
+                <a:solidFill>
+                  <a:schemeClr val="tx1"/>
+                </a:solidFill>
+                <a:miter lim="800000"/>
+                <a:headEnd/>
+                <a:tailEnd/>
+              </a14:hiddenLine>
+            </a:ext>
+          </a:extLst>
+        </p:spPr>
+      </p:pic>
+      <p:sp>
+        <p:nvSpPr>
+          <p:cNvPr id="5" name="Forme libre 4"/>
+          <p:cNvSpPr/>
+          <p:nvPr/>
+        </p:nvSpPr>
+        <p:spPr>
+          <a:xfrm>
+            <a:off x="4361104" y="2477035"/>
+            <a:ext cx="1469825" cy="1457848"/>
+          </a:xfrm>
+          <a:custGeom>
+            <a:avLst/>
+            <a:gdLst>
+              <a:gd name="connsiteX0" fmla="*/ 41563 w 1469825"/>
+              <a:gd name="connsiteY0" fmla="*/ 1078965 h 1457848"/>
+              <a:gd name="connsiteX1" fmla="*/ 727363 w 1469825"/>
+              <a:gd name="connsiteY1" fmla="*/ 122232 h 1457848"/>
+              <a:gd name="connsiteX2" fmla="*/ 1243829 w 1469825"/>
+              <a:gd name="connsiteY2" fmla="*/ 37565 h 1457848"/>
+              <a:gd name="connsiteX3" fmla="*/ 1430096 w 1469825"/>
+              <a:gd name="connsiteY3" fmla="*/ 350832 h 1457848"/>
+              <a:gd name="connsiteX4" fmla="*/ 1447029 w 1469825"/>
+              <a:gd name="connsiteY4" fmla="*/ 1180565 h 1457848"/>
+              <a:gd name="connsiteX5" fmla="*/ 1167629 w 1469825"/>
+              <a:gd name="connsiteY5" fmla="*/ 1426098 h 1457848"/>
+              <a:gd name="connsiteX6" fmla="*/ 193963 w 1469825"/>
+              <a:gd name="connsiteY6" fmla="*/ 1417632 h 1457848"/>
+              <a:gd name="connsiteX7" fmla="*/ 41563 w 1469825"/>
+              <a:gd name="connsiteY7" fmla="*/ 1078965 h 1457848"/>
+            </a:gdLst>
+            <a:ahLst/>
+            <a:cxnLst>
+              <a:cxn ang="0">
+                <a:pos x="connsiteX0" y="connsiteY0"/>
+              </a:cxn>
+              <a:cxn ang="0">
+                <a:pos x="connsiteX1" y="connsiteY1"/>
+              </a:cxn>
+              <a:cxn ang="0">
+                <a:pos x="connsiteX2" y="connsiteY2"/>
+              </a:cxn>
+              <a:cxn ang="0">
+                <a:pos x="connsiteX3" y="connsiteY3"/>
+              </a:cxn>
+              <a:cxn ang="0">
+                <a:pos x="connsiteX4" y="connsiteY4"/>
+              </a:cxn>
+              <a:cxn ang="0">
+                <a:pos x="connsiteX5" y="connsiteY5"/>
+              </a:cxn>
+              <a:cxn ang="0">
+                <a:pos x="connsiteX6" y="connsiteY6"/>
+              </a:cxn>
+              <a:cxn ang="0">
+                <a:pos x="connsiteX7" y="connsiteY7"/>
+              </a:cxn>
+            </a:cxnLst>
+            <a:rect l="l" t="t" r="r" b="b"/>
+            <a:pathLst>
+              <a:path w="1469825" h="1457848">
+                <a:moveTo>
+                  <a:pt x="41563" y="1078965"/>
+                </a:moveTo>
+                <a:cubicBezTo>
+                  <a:pt x="130463" y="863065"/>
+                  <a:pt x="526985" y="295799"/>
+                  <a:pt x="727363" y="122232"/>
+                </a:cubicBezTo>
+                <a:cubicBezTo>
+                  <a:pt x="927741" y="-51335"/>
+                  <a:pt x="1126707" y="-535"/>
+                  <a:pt x="1243829" y="37565"/>
+                </a:cubicBezTo>
+                <a:cubicBezTo>
+                  <a:pt x="1360951" y="75665"/>
+                  <a:pt x="1396229" y="160332"/>
+                  <a:pt x="1430096" y="350832"/>
+                </a:cubicBezTo>
+                <a:cubicBezTo>
+                  <a:pt x="1463963" y="541332"/>
+                  <a:pt x="1490773" y="1001354"/>
+                  <a:pt x="1447029" y="1180565"/>
+                </a:cubicBezTo>
+                <a:cubicBezTo>
+                  <a:pt x="1403285" y="1359776"/>
+                  <a:pt x="1376473" y="1386587"/>
+                  <a:pt x="1167629" y="1426098"/>
+                </a:cubicBezTo>
+                <a:cubicBezTo>
+                  <a:pt x="958785" y="1465609"/>
+                  <a:pt x="380230" y="1474076"/>
+                  <a:pt x="193963" y="1417632"/>
+                </a:cubicBezTo>
+                <a:cubicBezTo>
+                  <a:pt x="7696" y="1361188"/>
+                  <a:pt x="-47337" y="1294865"/>
+                  <a:pt x="41563" y="1078965"/>
+                </a:cubicBezTo>
+                <a:close/>
+              </a:path>
+            </a:pathLst>
+          </a:custGeom>
+          <a:noFill/>
+          <a:ln>
+            <a:solidFill>
+              <a:srgbClr val="0070C0"/>
+            </a:solidFill>
+          </a:ln>
+        </p:spPr>
+        <p:style>
+          <a:lnRef idx="2">
+            <a:schemeClr val="accent1">
+              <a:shade val="50000"/>
+            </a:schemeClr>
+          </a:lnRef>
+          <a:fillRef idx="1">
+            <a:schemeClr val="accent1"/>
+          </a:fillRef>
+          <a:effectRef idx="0">
+            <a:schemeClr val="accent1"/>
+          </a:effectRef>
+          <a:fontRef idx="minor">
+            <a:schemeClr val="lt1"/>
+          </a:fontRef>
+        </p:style>
+        <p:txBody>
+          <a:bodyPr rtlCol="0" anchor="ctr"/>
+          <a:lstStyle/>
+          <a:p>
+            <a:pPr algn="ctr"/>
+            <a:endParaRPr lang="fr-FR"/>
           </a:p>
         </p:txBody>
       </p:sp>
@@ -14908,6 +14677,13 @@
       </p:transition>
     </mc:Fallback>
   </mc:AlternateContent>
+  <p:timing>
+    <p:tnLst>
+      <p:par>
+        <p:cTn id="1" dur="indefinite" restart="never" nodeType="tmRoot"/>
+      </p:par>
+    </p:tnLst>
+  </p:timing>
 </p:sld>
 </file>
 
@@ -15770,6 +15546,21 @@
 </file>
 
 <file path=customXml/item1.xml><?xml version="1.0" encoding="utf-8"?>
+<p:properties xmlns:p="http://schemas.microsoft.com/office/2006/metadata/properties" xmlns:xsi="http://www.w3.org/2001/XMLSchema-instance" xmlns:pc="http://schemas.microsoft.com/office/infopath/2007/PartnerControls">
+  <documentManagement/>
+</p:properties>
+</file>
+
+<file path=customXml/item2.xml><?xml version="1.0" encoding="utf-8"?>
+<?mso-contentType ?>
+<FormTemplates xmlns="http://schemas.microsoft.com/sharepoint/v3/contenttype/forms">
+  <Display>DocumentLibraryForm</Display>
+  <Edit>DocumentLibraryForm</Edit>
+  <New>DocumentLibraryForm</New>
+</FormTemplates>
+</file>
+
+<file path=customXml/item3.xml><?xml version="1.0" encoding="utf-8"?>
 <ct:contentTypeSchema xmlns:ct="http://schemas.microsoft.com/office/2006/metadata/contentType" xmlns:ma="http://schemas.microsoft.com/office/2006/metadata/properties/metaAttributes" ct:_="" ma:_="" ma:contentTypeName="Document" ma:contentTypeID="0x0101009B2EAF749564BC46B8626ABA0D0C1197" ma:contentTypeVersion="2" ma:contentTypeDescription="Crée un document." ma:contentTypeScope="" ma:versionID="b7fa3f7e2bdc4c1c593d1b347af793cd">
   <xsd:schema xmlns:xsd="http://www.w3.org/2001/XMLSchema" xmlns:xs="http://www.w3.org/2001/XMLSchema" xmlns:p="http://schemas.microsoft.com/office/2006/metadata/properties" xmlns:ns2="38bbc26a-322d-420c-86a9-91ac4491f230" targetNamespace="http://schemas.microsoft.com/office/2006/metadata/properties" ma:root="true" ma:fieldsID="ccc65804e4d1415e7480734ee0baccc5" ns2:_="">
     <xsd:import namespace="38bbc26a-322d-420c-86a9-91ac4491f230"/>
@@ -15901,22 +15692,31 @@
 </ct:contentTypeSchema>
 </file>
 
-<file path=customXml/item2.xml><?xml version="1.0" encoding="utf-8"?>
-<?mso-contentType ?>
-<FormTemplates xmlns="http://schemas.microsoft.com/sharepoint/v3/contenttype/forms">
-  <Display>DocumentLibraryForm</Display>
-  <Edit>DocumentLibraryForm</Edit>
-  <New>DocumentLibraryForm</New>
-</FormTemplates>
+<file path=customXml/itemProps1.xml><?xml version="1.0" encoding="utf-8"?>
+<ds:datastoreItem xmlns:ds="http://schemas.openxmlformats.org/officeDocument/2006/customXml" ds:itemID="{6F178F7B-1855-4635-B0FB-223A7F638A86}">
+  <ds:schemaRefs>
+    <ds:schemaRef ds:uri="http://schemas.microsoft.com/office/2006/metadata/properties"/>
+    <ds:schemaRef ds:uri="http://purl.org/dc/dcmitype/"/>
+    <ds:schemaRef ds:uri="http://schemas.microsoft.com/office/2006/documentManagement/types"/>
+    <ds:schemaRef ds:uri="http://purl.org/dc/elements/1.1/"/>
+    <ds:schemaRef ds:uri="http://www.w3.org/XML/1998/namespace"/>
+    <ds:schemaRef ds:uri="http://purl.org/dc/terms/"/>
+    <ds:schemaRef ds:uri="http://schemas.microsoft.com/office/infopath/2007/PartnerControls"/>
+    <ds:schemaRef ds:uri="http://schemas.openxmlformats.org/package/2006/metadata/core-properties"/>
+    <ds:schemaRef ds:uri="38bbc26a-322d-420c-86a9-91ac4491f230"/>
+  </ds:schemaRefs>
+</ds:datastoreItem>
 </file>
 
-<file path=customXml/item3.xml><?xml version="1.0" encoding="utf-8"?>
-<p:properties xmlns:p="http://schemas.microsoft.com/office/2006/metadata/properties" xmlns:xsi="http://www.w3.org/2001/XMLSchema-instance" xmlns:pc="http://schemas.microsoft.com/office/infopath/2007/PartnerControls">
-  <documentManagement/>
-</p:properties>
+<file path=customXml/itemProps2.xml><?xml version="1.0" encoding="utf-8"?>
+<ds:datastoreItem xmlns:ds="http://schemas.openxmlformats.org/officeDocument/2006/customXml" ds:itemID="{8984FC58-E0ED-4D10-A63C-DB27C62EA679}">
+  <ds:schemaRefs>
+    <ds:schemaRef ds:uri="http://schemas.microsoft.com/sharepoint/v3/contenttype/forms"/>
+  </ds:schemaRefs>
+</ds:datastoreItem>
 </file>
 
-<file path=customXml/itemProps1.xml><?xml version="1.0" encoding="utf-8"?>
+<file path=customXml/itemProps3.xml><?xml version="1.0" encoding="utf-8"?>
 <ds:datastoreItem xmlns:ds="http://schemas.openxmlformats.org/officeDocument/2006/customXml" ds:itemID="{7D5712F0-254C-4044-8193-FCD701881FCA}">
   <ds:schemaRefs>
     <ds:schemaRef ds:uri="http://schemas.microsoft.com/office/2006/metadata/contentType"/>
@@ -15932,28 +15732,4 @@
     <ds:schemaRef ds:uri="http://schemas.microsoft.com/internal/obd"/>
   </ds:schemaRefs>
 </ds:datastoreItem>
-</file>
-
-<file path=customXml/itemProps2.xml><?xml version="1.0" encoding="utf-8"?>
-<ds:datastoreItem xmlns:ds="http://schemas.openxmlformats.org/officeDocument/2006/customXml" ds:itemID="{8984FC58-E0ED-4D10-A63C-DB27C62EA679}">
-  <ds:schemaRefs>
-    <ds:schemaRef ds:uri="http://schemas.microsoft.com/sharepoint/v3/contenttype/forms"/>
-  </ds:schemaRefs>
-</ds:datastoreItem>
-</file>
-
-<file path=customXml/itemProps3.xml><?xml version="1.0" encoding="utf-8"?>
-<ds:datastoreItem xmlns:ds="http://schemas.openxmlformats.org/officeDocument/2006/customXml" ds:itemID="{6F178F7B-1855-4635-B0FB-223A7F638A86}">
-  <ds:schemaRefs>
-    <ds:schemaRef ds:uri="http://schemas.microsoft.com/office/2006/metadata/properties"/>
-    <ds:schemaRef ds:uri="http://purl.org/dc/dcmitype/"/>
-    <ds:schemaRef ds:uri="http://schemas.microsoft.com/office/2006/documentManagement/types"/>
-    <ds:schemaRef ds:uri="http://purl.org/dc/elements/1.1/"/>
-    <ds:schemaRef ds:uri="http://www.w3.org/XML/1998/namespace"/>
-    <ds:schemaRef ds:uri="http://purl.org/dc/terms/"/>
-    <ds:schemaRef ds:uri="http://schemas.microsoft.com/office/infopath/2007/PartnerControls"/>
-    <ds:schemaRef ds:uri="http://schemas.openxmlformats.org/package/2006/metadata/core-properties"/>
-    <ds:schemaRef ds:uri="38bbc26a-322d-420c-86a9-91ac4491f230"/>
-  </ds:schemaRefs>
-</ds:datastoreItem>
 </file>
</xml_diff>